<commit_message>
changed opera logo ;-)
</commit_message>
<xml_diff>
--- a/_DOCUMENTATION/Presentation/Praesentation-Traildevils-XPl2.pptx
+++ b/_DOCUMENTATION/Presentation/Praesentation-Traildevils-XPl2.pptx
@@ -612,7 +612,7 @@
           <a:p>
             <a:fld id="{D0020212-000B-4CF5-BE5E-EE97B9489329}" type="datetimeFigureOut">
               <a:rPr lang="de-CH" smtClean="0"/>
-              <a:t>11.12.2011</a:t>
+              <a:t>12.12.2011</a:t>
             </a:fld>
             <a:endParaRPr lang="de-CH"/>
           </a:p>
@@ -838,7 +838,7 @@
           <a:p>
             <a:fld id="{D0020212-000B-4CF5-BE5E-EE97B9489329}" type="datetimeFigureOut">
               <a:rPr lang="de-CH" smtClean="0"/>
-              <a:t>11.12.2011</a:t>
+              <a:t>12.12.2011</a:t>
             </a:fld>
             <a:endParaRPr lang="de-CH"/>
           </a:p>
@@ -1013,7 +1013,7 @@
           <a:p>
             <a:fld id="{D0020212-000B-4CF5-BE5E-EE97B9489329}" type="datetimeFigureOut">
               <a:rPr lang="de-CH" smtClean="0"/>
-              <a:t>11.12.2011</a:t>
+              <a:t>12.12.2011</a:t>
             </a:fld>
             <a:endParaRPr lang="de-CH"/>
           </a:p>
@@ -1178,7 +1178,7 @@
           <a:p>
             <a:fld id="{D0020212-000B-4CF5-BE5E-EE97B9489329}" type="datetimeFigureOut">
               <a:rPr lang="de-CH" smtClean="0"/>
-              <a:t>11.12.2011</a:t>
+              <a:t>12.12.2011</a:t>
             </a:fld>
             <a:endParaRPr lang="de-CH"/>
           </a:p>
@@ -1419,7 +1419,7 @@
           <a:p>
             <a:fld id="{D0020212-000B-4CF5-BE5E-EE97B9489329}" type="datetimeFigureOut">
               <a:rPr lang="de-CH" smtClean="0"/>
-              <a:t>11.12.2011</a:t>
+              <a:t>12.12.2011</a:t>
             </a:fld>
             <a:endParaRPr lang="de-CH"/>
           </a:p>
@@ -1532,7 +1532,7 @@
           <a:p>
             <a:fld id="{D0020212-000B-4CF5-BE5E-EE97B9489329}" type="datetimeFigureOut">
               <a:rPr lang="de-CH" smtClean="0"/>
-              <a:t>11.12.2011</a:t>
+              <a:t>12.12.2011</a:t>
             </a:fld>
             <a:endParaRPr lang="de-CH"/>
           </a:p>
@@ -1909,7 +1909,7 @@
           <a:p>
             <a:fld id="{D0020212-000B-4CF5-BE5E-EE97B9489329}" type="datetimeFigureOut">
               <a:rPr lang="de-CH" smtClean="0"/>
-              <a:t>11.12.2011</a:t>
+              <a:t>12.12.2011</a:t>
             </a:fld>
             <a:endParaRPr lang="de-CH"/>
           </a:p>
@@ -7554,7 +7554,7 @@
           <a:p>
             <a:fld id="{D0020212-000B-4CF5-BE5E-EE97B9489329}" type="datetimeFigureOut">
               <a:rPr lang="de-CH" smtClean="0"/>
-              <a:t>11.12.2011</a:t>
+              <a:t>12.12.2011</a:t>
             </a:fld>
             <a:endParaRPr lang="de-CH"/>
           </a:p>
@@ -7644,7 +7644,7 @@
           <a:p>
             <a:fld id="{D0020212-000B-4CF5-BE5E-EE97B9489329}" type="datetimeFigureOut">
               <a:rPr lang="de-CH" smtClean="0"/>
-              <a:t>11.12.2011</a:t>
+              <a:t>12.12.2011</a:t>
             </a:fld>
             <a:endParaRPr lang="de-CH"/>
           </a:p>
@@ -7916,7 +7916,7 @@
           <a:p>
             <a:fld id="{D0020212-000B-4CF5-BE5E-EE97B9489329}" type="datetimeFigureOut">
               <a:rPr lang="de-CH" smtClean="0"/>
-              <a:t>11.12.2011</a:t>
+              <a:t>12.12.2011</a:t>
             </a:fld>
             <a:endParaRPr lang="de-CH"/>
           </a:p>
@@ -8224,7 +8224,7 @@
           <a:p>
             <a:fld id="{D0020212-000B-4CF5-BE5E-EE97B9489329}" type="datetimeFigureOut">
               <a:rPr lang="de-CH" smtClean="0"/>
-              <a:t>11.12.2011</a:t>
+              <a:t>12.12.2011</a:t>
             </a:fld>
             <a:endParaRPr lang="de-CH"/>
           </a:p>
@@ -8461,7 +8461,7 @@
           <a:p>
             <a:fld id="{D0020212-000B-4CF5-BE5E-EE97B9489329}" type="datetimeFigureOut">
               <a:rPr lang="de-CH" smtClean="0"/>
-              <a:t>11.12.2011</a:t>
+              <a:t>12.12.2011</a:t>
             </a:fld>
             <a:endParaRPr lang="de-CH"/>
           </a:p>
@@ -8986,11 +8986,7 @@
             </a:r>
             <a:r>
               <a:rPr lang="de-CH" b="1" dirty="0" smtClean="0"/>
-              <a:t>Mobile </a:t>
-            </a:r>
-            <a:r>
-              <a:rPr lang="de-CH" b="1" dirty="0" smtClean="0"/>
-              <a:t>Web-App</a:t>
+              <a:t>Mobile Web-App</a:t>
             </a:r>
             <a:endParaRPr lang="de-CH" b="1" dirty="0"/>
           </a:p>
@@ -9494,11 +9490,11 @@
   <p:clrMapOvr>
     <a:masterClrMapping/>
   </p:clrMapOvr>
-  <mc:AlternateContent xmlns:mc="http://schemas.openxmlformats.org/markup-compatibility/2006">
-    <mc:Choice xmlns:p14="http://schemas.microsoft.com/office/powerpoint/2010/main" Requires="p14">
+  <mc:AlternateContent xmlns:mc="http://schemas.openxmlformats.org/markup-compatibility/2006" xmlns:p14="http://schemas.microsoft.com/office/powerpoint/2010/main">
+    <mc:Choice Requires="p14">
       <p:transition spd="slow" p14:dur="2000"/>
     </mc:Choice>
-    <mc:Fallback>
+    <mc:Fallback xmlns="">
       <p:transition spd="slow"/>
     </mc:Fallback>
   </mc:AlternateContent>
@@ -9580,29 +9576,13 @@
             <a:pPr lvl="1"/>
             <a:r>
               <a:rPr lang="de-CH" dirty="0" smtClean="0"/>
-              <a:t>seit </a:t>
-            </a:r>
-            <a:r>
-              <a:rPr lang="de-CH" dirty="0" smtClean="0"/>
-              <a:t>9. Dezember </a:t>
+              <a:t>seit 9. Dezember </a:t>
             </a:r>
             <a:r>
               <a:rPr lang="de-CH" dirty="0" smtClean="0">
                 <a:sym typeface="Wingdings" pitchFamily="2" charset="2"/>
               </a:rPr>
-              <a:t> </a:t>
-            </a:r>
-            <a:r>
-              <a:rPr lang="de-CH" dirty="0" smtClean="0">
-                <a:sym typeface="Wingdings" pitchFamily="2" charset="2"/>
-              </a:rPr>
-              <a:t>3. </a:t>
-            </a:r>
-            <a:r>
-              <a:rPr lang="de-CH" dirty="0" smtClean="0">
-                <a:sym typeface="Wingdings" pitchFamily="2" charset="2"/>
-              </a:rPr>
-              <a:t>Preview-Version</a:t>
+              <a:t> 3. Preview-Version</a:t>
             </a:r>
             <a:endParaRPr lang="de-CH" dirty="0" smtClean="0"/>
           </a:p>
@@ -9658,11 +9638,11 @@
   <p:clrMapOvr>
     <a:masterClrMapping/>
   </p:clrMapOvr>
-  <mc:AlternateContent xmlns:mc="http://schemas.openxmlformats.org/markup-compatibility/2006">
-    <mc:Choice xmlns:p14="http://schemas.microsoft.com/office/powerpoint/2010/main" Requires="p14">
+  <mc:AlternateContent xmlns:mc="http://schemas.openxmlformats.org/markup-compatibility/2006" xmlns:p14="http://schemas.microsoft.com/office/powerpoint/2010/main">
+    <mc:Choice Requires="p14">
       <p:transition spd="slow" p14:dur="2000"/>
     </mc:Choice>
-    <mc:Fallback>
+    <mc:Fallback xmlns="">
       <p:transition spd="slow"/>
     </mc:Fallback>
   </mc:AlternateContent>
@@ -9763,59 +9743,6 @@
             </a:r>
           </a:p>
           <a:p>
-            <a:r>
-              <a:rPr lang="de-CH" dirty="0" smtClean="0"/>
-              <a:t>Applikationen mit </a:t>
-            </a:r>
-            <a:r>
-              <a:rPr lang="de-CH" b="1" dirty="0" smtClean="0"/>
-              <a:t>JavaScript</a:t>
-            </a:r>
-            <a:r>
-              <a:rPr lang="de-CH" dirty="0" smtClean="0"/>
-              <a:t> zu programmieren ist wie </a:t>
-            </a:r>
-            <a:r>
-              <a:rPr lang="de-CH" b="1" dirty="0" smtClean="0"/>
-              <a:t>Bildbearbeitung mit Notepad</a:t>
-            </a:r>
-            <a:r>
-              <a:rPr lang="de-CH" dirty="0" smtClean="0"/>
-              <a:t>.</a:t>
-            </a:r>
-            <a:br>
-              <a:rPr lang="de-CH" dirty="0" smtClean="0"/>
-            </a:br>
-            <a:r>
-              <a:rPr lang="de-CH" dirty="0" smtClean="0">
-                <a:sym typeface="Wingdings" pitchFamily="2" charset="2"/>
-              </a:rPr>
-              <a:t> Es ist zwar </a:t>
-            </a:r>
-            <a:r>
-              <a:rPr lang="de-CH" b="1" dirty="0" smtClean="0">
-                <a:sym typeface="Wingdings" pitchFamily="2" charset="2"/>
-              </a:rPr>
-              <a:t>möglich</a:t>
-            </a:r>
-            <a:r>
-              <a:rPr lang="de-CH" dirty="0" smtClean="0">
-                <a:sym typeface="Wingdings" pitchFamily="2" charset="2"/>
-              </a:rPr>
-              <a:t> aber </a:t>
-            </a:r>
-            <a:r>
-              <a:rPr lang="de-CH" b="1" dirty="0" smtClean="0">
-                <a:sym typeface="Wingdings" pitchFamily="2" charset="2"/>
-              </a:rPr>
-              <a:t>nicht gerade einfach</a:t>
-            </a:r>
-            <a:r>
-              <a:rPr lang="de-CH" dirty="0" smtClean="0">
-                <a:sym typeface="Wingdings" pitchFamily="2" charset="2"/>
-              </a:rPr>
-              <a:t>.</a:t>
-            </a:r>
             <a:endParaRPr lang="de-CH" dirty="0" smtClean="0"/>
           </a:p>
         </p:txBody>
@@ -9964,11 +9891,11 @@
   <p:clrMapOvr>
     <a:masterClrMapping/>
   </p:clrMapOvr>
-  <mc:AlternateContent xmlns:mc="http://schemas.openxmlformats.org/markup-compatibility/2006">
-    <mc:Choice xmlns:p14="http://schemas.microsoft.com/office/powerpoint/2010/main" Requires="p14">
+  <mc:AlternateContent xmlns:mc="http://schemas.openxmlformats.org/markup-compatibility/2006" xmlns:p14="http://schemas.microsoft.com/office/powerpoint/2010/main">
+    <mc:Choice Requires="p14">
       <p:transition spd="slow" p14:dur="2000"/>
     </mc:Choice>
-    <mc:Fallback>
+    <mc:Fallback xmlns="">
       <p:transition spd="slow"/>
     </mc:Fallback>
   </mc:AlternateContent>
@@ -10105,11 +10032,11 @@
   <p:clrMapOvr>
     <a:masterClrMapping/>
   </p:clrMapOvr>
-  <mc:AlternateContent xmlns:mc="http://schemas.openxmlformats.org/markup-compatibility/2006">
-    <mc:Choice xmlns:p14="http://schemas.microsoft.com/office/powerpoint/2010/main" Requires="p14">
+  <mc:AlternateContent xmlns:mc="http://schemas.openxmlformats.org/markup-compatibility/2006" xmlns:p14="http://schemas.microsoft.com/office/powerpoint/2010/main">
+    <mc:Choice Requires="p14">
       <p:transition spd="slow" p14:dur="2000"/>
     </mc:Choice>
-    <mc:Fallback>
+    <mc:Fallback xmlns="">
       <p:transition spd="slow"/>
     </mc:Fallback>
   </mc:AlternateContent>
@@ -10328,11 +10255,11 @@
   <p:clrMapOvr>
     <a:masterClrMapping/>
   </p:clrMapOvr>
-  <mc:AlternateContent xmlns:mc="http://schemas.openxmlformats.org/markup-compatibility/2006">
-    <mc:Choice xmlns:p14="http://schemas.microsoft.com/office/powerpoint/2010/main" Requires="p14">
+  <mc:AlternateContent xmlns:mc="http://schemas.openxmlformats.org/markup-compatibility/2006" xmlns:p14="http://schemas.microsoft.com/office/powerpoint/2010/main">
+    <mc:Choice Requires="p14">
       <p:transition spd="slow" p14:dur="2000"/>
     </mc:Choice>
-    <mc:Fallback>
+    <mc:Fallback xmlns="">
       <p:transition spd="slow"/>
     </mc:Fallback>
   </mc:AlternateContent>
@@ -11232,11 +11159,7 @@
           <a:p>
             <a:r>
               <a:rPr lang="de-CH" dirty="0" smtClean="0"/>
-              <a:t>Unterstützte </a:t>
-            </a:r>
-            <a:r>
-              <a:rPr lang="de-CH" dirty="0" smtClean="0"/>
-              <a:t>Browser:</a:t>
+              <a:t>Unterstützte Browser:</a:t>
             </a:r>
           </a:p>
           <a:p>
@@ -11485,7 +11408,7 @@
       </p:pic>
       <p:pic>
         <p:nvPicPr>
-          <p:cNvPr id="4099" name="Picture 3"/>
+          <p:cNvPr id="4100" name="Picture 4"/>
           <p:cNvPicPr>
             <a:picLocks noChangeAspect="1" noChangeArrowheads="1"/>
           </p:cNvPicPr>
@@ -11493,70 +11416,6 @@
         </p:nvPicPr>
         <p:blipFill>
           <a:blip r:embed="rId3">
-            <a:extLst>
-              <a:ext uri="{28A0092B-C50C-407E-A947-70E740481C1C}">
-                <a14:useLocalDpi xmlns:a14="http://schemas.microsoft.com/office/drawing/2010/main" val="0"/>
-              </a:ext>
-            </a:extLst>
-          </a:blip>
-          <a:srcRect/>
-          <a:stretch>
-            <a:fillRect/>
-          </a:stretch>
-        </p:blipFill>
-        <p:spPr bwMode="auto">
-          <a:xfrm>
-            <a:off x="8137590" y="3715307"/>
-            <a:ext cx="546061" cy="504056"/>
-          </a:xfrm>
-          <a:prstGeom prst="rect">
-            <a:avLst/>
-          </a:prstGeom>
-          <a:noFill/>
-          <a:ln>
-            <a:noFill/>
-          </a:ln>
-          <a:effectLst/>
-          <a:extLst>
-            <a:ext uri="{909E8E84-426E-40DD-AFC4-6F175D3DCCD1}">
-              <a14:hiddenFill xmlns:a14="http://schemas.microsoft.com/office/drawing/2010/main">
-                <a:solidFill>
-                  <a:schemeClr val="accent1"/>
-                </a:solidFill>
-              </a14:hiddenFill>
-            </a:ext>
-            <a:ext uri="{91240B29-F687-4F45-9708-019B960494DF}">
-              <a14:hiddenLine xmlns:a14="http://schemas.microsoft.com/office/drawing/2010/main" w="9525">
-                <a:solidFill>
-                  <a:schemeClr val="tx1"/>
-                </a:solidFill>
-                <a:miter lim="800000"/>
-                <a:headEnd/>
-                <a:tailEnd/>
-              </a14:hiddenLine>
-            </a:ext>
-            <a:ext uri="{AF507438-7753-43E0-B8FC-AC1667EBCBE1}">
-              <a14:hiddenEffects xmlns:a14="http://schemas.microsoft.com/office/drawing/2010/main">
-                <a:effectLst>
-                  <a:outerShdw dist="35921" dir="2700000" algn="ctr" rotWithShape="0">
-                    <a:schemeClr val="bg2"/>
-                  </a:outerShdw>
-                </a:effectLst>
-              </a14:hiddenEffects>
-            </a:ext>
-          </a:extLst>
-        </p:spPr>
-      </p:pic>
-      <p:pic>
-        <p:nvPicPr>
-          <p:cNvPr id="4100" name="Picture 4"/>
-          <p:cNvPicPr>
-            <a:picLocks noChangeAspect="1" noChangeArrowheads="1"/>
-          </p:cNvPicPr>
-          <p:nvPr/>
-        </p:nvPicPr>
-        <p:blipFill>
-          <a:blip r:embed="rId4">
             <a:extLst>
               <a:ext uri="{28A0092B-C50C-407E-A947-70E740481C1C}">
                 <a14:useLocalDpi xmlns:a14="http://schemas.microsoft.com/office/drawing/2010/main" val="0"/>
@@ -11620,7 +11479,7 @@
           <p:nvPr/>
         </p:nvPicPr>
         <p:blipFill>
-          <a:blip r:embed="rId5">
+          <a:blip r:embed="rId4">
             <a:extLst>
               <a:ext uri="{28A0092B-C50C-407E-A947-70E740481C1C}">
                 <a14:useLocalDpi xmlns:a14="http://schemas.microsoft.com/office/drawing/2010/main" val="0"/>
@@ -11684,7 +11543,7 @@
           <p:nvPr/>
         </p:nvPicPr>
         <p:blipFill>
-          <a:blip r:embed="rId6">
+          <a:blip r:embed="rId5">
             <a:extLst>
               <a:ext uri="{28A0092B-C50C-407E-A947-70E740481C1C}">
                 <a14:useLocalDpi xmlns:a14="http://schemas.microsoft.com/office/drawing/2010/main" val="0"/>
@@ -11748,7 +11607,7 @@
           <p:nvPr/>
         </p:nvPicPr>
         <p:blipFill>
-          <a:blip r:embed="rId7">
+          <a:blip r:embed="rId6">
             <a:extLst>
               <a:ext uri="{28A0092B-C50C-407E-A947-70E740481C1C}">
                 <a14:useLocalDpi xmlns:a14="http://schemas.microsoft.com/office/drawing/2010/main" val="0"/>
@@ -11803,6 +11662,70 @@
           </a:extLst>
         </p:spPr>
       </p:pic>
+      <p:pic>
+        <p:nvPicPr>
+          <p:cNvPr id="1026" name="Picture 2"/>
+          <p:cNvPicPr>
+            <a:picLocks noChangeAspect="1" noChangeArrowheads="1"/>
+          </p:cNvPicPr>
+          <p:nvPr/>
+        </p:nvPicPr>
+        <p:blipFill>
+          <a:blip r:embed="rId7">
+            <a:extLst>
+              <a:ext uri="{28A0092B-C50C-407E-A947-70E740481C1C}">
+                <a14:useLocalDpi xmlns:a14="http://schemas.microsoft.com/office/drawing/2010/main" val="0"/>
+              </a:ext>
+            </a:extLst>
+          </a:blip>
+          <a:srcRect/>
+          <a:stretch>
+            <a:fillRect/>
+          </a:stretch>
+        </p:blipFill>
+        <p:spPr bwMode="auto">
+          <a:xfrm>
+            <a:off x="7776125" y="3551211"/>
+            <a:ext cx="776287" cy="650826"/>
+          </a:xfrm>
+          <a:prstGeom prst="rect">
+            <a:avLst/>
+          </a:prstGeom>
+          <a:noFill/>
+          <a:ln>
+            <a:noFill/>
+          </a:ln>
+          <a:effectLst/>
+          <a:extLst>
+            <a:ext uri="{909E8E84-426E-40DD-AFC4-6F175D3DCCD1}">
+              <a14:hiddenFill xmlns:a14="http://schemas.microsoft.com/office/drawing/2010/main">
+                <a:solidFill>
+                  <a:schemeClr val="accent1"/>
+                </a:solidFill>
+              </a14:hiddenFill>
+            </a:ext>
+            <a:ext uri="{91240B29-F687-4F45-9708-019B960494DF}">
+              <a14:hiddenLine xmlns:a14="http://schemas.microsoft.com/office/drawing/2010/main" w="9525">
+                <a:solidFill>
+                  <a:schemeClr val="tx1"/>
+                </a:solidFill>
+                <a:miter lim="800000"/>
+                <a:headEnd/>
+                <a:tailEnd/>
+              </a14:hiddenLine>
+            </a:ext>
+            <a:ext uri="{AF507438-7753-43E0-B8FC-AC1667EBCBE1}">
+              <a14:hiddenEffects xmlns:a14="http://schemas.microsoft.com/office/drawing/2010/main">
+                <a:effectLst>
+                  <a:outerShdw dist="35921" dir="2700000" algn="ctr" rotWithShape="0">
+                    <a:schemeClr val="bg2"/>
+                  </a:outerShdw>
+                </a:effectLst>
+              </a14:hiddenEffects>
+            </a:ext>
+          </a:extLst>
+        </p:spPr>
+      </p:pic>
     </p:spTree>
     <p:extLst>
       <p:ext uri="{BB962C8B-B14F-4D97-AF65-F5344CB8AC3E}">
@@ -11813,11 +11736,11 @@
   <p:clrMapOvr>
     <a:masterClrMapping/>
   </p:clrMapOvr>
-  <mc:AlternateContent xmlns:mc="http://schemas.openxmlformats.org/markup-compatibility/2006">
-    <mc:Choice xmlns:p14="http://schemas.microsoft.com/office/powerpoint/2010/main" Requires="p14">
+  <mc:AlternateContent xmlns:mc="http://schemas.openxmlformats.org/markup-compatibility/2006" xmlns:p14="http://schemas.microsoft.com/office/powerpoint/2010/main">
+    <mc:Choice Requires="p14">
       <p:transition spd="slow" p14:dur="2000"/>
     </mc:Choice>
-    <mc:Fallback>
+    <mc:Fallback xmlns="">
       <p:transition spd="slow"/>
     </mc:Fallback>
   </mc:AlternateContent>
@@ -11867,11 +11790,7 @@
           <a:p>
             <a:r>
               <a:rPr lang="de-CH" dirty="0" smtClean="0"/>
-              <a:t>Alternative Mobile </a:t>
-            </a:r>
-            <a:r>
-              <a:rPr lang="de-CH" dirty="0" smtClean="0"/>
-              <a:t>Web Frameworks</a:t>
+              <a:t>Alternative Mobile Web Frameworks</a:t>
             </a:r>
             <a:endParaRPr lang="de-CH" dirty="0"/>
           </a:p>
@@ -11900,7 +11819,6 @@
               <a:rPr lang="de-CH" dirty="0" smtClean="0"/>
               <a:t> Mobile </a:t>
             </a:r>
-            <a:endParaRPr lang="de-CH" dirty="0" smtClean="0"/>
           </a:p>
           <a:p>
             <a:pPr lvl="1"/>
@@ -11916,11 +11834,7 @@
             <a:pPr lvl="1"/>
             <a:r>
               <a:rPr lang="de-CH" dirty="0" smtClean="0"/>
-              <a:t>1. Final Version seit 16. </a:t>
-            </a:r>
-            <a:r>
-              <a:rPr lang="de-CH" dirty="0" smtClean="0"/>
-              <a:t>November</a:t>
+              <a:t>1. Final Version seit 16. November</a:t>
             </a:r>
           </a:p>
           <a:p>
@@ -11929,7 +11843,6 @@
               <a:rPr lang="de-CH" dirty="0" smtClean="0"/>
               <a:t>Basierend auf HTML-Tag Erweiterungen (Attribute)</a:t>
             </a:r>
-            <a:endParaRPr lang="de-CH" dirty="0" smtClean="0"/>
           </a:p>
           <a:p>
             <a:pPr lvl="1"/>
@@ -11944,7 +11857,6 @@
               <a:rPr lang="de-CH" dirty="0" smtClean="0"/>
               <a:t>Trotzdem noch wenig Features</a:t>
             </a:r>
-            <a:endParaRPr lang="de-CH" dirty="0" smtClean="0"/>
           </a:p>
           <a:p>
             <a:endParaRPr lang="de-CH" dirty="0" smtClean="0"/>
@@ -12025,11 +11937,11 @@
   <p:clrMapOvr>
     <a:masterClrMapping/>
   </p:clrMapOvr>
-  <mc:AlternateContent xmlns:mc="http://schemas.openxmlformats.org/markup-compatibility/2006">
-    <mc:Choice xmlns:p14="http://schemas.microsoft.com/office/powerpoint/2010/main" Requires="p14">
+  <mc:AlternateContent xmlns:mc="http://schemas.openxmlformats.org/markup-compatibility/2006" xmlns:p14="http://schemas.microsoft.com/office/powerpoint/2010/main">
+    <mc:Choice Requires="p14">
       <p:transition spd="slow" p14:dur="2000"/>
     </mc:Choice>
-    <mc:Fallback>
+    <mc:Fallback xmlns="">
       <p:transition spd="slow"/>
     </mc:Fallback>
   </mc:AlternateContent>
@@ -12153,11 +12065,11 @@
   <p:clrMapOvr>
     <a:masterClrMapping/>
   </p:clrMapOvr>
-  <mc:AlternateContent xmlns:mc="http://schemas.openxmlformats.org/markup-compatibility/2006">
-    <mc:Choice xmlns:p14="http://schemas.microsoft.com/office/powerpoint/2010/main" Requires="p14">
+  <mc:AlternateContent xmlns:mc="http://schemas.openxmlformats.org/markup-compatibility/2006" xmlns:p14="http://schemas.microsoft.com/office/powerpoint/2010/main">
+    <mc:Choice Requires="p14">
       <p:transition spd="slow" p14:dur="2000"/>
     </mc:Choice>
-    <mc:Fallback>
+    <mc:Fallback xmlns="">
       <p:transition spd="slow"/>
     </mc:Fallback>
   </mc:AlternateContent>

</xml_diff>

<commit_message>
worked on presentation: sencha touch hello world, mvc
</commit_message>
<xml_diff>
--- a/_DOCUMENTATION/Presentation/Praesentation-Traildevils-XPl2.pptx
+++ b/_DOCUMENTATION/Presentation/Praesentation-Traildevils-XPl2.pptx
@@ -14574,11 +14574,7 @@
             </a:r>
             <a:r>
               <a:rPr lang="de-CH" dirty="0" smtClean="0"/>
-              <a:t> </a:t>
-            </a:r>
-            <a:r>
-              <a:rPr lang="de-CH" dirty="0" smtClean="0"/>
-              <a:t>Touch</a:t>
+              <a:t> Touch</a:t>
             </a:r>
             <a:endParaRPr lang="de-CH" dirty="0"/>
           </a:p>
@@ -14810,7 +14806,1715 @@
           <a:bodyPr/>
           <a:lstStyle/>
           <a:p>
+            <a:r>
+              <a:rPr lang="de-CH" dirty="0" smtClean="0"/>
+              <a:t>Model erstellen</a:t>
+            </a:r>
+          </a:p>
+          <a:p>
             <a:endParaRPr lang="de-CH" dirty="0"/>
+          </a:p>
+          <a:p>
+            <a:endParaRPr lang="de-CH" dirty="0" smtClean="0"/>
+          </a:p>
+          <a:p>
+            <a:endParaRPr lang="de-CH" dirty="0"/>
+          </a:p>
+          <a:p>
+            <a:endParaRPr lang="de-CH" dirty="0" smtClean="0"/>
+          </a:p>
+          <a:p>
+            <a:endParaRPr lang="de-CH" dirty="0"/>
+          </a:p>
+          <a:p>
+            <a:r>
+              <a:rPr lang="de-CH" dirty="0" smtClean="0"/>
+              <a:t>Controller erstellen</a:t>
+            </a:r>
+            <a:endParaRPr lang="de-CH" dirty="0"/>
+          </a:p>
+        </p:txBody>
+      </p:sp>
+      <p:sp>
+        <p:nvSpPr>
+          <p:cNvPr id="4" name="Content Placeholder 2"/>
+          <p:cNvSpPr txBox="1">
+            <a:spLocks/>
+          </p:cNvSpPr>
+          <p:nvPr/>
+        </p:nvSpPr>
+        <p:spPr>
+          <a:xfrm>
+            <a:off x="848816" y="2564904"/>
+            <a:ext cx="7467600" cy="1872207"/>
+          </a:xfrm>
+          <a:prstGeom prst="rect">
+            <a:avLst/>
+          </a:prstGeom>
+          <a:solidFill>
+            <a:schemeClr val="bg1"/>
+          </a:solidFill>
+          <a:ln w="19050">
+            <a:solidFill>
+              <a:schemeClr val="bg1">
+                <a:lumMod val="50000"/>
+              </a:schemeClr>
+            </a:solidFill>
+            <a:prstDash val="solid"/>
+          </a:ln>
+        </p:spPr>
+        <p:txBody>
+          <a:bodyPr vert="horz" lIns="180000" tIns="108000" rIns="180000" bIns="108000" rtlCol="0">
+            <a:noAutofit/>
+          </a:bodyPr>
+          <a:lstStyle>
+            <a:lvl1pPr marL="228600" indent="-228600" algn="l" defTabSz="457200" rtl="0" eaLnBrk="1" latinLnBrk="0" hangingPunct="1">
+              <a:spcBef>
+                <a:spcPct val="20000"/>
+              </a:spcBef>
+              <a:buClr>
+                <a:schemeClr val="accent1"/>
+              </a:buClr>
+              <a:buSzPct val="95000"/>
+              <a:buFont typeface="Rage Italic" pitchFamily="66" charset="0"/>
+              <a:buChar char="0"/>
+              <a:defRPr sz="2400" kern="1200">
+                <a:solidFill>
+                  <a:schemeClr val="tx1">
+                    <a:lumMod val="75000"/>
+                    <a:lumOff val="25000"/>
+                  </a:schemeClr>
+                </a:solidFill>
+                <a:latin typeface="+mn-lt"/>
+                <a:ea typeface="+mn-ea"/>
+                <a:cs typeface="+mn-cs"/>
+              </a:defRPr>
+            </a:lvl1pPr>
+            <a:lvl2pPr marL="557784" indent="-228600" algn="l" defTabSz="457200" rtl="0" eaLnBrk="1" latinLnBrk="0" hangingPunct="1">
+              <a:spcBef>
+                <a:spcPct val="20000"/>
+              </a:spcBef>
+              <a:buClr>
+                <a:schemeClr val="accent1"/>
+              </a:buClr>
+              <a:buSzPct val="95000"/>
+              <a:buFont typeface="Rage Italic" pitchFamily="66" charset="0"/>
+              <a:buChar char="0"/>
+              <a:defRPr sz="2200" kern="1200">
+                <a:solidFill>
+                  <a:schemeClr val="tx1">
+                    <a:lumMod val="75000"/>
+                    <a:lumOff val="25000"/>
+                  </a:schemeClr>
+                </a:solidFill>
+                <a:latin typeface="+mn-lt"/>
+                <a:ea typeface="+mn-ea"/>
+                <a:cs typeface="+mn-cs"/>
+              </a:defRPr>
+            </a:lvl2pPr>
+            <a:lvl3pPr marL="822960" indent="-182880" algn="l" defTabSz="457200" rtl="0" eaLnBrk="1" latinLnBrk="0" hangingPunct="1">
+              <a:spcBef>
+                <a:spcPct val="20000"/>
+              </a:spcBef>
+              <a:buClr>
+                <a:schemeClr val="accent1"/>
+              </a:buClr>
+              <a:buSzPct val="95000"/>
+              <a:buFont typeface="Rage Italic" pitchFamily="66" charset="0"/>
+              <a:buChar char="0"/>
+              <a:defRPr sz="2000" kern="1200">
+                <a:solidFill>
+                  <a:schemeClr val="tx1">
+                    <a:lumMod val="75000"/>
+                    <a:lumOff val="25000"/>
+                  </a:schemeClr>
+                </a:solidFill>
+                <a:latin typeface="+mn-lt"/>
+                <a:ea typeface="+mn-ea"/>
+                <a:cs typeface="+mn-cs"/>
+              </a:defRPr>
+            </a:lvl3pPr>
+            <a:lvl4pPr marL="1097280" indent="-182880" algn="l" defTabSz="457200" rtl="0" eaLnBrk="1" latinLnBrk="0" hangingPunct="1">
+              <a:spcBef>
+                <a:spcPct val="20000"/>
+              </a:spcBef>
+              <a:buClr>
+                <a:schemeClr val="accent1"/>
+              </a:buClr>
+              <a:buSzPct val="95000"/>
+              <a:buFont typeface="Rage Italic" pitchFamily="66" charset="0"/>
+              <a:buChar char="0"/>
+              <a:defRPr sz="1600" kern="1200">
+                <a:solidFill>
+                  <a:schemeClr val="tx1">
+                    <a:lumMod val="75000"/>
+                    <a:lumOff val="25000"/>
+                  </a:schemeClr>
+                </a:solidFill>
+                <a:latin typeface="+mn-lt"/>
+                <a:ea typeface="+mn-ea"/>
+                <a:cs typeface="+mn-cs"/>
+              </a:defRPr>
+            </a:lvl4pPr>
+            <a:lvl5pPr marL="1417320" indent="-182880" algn="l" defTabSz="457200" rtl="0" eaLnBrk="1" latinLnBrk="0" hangingPunct="1">
+              <a:spcBef>
+                <a:spcPct val="20000"/>
+              </a:spcBef>
+              <a:buClr>
+                <a:schemeClr val="accent1"/>
+              </a:buClr>
+              <a:buSzPct val="95000"/>
+              <a:buFont typeface="Rage Italic" pitchFamily="66" charset="0"/>
+              <a:buChar char="0"/>
+              <a:defRPr sz="1400" kern="1200" baseline="0">
+                <a:solidFill>
+                  <a:schemeClr val="tx1">
+                    <a:lumMod val="75000"/>
+                    <a:lumOff val="25000"/>
+                  </a:schemeClr>
+                </a:solidFill>
+                <a:latin typeface="+mn-lt"/>
+                <a:ea typeface="+mn-ea"/>
+                <a:cs typeface="+mn-cs"/>
+              </a:defRPr>
+            </a:lvl5pPr>
+            <a:lvl6pPr marL="1645920" indent="-182880" algn="l" defTabSz="457200" rtl="0" eaLnBrk="1" latinLnBrk="0" hangingPunct="1">
+              <a:spcBef>
+                <a:spcPct val="20000"/>
+              </a:spcBef>
+              <a:buClr>
+                <a:schemeClr val="accent1"/>
+              </a:buClr>
+              <a:buSzPct val="95000"/>
+              <a:buFont typeface="Rage Italic" pitchFamily="66" charset="0"/>
+              <a:buChar char="0"/>
+              <a:defRPr sz="1400" kern="1200">
+                <a:solidFill>
+                  <a:schemeClr val="tx1">
+                    <a:lumMod val="75000"/>
+                    <a:lumOff val="25000"/>
+                  </a:schemeClr>
+                </a:solidFill>
+                <a:latin typeface="+mn-lt"/>
+                <a:ea typeface="+mn-ea"/>
+                <a:cs typeface="+mn-cs"/>
+              </a:defRPr>
+            </a:lvl6pPr>
+            <a:lvl7pPr marL="1920240" indent="-182880" algn="l" defTabSz="457200" rtl="0" eaLnBrk="1" latinLnBrk="0" hangingPunct="1">
+              <a:spcBef>
+                <a:spcPct val="20000"/>
+              </a:spcBef>
+              <a:buClr>
+                <a:schemeClr val="accent1"/>
+              </a:buClr>
+              <a:buSzPct val="95000"/>
+              <a:buFont typeface="Rage Italic" pitchFamily="66" charset="0"/>
+              <a:buChar char="0"/>
+              <a:defRPr sz="1400" kern="1200">
+                <a:solidFill>
+                  <a:schemeClr val="tx1">
+                    <a:lumMod val="75000"/>
+                    <a:lumOff val="25000"/>
+                  </a:schemeClr>
+                </a:solidFill>
+                <a:latin typeface="+mn-lt"/>
+                <a:ea typeface="+mn-ea"/>
+                <a:cs typeface="+mn-cs"/>
+              </a:defRPr>
+            </a:lvl7pPr>
+            <a:lvl8pPr marL="2194560" indent="-182880" algn="l" defTabSz="457200" rtl="0" eaLnBrk="1" latinLnBrk="0" hangingPunct="1">
+              <a:spcBef>
+                <a:spcPct val="20000"/>
+              </a:spcBef>
+              <a:buClr>
+                <a:schemeClr val="accent1"/>
+              </a:buClr>
+              <a:buSzPct val="95000"/>
+              <a:buFont typeface="Rage Italic" pitchFamily="66" charset="0"/>
+              <a:buChar char="0"/>
+              <a:defRPr sz="1400" kern="1200">
+                <a:solidFill>
+                  <a:schemeClr val="tx1">
+                    <a:lumMod val="75000"/>
+                    <a:lumOff val="25000"/>
+                  </a:schemeClr>
+                </a:solidFill>
+                <a:latin typeface="+mn-lt"/>
+                <a:ea typeface="+mn-ea"/>
+                <a:cs typeface="+mn-cs"/>
+              </a:defRPr>
+            </a:lvl8pPr>
+            <a:lvl9pPr marL="2468880" indent="-182880" algn="l" defTabSz="457200" rtl="0" eaLnBrk="1" latinLnBrk="0" hangingPunct="1">
+              <a:spcBef>
+                <a:spcPct val="20000"/>
+              </a:spcBef>
+              <a:buClr>
+                <a:schemeClr val="accent1"/>
+              </a:buClr>
+              <a:buSzPct val="95000"/>
+              <a:buFont typeface="Rage Italic" pitchFamily="66" charset="0"/>
+              <a:buChar char="0"/>
+              <a:defRPr sz="1400" kern="1200">
+                <a:solidFill>
+                  <a:schemeClr val="tx1">
+                    <a:lumMod val="75000"/>
+                    <a:lumOff val="25000"/>
+                  </a:schemeClr>
+                </a:solidFill>
+                <a:latin typeface="+mn-lt"/>
+                <a:ea typeface="+mn-ea"/>
+                <a:cs typeface="+mn-cs"/>
+              </a:defRPr>
+            </a:lvl9pPr>
+          </a:lstStyle>
+          <a:p>
+            <a:pPr marL="0" indent="0">
+              <a:lnSpc>
+                <a:spcPct val="115000"/>
+              </a:lnSpc>
+              <a:spcAft>
+                <a:spcPts val="0"/>
+              </a:spcAft>
+              <a:buNone/>
+            </a:pPr>
+            <a:r>
+              <a:rPr lang="de-CH" sz="1200" dirty="0" err="1">
+                <a:solidFill>
+                  <a:srgbClr val="000000"/>
+                </a:solidFill>
+                <a:latin typeface="Courier New" pitchFamily="49" charset="0"/>
+                <a:ea typeface="Calibri"/>
+                <a:cs typeface="Courier New" pitchFamily="49" charset="0"/>
+              </a:rPr>
+              <a:t>Ext</a:t>
+            </a:r>
+            <a:r>
+              <a:rPr lang="de-CH" sz="1200" b="1" dirty="0" err="1">
+                <a:solidFill>
+                  <a:srgbClr val="000000"/>
+                </a:solidFill>
+                <a:latin typeface="Courier New" pitchFamily="49" charset="0"/>
+                <a:ea typeface="Calibri"/>
+                <a:cs typeface="Courier New" pitchFamily="49" charset="0"/>
+              </a:rPr>
+              <a:t>.</a:t>
+            </a:r>
+            <a:r>
+              <a:rPr lang="de-CH" sz="1200" dirty="0" err="1">
+                <a:solidFill>
+                  <a:srgbClr val="000000"/>
+                </a:solidFill>
+                <a:latin typeface="Courier New" pitchFamily="49" charset="0"/>
+                <a:ea typeface="Calibri"/>
+                <a:cs typeface="Courier New" pitchFamily="49" charset="0"/>
+              </a:rPr>
+              <a:t>regModel</a:t>
+            </a:r>
+            <a:r>
+              <a:rPr lang="de-CH" sz="1200" b="1" dirty="0">
+                <a:solidFill>
+                  <a:srgbClr val="000000"/>
+                </a:solidFill>
+                <a:latin typeface="Courier New" pitchFamily="49" charset="0"/>
+                <a:ea typeface="Calibri"/>
+                <a:cs typeface="Courier New" pitchFamily="49" charset="0"/>
+              </a:rPr>
+              <a:t>(</a:t>
+            </a:r>
+            <a:r>
+              <a:rPr lang="de-CH" sz="1200" dirty="0">
+                <a:solidFill>
+                  <a:srgbClr val="808080"/>
+                </a:solidFill>
+                <a:latin typeface="Courier New" pitchFamily="49" charset="0"/>
+                <a:ea typeface="Calibri"/>
+                <a:cs typeface="Courier New" pitchFamily="49" charset="0"/>
+              </a:rPr>
+              <a:t>'</a:t>
+            </a:r>
+            <a:r>
+              <a:rPr lang="de-CH" sz="1200" dirty="0" err="1">
+                <a:solidFill>
+                  <a:srgbClr val="808080"/>
+                </a:solidFill>
+                <a:latin typeface="Courier New" pitchFamily="49" charset="0"/>
+                <a:ea typeface="Calibri"/>
+                <a:cs typeface="Courier New" pitchFamily="49" charset="0"/>
+              </a:rPr>
+              <a:t>Trail</a:t>
+            </a:r>
+            <a:r>
+              <a:rPr lang="de-CH" sz="1200" dirty="0">
+                <a:solidFill>
+                  <a:srgbClr val="808080"/>
+                </a:solidFill>
+                <a:latin typeface="Courier New" pitchFamily="49" charset="0"/>
+                <a:ea typeface="Calibri"/>
+                <a:cs typeface="Courier New" pitchFamily="49" charset="0"/>
+              </a:rPr>
+              <a:t>'</a:t>
+            </a:r>
+            <a:r>
+              <a:rPr lang="de-CH" sz="1200" b="1" dirty="0">
+                <a:solidFill>
+                  <a:srgbClr val="000000"/>
+                </a:solidFill>
+                <a:latin typeface="Courier New" pitchFamily="49" charset="0"/>
+                <a:ea typeface="Calibri"/>
+                <a:cs typeface="Courier New" pitchFamily="49" charset="0"/>
+              </a:rPr>
+              <a:t>,</a:t>
+            </a:r>
+            <a:r>
+              <a:rPr lang="de-CH" sz="1200" dirty="0">
+                <a:solidFill>
+                  <a:srgbClr val="000000"/>
+                </a:solidFill>
+                <a:latin typeface="Courier New" pitchFamily="49" charset="0"/>
+                <a:ea typeface="Calibri"/>
+                <a:cs typeface="Courier New" pitchFamily="49" charset="0"/>
+              </a:rPr>
+              <a:t> </a:t>
+            </a:r>
+            <a:r>
+              <a:rPr lang="de-CH" sz="1200" b="1" dirty="0">
+                <a:solidFill>
+                  <a:srgbClr val="000000"/>
+                </a:solidFill>
+                <a:latin typeface="Courier New" pitchFamily="49" charset="0"/>
+                <a:ea typeface="Calibri"/>
+                <a:cs typeface="Courier New" pitchFamily="49" charset="0"/>
+              </a:rPr>
+              <a:t>{</a:t>
+            </a:r>
+            <a:endParaRPr lang="de-CH" sz="1200" dirty="0">
+              <a:latin typeface="Courier New" pitchFamily="49" charset="0"/>
+              <a:ea typeface="Calibri"/>
+              <a:cs typeface="Courier New" pitchFamily="49" charset="0"/>
+            </a:endParaRPr>
+          </a:p>
+          <a:p>
+            <a:pPr marL="0" indent="0">
+              <a:lnSpc>
+                <a:spcPct val="115000"/>
+              </a:lnSpc>
+              <a:spcAft>
+                <a:spcPts val="0"/>
+              </a:spcAft>
+              <a:buNone/>
+            </a:pPr>
+            <a:r>
+              <a:rPr lang="de-CH" sz="1200" dirty="0">
+                <a:solidFill>
+                  <a:srgbClr val="000000"/>
+                </a:solidFill>
+                <a:latin typeface="Courier New" pitchFamily="49" charset="0"/>
+                <a:ea typeface="Calibri"/>
+                <a:cs typeface="Courier New" pitchFamily="49" charset="0"/>
+              </a:rPr>
+              <a:t>	</a:t>
+            </a:r>
+            <a:r>
+              <a:rPr lang="de-CH" sz="1200" dirty="0" err="1">
+                <a:solidFill>
+                  <a:srgbClr val="000000"/>
+                </a:solidFill>
+                <a:latin typeface="Courier New" pitchFamily="49" charset="0"/>
+                <a:ea typeface="Calibri"/>
+                <a:cs typeface="Courier New" pitchFamily="49" charset="0"/>
+              </a:rPr>
+              <a:t>fields</a:t>
+            </a:r>
+            <a:r>
+              <a:rPr lang="de-CH" sz="1200" b="1" dirty="0">
+                <a:solidFill>
+                  <a:srgbClr val="000000"/>
+                </a:solidFill>
+                <a:latin typeface="Courier New" pitchFamily="49" charset="0"/>
+                <a:ea typeface="Calibri"/>
+                <a:cs typeface="Courier New" pitchFamily="49" charset="0"/>
+              </a:rPr>
+              <a:t>:</a:t>
+            </a:r>
+            <a:r>
+              <a:rPr lang="de-CH" sz="1200" dirty="0">
+                <a:solidFill>
+                  <a:srgbClr val="000000"/>
+                </a:solidFill>
+                <a:latin typeface="Courier New" pitchFamily="49" charset="0"/>
+                <a:ea typeface="Calibri"/>
+                <a:cs typeface="Courier New" pitchFamily="49" charset="0"/>
+              </a:rPr>
+              <a:t> </a:t>
+            </a:r>
+            <a:r>
+              <a:rPr lang="de-CH" sz="1200" b="1" dirty="0">
+                <a:solidFill>
+                  <a:srgbClr val="000000"/>
+                </a:solidFill>
+                <a:latin typeface="Courier New" pitchFamily="49" charset="0"/>
+                <a:ea typeface="Calibri"/>
+                <a:cs typeface="Courier New" pitchFamily="49" charset="0"/>
+              </a:rPr>
+              <a:t>[</a:t>
+            </a:r>
+            <a:endParaRPr lang="de-CH" sz="1200" dirty="0">
+              <a:latin typeface="Courier New" pitchFamily="49" charset="0"/>
+              <a:ea typeface="Calibri"/>
+              <a:cs typeface="Courier New" pitchFamily="49" charset="0"/>
+            </a:endParaRPr>
+          </a:p>
+          <a:p>
+            <a:pPr marL="0" indent="0">
+              <a:lnSpc>
+                <a:spcPct val="115000"/>
+              </a:lnSpc>
+              <a:spcAft>
+                <a:spcPts val="0"/>
+              </a:spcAft>
+              <a:buNone/>
+            </a:pPr>
+            <a:r>
+              <a:rPr lang="de-CH" sz="1200" dirty="0">
+                <a:solidFill>
+                  <a:srgbClr val="000000"/>
+                </a:solidFill>
+                <a:latin typeface="Courier New" pitchFamily="49" charset="0"/>
+                <a:ea typeface="Calibri"/>
+                <a:cs typeface="Courier New" pitchFamily="49" charset="0"/>
+              </a:rPr>
+              <a:t>		</a:t>
+            </a:r>
+            <a:r>
+              <a:rPr lang="de-CH" sz="1200" b="1" dirty="0">
+                <a:solidFill>
+                  <a:srgbClr val="000000"/>
+                </a:solidFill>
+                <a:latin typeface="Courier New" pitchFamily="49" charset="0"/>
+                <a:ea typeface="Calibri"/>
+                <a:cs typeface="Courier New" pitchFamily="49" charset="0"/>
+              </a:rPr>
+              <a:t>{</a:t>
+            </a:r>
+            <a:r>
+              <a:rPr lang="de-CH" sz="1200" dirty="0">
+                <a:solidFill>
+                  <a:srgbClr val="000000"/>
+                </a:solidFill>
+                <a:latin typeface="Courier New" pitchFamily="49" charset="0"/>
+                <a:ea typeface="Calibri"/>
+                <a:cs typeface="Courier New" pitchFamily="49" charset="0"/>
+              </a:rPr>
+              <a:t> </a:t>
+            </a:r>
+            <a:r>
+              <a:rPr lang="de-CH" sz="1200" dirty="0" err="1">
+                <a:solidFill>
+                  <a:srgbClr val="000000"/>
+                </a:solidFill>
+                <a:latin typeface="Courier New" pitchFamily="49" charset="0"/>
+                <a:ea typeface="Calibri"/>
+                <a:cs typeface="Courier New" pitchFamily="49" charset="0"/>
+              </a:rPr>
+              <a:t>name</a:t>
+            </a:r>
+            <a:r>
+              <a:rPr lang="de-CH" sz="1200" b="1" dirty="0">
+                <a:solidFill>
+                  <a:srgbClr val="000000"/>
+                </a:solidFill>
+                <a:latin typeface="Courier New" pitchFamily="49" charset="0"/>
+                <a:ea typeface="Calibri"/>
+                <a:cs typeface="Courier New" pitchFamily="49" charset="0"/>
+              </a:rPr>
+              <a:t>:</a:t>
+            </a:r>
+            <a:r>
+              <a:rPr lang="de-CH" sz="1200" dirty="0">
+                <a:solidFill>
+                  <a:srgbClr val="000000"/>
+                </a:solidFill>
+                <a:latin typeface="Courier New" pitchFamily="49" charset="0"/>
+                <a:ea typeface="Calibri"/>
+                <a:cs typeface="Courier New" pitchFamily="49" charset="0"/>
+              </a:rPr>
+              <a:t> </a:t>
+            </a:r>
+            <a:r>
+              <a:rPr lang="de-CH" sz="1200" dirty="0">
+                <a:solidFill>
+                  <a:srgbClr val="808080"/>
+                </a:solidFill>
+                <a:latin typeface="Courier New" pitchFamily="49" charset="0"/>
+                <a:ea typeface="Calibri"/>
+                <a:cs typeface="Courier New" pitchFamily="49" charset="0"/>
+              </a:rPr>
+              <a:t>'</a:t>
+            </a:r>
+            <a:r>
+              <a:rPr lang="de-CH" sz="1200" dirty="0" err="1">
+                <a:solidFill>
+                  <a:srgbClr val="808080"/>
+                </a:solidFill>
+                <a:latin typeface="Courier New" pitchFamily="49" charset="0"/>
+                <a:ea typeface="Calibri"/>
+                <a:cs typeface="Courier New" pitchFamily="49" charset="0"/>
+              </a:rPr>
+              <a:t>id</a:t>
+            </a:r>
+            <a:r>
+              <a:rPr lang="de-CH" sz="1200" dirty="0">
+                <a:solidFill>
+                  <a:srgbClr val="808080"/>
+                </a:solidFill>
+                <a:latin typeface="Courier New" pitchFamily="49" charset="0"/>
+                <a:ea typeface="Calibri"/>
+                <a:cs typeface="Courier New" pitchFamily="49" charset="0"/>
+              </a:rPr>
+              <a:t>'</a:t>
+            </a:r>
+            <a:r>
+              <a:rPr lang="de-CH" sz="1200" b="1" dirty="0">
+                <a:solidFill>
+                  <a:srgbClr val="000000"/>
+                </a:solidFill>
+                <a:latin typeface="Courier New" pitchFamily="49" charset="0"/>
+                <a:ea typeface="Calibri"/>
+                <a:cs typeface="Courier New" pitchFamily="49" charset="0"/>
+              </a:rPr>
+              <a:t>,</a:t>
+            </a:r>
+            <a:r>
+              <a:rPr lang="de-CH" sz="1200" dirty="0">
+                <a:solidFill>
+                  <a:srgbClr val="000000"/>
+                </a:solidFill>
+                <a:latin typeface="Courier New" pitchFamily="49" charset="0"/>
+                <a:ea typeface="Calibri"/>
+                <a:cs typeface="Courier New" pitchFamily="49" charset="0"/>
+              </a:rPr>
+              <a:t> type</a:t>
+            </a:r>
+            <a:r>
+              <a:rPr lang="de-CH" sz="1200" b="1" dirty="0">
+                <a:solidFill>
+                  <a:srgbClr val="000000"/>
+                </a:solidFill>
+                <a:latin typeface="Courier New" pitchFamily="49" charset="0"/>
+                <a:ea typeface="Calibri"/>
+                <a:cs typeface="Courier New" pitchFamily="49" charset="0"/>
+              </a:rPr>
+              <a:t>:</a:t>
+            </a:r>
+            <a:r>
+              <a:rPr lang="de-CH" sz="1200" dirty="0">
+                <a:solidFill>
+                  <a:srgbClr val="000000"/>
+                </a:solidFill>
+                <a:latin typeface="Courier New" pitchFamily="49" charset="0"/>
+                <a:ea typeface="Calibri"/>
+                <a:cs typeface="Courier New" pitchFamily="49" charset="0"/>
+              </a:rPr>
+              <a:t> </a:t>
+            </a:r>
+            <a:r>
+              <a:rPr lang="de-CH" sz="1200" dirty="0">
+                <a:solidFill>
+                  <a:srgbClr val="808080"/>
+                </a:solidFill>
+                <a:latin typeface="Courier New" pitchFamily="49" charset="0"/>
+                <a:ea typeface="Calibri"/>
+                <a:cs typeface="Courier New" pitchFamily="49" charset="0"/>
+              </a:rPr>
+              <a:t>'</a:t>
+            </a:r>
+            <a:r>
+              <a:rPr lang="de-CH" sz="1200" dirty="0" err="1">
+                <a:solidFill>
+                  <a:srgbClr val="808080"/>
+                </a:solidFill>
+                <a:latin typeface="Courier New" pitchFamily="49" charset="0"/>
+                <a:ea typeface="Calibri"/>
+                <a:cs typeface="Courier New" pitchFamily="49" charset="0"/>
+              </a:rPr>
+              <a:t>int</a:t>
+            </a:r>
+            <a:r>
+              <a:rPr lang="de-CH" sz="1200" dirty="0">
+                <a:solidFill>
+                  <a:srgbClr val="808080"/>
+                </a:solidFill>
+                <a:latin typeface="Courier New" pitchFamily="49" charset="0"/>
+                <a:ea typeface="Calibri"/>
+                <a:cs typeface="Courier New" pitchFamily="49" charset="0"/>
+              </a:rPr>
+              <a:t>'</a:t>
+            </a:r>
+            <a:r>
+              <a:rPr lang="de-CH" sz="1200" dirty="0">
+                <a:solidFill>
+                  <a:srgbClr val="000000"/>
+                </a:solidFill>
+                <a:latin typeface="Courier New" pitchFamily="49" charset="0"/>
+                <a:ea typeface="Calibri"/>
+                <a:cs typeface="Courier New" pitchFamily="49" charset="0"/>
+              </a:rPr>
+              <a:t> </a:t>
+            </a:r>
+            <a:r>
+              <a:rPr lang="de-CH" sz="1200" b="1" dirty="0">
+                <a:solidFill>
+                  <a:srgbClr val="000000"/>
+                </a:solidFill>
+                <a:latin typeface="Courier New" pitchFamily="49" charset="0"/>
+                <a:ea typeface="Calibri"/>
+                <a:cs typeface="Courier New" pitchFamily="49" charset="0"/>
+              </a:rPr>
+              <a:t>},</a:t>
+            </a:r>
+            <a:endParaRPr lang="de-CH" sz="1200" dirty="0">
+              <a:latin typeface="Courier New" pitchFamily="49" charset="0"/>
+              <a:ea typeface="Calibri"/>
+              <a:cs typeface="Courier New" pitchFamily="49" charset="0"/>
+            </a:endParaRPr>
+          </a:p>
+          <a:p>
+            <a:pPr marL="0" indent="0">
+              <a:lnSpc>
+                <a:spcPct val="115000"/>
+              </a:lnSpc>
+              <a:spcAft>
+                <a:spcPts val="0"/>
+              </a:spcAft>
+              <a:buNone/>
+            </a:pPr>
+            <a:r>
+              <a:rPr lang="de-CH" sz="1200" dirty="0">
+                <a:solidFill>
+                  <a:srgbClr val="000000"/>
+                </a:solidFill>
+                <a:latin typeface="Courier New" pitchFamily="49" charset="0"/>
+                <a:ea typeface="Calibri"/>
+                <a:cs typeface="Courier New" pitchFamily="49" charset="0"/>
+              </a:rPr>
+              <a:t>		</a:t>
+            </a:r>
+            <a:r>
+              <a:rPr lang="de-CH" sz="1200" b="1" dirty="0" smtClean="0">
+                <a:solidFill>
+                  <a:srgbClr val="000000"/>
+                </a:solidFill>
+                <a:latin typeface="Courier New" pitchFamily="49" charset="0"/>
+                <a:ea typeface="Calibri"/>
+                <a:cs typeface="Courier New" pitchFamily="49" charset="0"/>
+              </a:rPr>
+              <a:t>{</a:t>
+            </a:r>
+            <a:r>
+              <a:rPr lang="de-CH" sz="1200" dirty="0" smtClean="0">
+                <a:solidFill>
+                  <a:srgbClr val="000000"/>
+                </a:solidFill>
+                <a:latin typeface="Courier New" pitchFamily="49" charset="0"/>
+                <a:ea typeface="Calibri"/>
+                <a:cs typeface="Courier New" pitchFamily="49" charset="0"/>
+              </a:rPr>
+              <a:t> </a:t>
+            </a:r>
+            <a:r>
+              <a:rPr lang="de-CH" sz="1200" dirty="0" err="1">
+                <a:solidFill>
+                  <a:srgbClr val="000000"/>
+                </a:solidFill>
+                <a:latin typeface="Courier New" pitchFamily="49" charset="0"/>
+                <a:ea typeface="Calibri"/>
+                <a:cs typeface="Courier New" pitchFamily="49" charset="0"/>
+              </a:rPr>
+              <a:t>name</a:t>
+            </a:r>
+            <a:r>
+              <a:rPr lang="de-CH" sz="1200" b="1" dirty="0">
+                <a:solidFill>
+                  <a:srgbClr val="000000"/>
+                </a:solidFill>
+                <a:latin typeface="Courier New" pitchFamily="49" charset="0"/>
+                <a:ea typeface="Calibri"/>
+                <a:cs typeface="Courier New" pitchFamily="49" charset="0"/>
+              </a:rPr>
+              <a:t>:</a:t>
+            </a:r>
+            <a:r>
+              <a:rPr lang="de-CH" sz="1200" dirty="0">
+                <a:solidFill>
+                  <a:srgbClr val="000000"/>
+                </a:solidFill>
+                <a:latin typeface="Courier New" pitchFamily="49" charset="0"/>
+                <a:ea typeface="Calibri"/>
+                <a:cs typeface="Courier New" pitchFamily="49" charset="0"/>
+              </a:rPr>
+              <a:t> </a:t>
+            </a:r>
+            <a:r>
+              <a:rPr lang="de-CH" sz="1200" dirty="0">
+                <a:solidFill>
+                  <a:srgbClr val="808080"/>
+                </a:solidFill>
+                <a:latin typeface="Courier New" pitchFamily="49" charset="0"/>
+                <a:ea typeface="Calibri"/>
+                <a:cs typeface="Courier New" pitchFamily="49" charset="0"/>
+              </a:rPr>
+              <a:t>'title'</a:t>
+            </a:r>
+            <a:r>
+              <a:rPr lang="de-CH" sz="1200" b="1" dirty="0">
+                <a:solidFill>
+                  <a:srgbClr val="000000"/>
+                </a:solidFill>
+                <a:latin typeface="Courier New" pitchFamily="49" charset="0"/>
+                <a:ea typeface="Calibri"/>
+                <a:cs typeface="Courier New" pitchFamily="49" charset="0"/>
+              </a:rPr>
+              <a:t>,</a:t>
+            </a:r>
+            <a:r>
+              <a:rPr lang="de-CH" sz="1200" dirty="0">
+                <a:solidFill>
+                  <a:srgbClr val="000000"/>
+                </a:solidFill>
+                <a:latin typeface="Courier New" pitchFamily="49" charset="0"/>
+                <a:ea typeface="Calibri"/>
+                <a:cs typeface="Courier New" pitchFamily="49" charset="0"/>
+              </a:rPr>
+              <a:t> type</a:t>
+            </a:r>
+            <a:r>
+              <a:rPr lang="de-CH" sz="1200" b="1" dirty="0">
+                <a:solidFill>
+                  <a:srgbClr val="000000"/>
+                </a:solidFill>
+                <a:latin typeface="Courier New" pitchFamily="49" charset="0"/>
+                <a:ea typeface="Calibri"/>
+                <a:cs typeface="Courier New" pitchFamily="49" charset="0"/>
+              </a:rPr>
+              <a:t>:</a:t>
+            </a:r>
+            <a:r>
+              <a:rPr lang="de-CH" sz="1200" dirty="0">
+                <a:solidFill>
+                  <a:srgbClr val="000000"/>
+                </a:solidFill>
+                <a:latin typeface="Courier New" pitchFamily="49" charset="0"/>
+                <a:ea typeface="Calibri"/>
+                <a:cs typeface="Courier New" pitchFamily="49" charset="0"/>
+              </a:rPr>
+              <a:t> </a:t>
+            </a:r>
+            <a:r>
+              <a:rPr lang="de-CH" sz="1200" dirty="0">
+                <a:solidFill>
+                  <a:srgbClr val="808080"/>
+                </a:solidFill>
+                <a:latin typeface="Courier New" pitchFamily="49" charset="0"/>
+                <a:ea typeface="Calibri"/>
+                <a:cs typeface="Courier New" pitchFamily="49" charset="0"/>
+              </a:rPr>
+              <a:t>'</a:t>
+            </a:r>
+            <a:r>
+              <a:rPr lang="de-CH" sz="1200" dirty="0" err="1">
+                <a:solidFill>
+                  <a:srgbClr val="808080"/>
+                </a:solidFill>
+                <a:latin typeface="Courier New" pitchFamily="49" charset="0"/>
+                <a:ea typeface="Calibri"/>
+                <a:cs typeface="Courier New" pitchFamily="49" charset="0"/>
+              </a:rPr>
+              <a:t>string</a:t>
+            </a:r>
+            <a:r>
+              <a:rPr lang="de-CH" sz="1200" dirty="0">
+                <a:solidFill>
+                  <a:srgbClr val="808080"/>
+                </a:solidFill>
+                <a:latin typeface="Courier New" pitchFamily="49" charset="0"/>
+                <a:ea typeface="Calibri"/>
+                <a:cs typeface="Courier New" pitchFamily="49" charset="0"/>
+              </a:rPr>
+              <a:t>'</a:t>
+            </a:r>
+            <a:r>
+              <a:rPr lang="de-CH" sz="1200" dirty="0">
+                <a:solidFill>
+                  <a:srgbClr val="000000"/>
+                </a:solidFill>
+                <a:latin typeface="Courier New" pitchFamily="49" charset="0"/>
+                <a:ea typeface="Calibri"/>
+                <a:cs typeface="Courier New" pitchFamily="49" charset="0"/>
+              </a:rPr>
+              <a:t> </a:t>
+            </a:r>
+            <a:r>
+              <a:rPr lang="de-CH" sz="1200" b="1" dirty="0">
+                <a:solidFill>
+                  <a:srgbClr val="000000"/>
+                </a:solidFill>
+                <a:latin typeface="Courier New" pitchFamily="49" charset="0"/>
+                <a:ea typeface="Calibri"/>
+                <a:cs typeface="Courier New" pitchFamily="49" charset="0"/>
+              </a:rPr>
+              <a:t>},</a:t>
+            </a:r>
+            <a:endParaRPr lang="de-CH" sz="1200" dirty="0">
+              <a:latin typeface="Courier New" pitchFamily="49" charset="0"/>
+              <a:ea typeface="Calibri"/>
+              <a:cs typeface="Courier New" pitchFamily="49" charset="0"/>
+            </a:endParaRPr>
+          </a:p>
+          <a:p>
+            <a:pPr marL="0" indent="0">
+              <a:lnSpc>
+                <a:spcPct val="115000"/>
+              </a:lnSpc>
+              <a:spcAft>
+                <a:spcPts val="0"/>
+              </a:spcAft>
+              <a:buNone/>
+            </a:pPr>
+            <a:r>
+              <a:rPr lang="de-CH" sz="1200" dirty="0">
+                <a:solidFill>
+                  <a:srgbClr val="000000"/>
+                </a:solidFill>
+                <a:latin typeface="Courier New" pitchFamily="49" charset="0"/>
+                <a:ea typeface="Calibri"/>
+                <a:cs typeface="Courier New" pitchFamily="49" charset="0"/>
+              </a:rPr>
+              <a:t>	</a:t>
+            </a:r>
+            <a:r>
+              <a:rPr lang="de-CH" sz="1200" b="1" dirty="0">
+                <a:solidFill>
+                  <a:srgbClr val="000000"/>
+                </a:solidFill>
+                <a:latin typeface="Courier New" pitchFamily="49" charset="0"/>
+                <a:ea typeface="Calibri"/>
+                <a:cs typeface="Courier New" pitchFamily="49" charset="0"/>
+              </a:rPr>
+              <a:t>],</a:t>
+            </a:r>
+            <a:endParaRPr lang="de-CH" sz="1200" dirty="0">
+              <a:latin typeface="Courier New" pitchFamily="49" charset="0"/>
+              <a:ea typeface="Calibri"/>
+              <a:cs typeface="Courier New" pitchFamily="49" charset="0"/>
+            </a:endParaRPr>
+          </a:p>
+          <a:p>
+            <a:pPr marL="0" indent="0">
+              <a:lnSpc>
+                <a:spcPct val="115000"/>
+              </a:lnSpc>
+              <a:spcAft>
+                <a:spcPts val="0"/>
+              </a:spcAft>
+              <a:buNone/>
+            </a:pPr>
+            <a:r>
+              <a:rPr lang="de-CH" sz="1200" dirty="0">
+                <a:solidFill>
+                  <a:srgbClr val="000000"/>
+                </a:solidFill>
+                <a:latin typeface="Courier New" pitchFamily="49" charset="0"/>
+                <a:ea typeface="Calibri"/>
+                <a:cs typeface="Courier New" pitchFamily="49" charset="0"/>
+              </a:rPr>
+              <a:t>	</a:t>
+            </a:r>
+            <a:r>
+              <a:rPr lang="de-CH" sz="1200" dirty="0" err="1">
+                <a:solidFill>
+                  <a:srgbClr val="000000"/>
+                </a:solidFill>
+                <a:latin typeface="Courier New" pitchFamily="49" charset="0"/>
+                <a:ea typeface="Calibri"/>
+                <a:cs typeface="Courier New" pitchFamily="49" charset="0"/>
+              </a:rPr>
+              <a:t>hasMany</a:t>
+            </a:r>
+            <a:r>
+              <a:rPr lang="de-CH" sz="1200" b="1" dirty="0">
+                <a:solidFill>
+                  <a:srgbClr val="000000"/>
+                </a:solidFill>
+                <a:latin typeface="Courier New" pitchFamily="49" charset="0"/>
+                <a:ea typeface="Calibri"/>
+                <a:cs typeface="Courier New" pitchFamily="49" charset="0"/>
+              </a:rPr>
+              <a:t>:</a:t>
+            </a:r>
+            <a:r>
+              <a:rPr lang="de-CH" sz="1200" dirty="0">
+                <a:solidFill>
+                  <a:srgbClr val="000000"/>
+                </a:solidFill>
+                <a:latin typeface="Courier New" pitchFamily="49" charset="0"/>
+                <a:ea typeface="Calibri"/>
+                <a:cs typeface="Courier New" pitchFamily="49" charset="0"/>
+              </a:rPr>
+              <a:t> </a:t>
+            </a:r>
+            <a:r>
+              <a:rPr lang="de-CH" sz="1200" b="1" dirty="0">
+                <a:solidFill>
+                  <a:srgbClr val="000000"/>
+                </a:solidFill>
+                <a:latin typeface="Courier New" pitchFamily="49" charset="0"/>
+                <a:ea typeface="Calibri"/>
+                <a:cs typeface="Courier New" pitchFamily="49" charset="0"/>
+              </a:rPr>
+              <a:t>{</a:t>
+            </a:r>
+            <a:r>
+              <a:rPr lang="de-CH" sz="1200" dirty="0">
+                <a:solidFill>
+                  <a:srgbClr val="000000"/>
+                </a:solidFill>
+                <a:latin typeface="Courier New" pitchFamily="49" charset="0"/>
+                <a:ea typeface="Calibri"/>
+                <a:cs typeface="Courier New" pitchFamily="49" charset="0"/>
+              </a:rPr>
+              <a:t> </a:t>
+            </a:r>
+            <a:r>
+              <a:rPr lang="de-CH" sz="1200" dirty="0" err="1">
+                <a:solidFill>
+                  <a:srgbClr val="000000"/>
+                </a:solidFill>
+                <a:latin typeface="Courier New" pitchFamily="49" charset="0"/>
+                <a:ea typeface="Calibri"/>
+                <a:cs typeface="Courier New" pitchFamily="49" charset="0"/>
+              </a:rPr>
+              <a:t>model</a:t>
+            </a:r>
+            <a:r>
+              <a:rPr lang="de-CH" sz="1200" b="1" dirty="0">
+                <a:solidFill>
+                  <a:srgbClr val="000000"/>
+                </a:solidFill>
+                <a:latin typeface="Courier New" pitchFamily="49" charset="0"/>
+                <a:ea typeface="Calibri"/>
+                <a:cs typeface="Courier New" pitchFamily="49" charset="0"/>
+              </a:rPr>
+              <a:t>:</a:t>
+            </a:r>
+            <a:r>
+              <a:rPr lang="de-CH" sz="1200" dirty="0">
+                <a:solidFill>
+                  <a:srgbClr val="000000"/>
+                </a:solidFill>
+                <a:latin typeface="Courier New" pitchFamily="49" charset="0"/>
+                <a:ea typeface="Calibri"/>
+                <a:cs typeface="Courier New" pitchFamily="49" charset="0"/>
+              </a:rPr>
+              <a:t> </a:t>
+            </a:r>
+            <a:r>
+              <a:rPr lang="de-CH" sz="1200" dirty="0">
+                <a:solidFill>
+                  <a:srgbClr val="808080"/>
+                </a:solidFill>
+                <a:latin typeface="Courier New" pitchFamily="49" charset="0"/>
+                <a:ea typeface="Calibri"/>
+                <a:cs typeface="Courier New" pitchFamily="49" charset="0"/>
+              </a:rPr>
+              <a:t>'Type'</a:t>
+            </a:r>
+            <a:r>
+              <a:rPr lang="de-CH" sz="1200" b="1" dirty="0">
+                <a:solidFill>
+                  <a:srgbClr val="000000"/>
+                </a:solidFill>
+                <a:latin typeface="Courier New" pitchFamily="49" charset="0"/>
+                <a:ea typeface="Calibri"/>
+                <a:cs typeface="Courier New" pitchFamily="49" charset="0"/>
+              </a:rPr>
+              <a:t>,</a:t>
+            </a:r>
+            <a:r>
+              <a:rPr lang="de-CH" sz="1200" dirty="0">
+                <a:solidFill>
+                  <a:srgbClr val="000000"/>
+                </a:solidFill>
+                <a:latin typeface="Courier New" pitchFamily="49" charset="0"/>
+                <a:ea typeface="Calibri"/>
+                <a:cs typeface="Courier New" pitchFamily="49" charset="0"/>
+              </a:rPr>
+              <a:t> </a:t>
+            </a:r>
+            <a:r>
+              <a:rPr lang="de-CH" sz="1200" dirty="0" err="1">
+                <a:solidFill>
+                  <a:srgbClr val="000000"/>
+                </a:solidFill>
+                <a:latin typeface="Courier New" pitchFamily="49" charset="0"/>
+                <a:ea typeface="Calibri"/>
+                <a:cs typeface="Courier New" pitchFamily="49" charset="0"/>
+              </a:rPr>
+              <a:t>name</a:t>
+            </a:r>
+            <a:r>
+              <a:rPr lang="de-CH" sz="1200" b="1" dirty="0">
+                <a:solidFill>
+                  <a:srgbClr val="000000"/>
+                </a:solidFill>
+                <a:latin typeface="Courier New" pitchFamily="49" charset="0"/>
+                <a:ea typeface="Calibri"/>
+                <a:cs typeface="Courier New" pitchFamily="49" charset="0"/>
+              </a:rPr>
+              <a:t>:</a:t>
+            </a:r>
+            <a:r>
+              <a:rPr lang="de-CH" sz="1200" dirty="0">
+                <a:solidFill>
+                  <a:srgbClr val="000000"/>
+                </a:solidFill>
+                <a:latin typeface="Courier New" pitchFamily="49" charset="0"/>
+                <a:ea typeface="Calibri"/>
+                <a:cs typeface="Courier New" pitchFamily="49" charset="0"/>
+              </a:rPr>
+              <a:t> </a:t>
+            </a:r>
+            <a:r>
+              <a:rPr lang="de-CH" sz="1200" dirty="0">
+                <a:solidFill>
+                  <a:srgbClr val="808080"/>
+                </a:solidFill>
+                <a:latin typeface="Courier New" pitchFamily="49" charset="0"/>
+                <a:ea typeface="Calibri"/>
+                <a:cs typeface="Courier New" pitchFamily="49" charset="0"/>
+              </a:rPr>
+              <a:t>'</a:t>
+            </a:r>
+            <a:r>
+              <a:rPr lang="de-CH" sz="1200" dirty="0" err="1">
+                <a:solidFill>
+                  <a:srgbClr val="808080"/>
+                </a:solidFill>
+                <a:latin typeface="Courier New" pitchFamily="49" charset="0"/>
+                <a:ea typeface="Calibri"/>
+                <a:cs typeface="Courier New" pitchFamily="49" charset="0"/>
+              </a:rPr>
+              <a:t>types</a:t>
+            </a:r>
+            <a:r>
+              <a:rPr lang="de-CH" sz="1200" dirty="0">
+                <a:solidFill>
+                  <a:srgbClr val="808080"/>
+                </a:solidFill>
+                <a:latin typeface="Courier New" pitchFamily="49" charset="0"/>
+                <a:ea typeface="Calibri"/>
+                <a:cs typeface="Courier New" pitchFamily="49" charset="0"/>
+              </a:rPr>
+              <a:t>'</a:t>
+            </a:r>
+            <a:r>
+              <a:rPr lang="de-CH" sz="1200" dirty="0">
+                <a:solidFill>
+                  <a:srgbClr val="000000"/>
+                </a:solidFill>
+                <a:latin typeface="Courier New" pitchFamily="49" charset="0"/>
+                <a:ea typeface="Calibri"/>
+                <a:cs typeface="Courier New" pitchFamily="49" charset="0"/>
+              </a:rPr>
+              <a:t> </a:t>
+            </a:r>
+            <a:r>
+              <a:rPr lang="de-CH" sz="1200" b="1" dirty="0">
+                <a:solidFill>
+                  <a:srgbClr val="000000"/>
+                </a:solidFill>
+                <a:latin typeface="Courier New" pitchFamily="49" charset="0"/>
+                <a:ea typeface="Calibri"/>
+                <a:cs typeface="Courier New" pitchFamily="49" charset="0"/>
+              </a:rPr>
+              <a:t>}</a:t>
+            </a:r>
+            <a:endParaRPr lang="de-CH" sz="1200" dirty="0">
+              <a:latin typeface="Courier New" pitchFamily="49" charset="0"/>
+              <a:ea typeface="Calibri"/>
+              <a:cs typeface="Courier New" pitchFamily="49" charset="0"/>
+            </a:endParaRPr>
+          </a:p>
+          <a:p>
+            <a:pPr marL="0" indent="0">
+              <a:lnSpc>
+                <a:spcPct val="115000"/>
+              </a:lnSpc>
+              <a:spcAft>
+                <a:spcPts val="0"/>
+              </a:spcAft>
+              <a:buNone/>
+            </a:pPr>
+            <a:r>
+              <a:rPr lang="de-CH" sz="1200" b="1" dirty="0">
+                <a:solidFill>
+                  <a:srgbClr val="000000"/>
+                </a:solidFill>
+                <a:latin typeface="Courier New" pitchFamily="49" charset="0"/>
+                <a:ea typeface="Calibri"/>
+                <a:cs typeface="Courier New" pitchFamily="49" charset="0"/>
+              </a:rPr>
+              <a:t>});</a:t>
+            </a:r>
+            <a:endParaRPr lang="de-CH" sz="1200" dirty="0">
+              <a:latin typeface="Courier New" pitchFamily="49" charset="0"/>
+              <a:ea typeface="Calibri"/>
+              <a:cs typeface="Courier New" pitchFamily="49" charset="0"/>
+            </a:endParaRPr>
+          </a:p>
+          <a:p>
+            <a:pPr marL="0" indent="0">
+              <a:buNone/>
+            </a:pPr>
+            <a:endParaRPr lang="de-CH" sz="1600" dirty="0">
+              <a:latin typeface="Courier New" pitchFamily="49" charset="0"/>
+              <a:cs typeface="Courier New" pitchFamily="49" charset="0"/>
+            </a:endParaRPr>
+          </a:p>
+        </p:txBody>
+      </p:sp>
+      <p:sp>
+        <p:nvSpPr>
+          <p:cNvPr id="5" name="Content Placeholder 2"/>
+          <p:cNvSpPr txBox="1">
+            <a:spLocks/>
+          </p:cNvSpPr>
+          <p:nvPr/>
+        </p:nvSpPr>
+        <p:spPr>
+          <a:xfrm>
+            <a:off x="855725" y="5157193"/>
+            <a:ext cx="7467600" cy="936103"/>
+          </a:xfrm>
+          <a:prstGeom prst="rect">
+            <a:avLst/>
+          </a:prstGeom>
+          <a:solidFill>
+            <a:schemeClr val="bg1"/>
+          </a:solidFill>
+          <a:ln w="19050">
+            <a:solidFill>
+              <a:schemeClr val="bg1">
+                <a:lumMod val="50000"/>
+              </a:schemeClr>
+            </a:solidFill>
+            <a:prstDash val="solid"/>
+          </a:ln>
+        </p:spPr>
+        <p:txBody>
+          <a:bodyPr vert="horz" lIns="180000" tIns="108000" rIns="180000" bIns="108000" rtlCol="0">
+            <a:noAutofit/>
+          </a:bodyPr>
+          <a:lstStyle>
+            <a:lvl1pPr marL="228600" indent="-228600" algn="l" defTabSz="457200" rtl="0" eaLnBrk="1" latinLnBrk="0" hangingPunct="1">
+              <a:spcBef>
+                <a:spcPct val="20000"/>
+              </a:spcBef>
+              <a:buClr>
+                <a:schemeClr val="accent1"/>
+              </a:buClr>
+              <a:buSzPct val="95000"/>
+              <a:buFont typeface="Rage Italic" pitchFamily="66" charset="0"/>
+              <a:buChar char="0"/>
+              <a:defRPr sz="2400" kern="1200">
+                <a:solidFill>
+                  <a:schemeClr val="tx1">
+                    <a:lumMod val="75000"/>
+                    <a:lumOff val="25000"/>
+                  </a:schemeClr>
+                </a:solidFill>
+                <a:latin typeface="+mn-lt"/>
+                <a:ea typeface="+mn-ea"/>
+                <a:cs typeface="+mn-cs"/>
+              </a:defRPr>
+            </a:lvl1pPr>
+            <a:lvl2pPr marL="557784" indent="-228600" algn="l" defTabSz="457200" rtl="0" eaLnBrk="1" latinLnBrk="0" hangingPunct="1">
+              <a:spcBef>
+                <a:spcPct val="20000"/>
+              </a:spcBef>
+              <a:buClr>
+                <a:schemeClr val="accent1"/>
+              </a:buClr>
+              <a:buSzPct val="95000"/>
+              <a:buFont typeface="Rage Italic" pitchFamily="66" charset="0"/>
+              <a:buChar char="0"/>
+              <a:defRPr sz="2200" kern="1200">
+                <a:solidFill>
+                  <a:schemeClr val="tx1">
+                    <a:lumMod val="75000"/>
+                    <a:lumOff val="25000"/>
+                  </a:schemeClr>
+                </a:solidFill>
+                <a:latin typeface="+mn-lt"/>
+                <a:ea typeface="+mn-ea"/>
+                <a:cs typeface="+mn-cs"/>
+              </a:defRPr>
+            </a:lvl2pPr>
+            <a:lvl3pPr marL="822960" indent="-182880" algn="l" defTabSz="457200" rtl="0" eaLnBrk="1" latinLnBrk="0" hangingPunct="1">
+              <a:spcBef>
+                <a:spcPct val="20000"/>
+              </a:spcBef>
+              <a:buClr>
+                <a:schemeClr val="accent1"/>
+              </a:buClr>
+              <a:buSzPct val="95000"/>
+              <a:buFont typeface="Rage Italic" pitchFamily="66" charset="0"/>
+              <a:buChar char="0"/>
+              <a:defRPr sz="2000" kern="1200">
+                <a:solidFill>
+                  <a:schemeClr val="tx1">
+                    <a:lumMod val="75000"/>
+                    <a:lumOff val="25000"/>
+                  </a:schemeClr>
+                </a:solidFill>
+                <a:latin typeface="+mn-lt"/>
+                <a:ea typeface="+mn-ea"/>
+                <a:cs typeface="+mn-cs"/>
+              </a:defRPr>
+            </a:lvl3pPr>
+            <a:lvl4pPr marL="1097280" indent="-182880" algn="l" defTabSz="457200" rtl="0" eaLnBrk="1" latinLnBrk="0" hangingPunct="1">
+              <a:spcBef>
+                <a:spcPct val="20000"/>
+              </a:spcBef>
+              <a:buClr>
+                <a:schemeClr val="accent1"/>
+              </a:buClr>
+              <a:buSzPct val="95000"/>
+              <a:buFont typeface="Rage Italic" pitchFamily="66" charset="0"/>
+              <a:buChar char="0"/>
+              <a:defRPr sz="1600" kern="1200">
+                <a:solidFill>
+                  <a:schemeClr val="tx1">
+                    <a:lumMod val="75000"/>
+                    <a:lumOff val="25000"/>
+                  </a:schemeClr>
+                </a:solidFill>
+                <a:latin typeface="+mn-lt"/>
+                <a:ea typeface="+mn-ea"/>
+                <a:cs typeface="+mn-cs"/>
+              </a:defRPr>
+            </a:lvl4pPr>
+            <a:lvl5pPr marL="1417320" indent="-182880" algn="l" defTabSz="457200" rtl="0" eaLnBrk="1" latinLnBrk="0" hangingPunct="1">
+              <a:spcBef>
+                <a:spcPct val="20000"/>
+              </a:spcBef>
+              <a:buClr>
+                <a:schemeClr val="accent1"/>
+              </a:buClr>
+              <a:buSzPct val="95000"/>
+              <a:buFont typeface="Rage Italic" pitchFamily="66" charset="0"/>
+              <a:buChar char="0"/>
+              <a:defRPr sz="1400" kern="1200" baseline="0">
+                <a:solidFill>
+                  <a:schemeClr val="tx1">
+                    <a:lumMod val="75000"/>
+                    <a:lumOff val="25000"/>
+                  </a:schemeClr>
+                </a:solidFill>
+                <a:latin typeface="+mn-lt"/>
+                <a:ea typeface="+mn-ea"/>
+                <a:cs typeface="+mn-cs"/>
+              </a:defRPr>
+            </a:lvl5pPr>
+            <a:lvl6pPr marL="1645920" indent="-182880" algn="l" defTabSz="457200" rtl="0" eaLnBrk="1" latinLnBrk="0" hangingPunct="1">
+              <a:spcBef>
+                <a:spcPct val="20000"/>
+              </a:spcBef>
+              <a:buClr>
+                <a:schemeClr val="accent1"/>
+              </a:buClr>
+              <a:buSzPct val="95000"/>
+              <a:buFont typeface="Rage Italic" pitchFamily="66" charset="0"/>
+              <a:buChar char="0"/>
+              <a:defRPr sz="1400" kern="1200">
+                <a:solidFill>
+                  <a:schemeClr val="tx1">
+                    <a:lumMod val="75000"/>
+                    <a:lumOff val="25000"/>
+                  </a:schemeClr>
+                </a:solidFill>
+                <a:latin typeface="+mn-lt"/>
+                <a:ea typeface="+mn-ea"/>
+                <a:cs typeface="+mn-cs"/>
+              </a:defRPr>
+            </a:lvl6pPr>
+            <a:lvl7pPr marL="1920240" indent="-182880" algn="l" defTabSz="457200" rtl="0" eaLnBrk="1" latinLnBrk="0" hangingPunct="1">
+              <a:spcBef>
+                <a:spcPct val="20000"/>
+              </a:spcBef>
+              <a:buClr>
+                <a:schemeClr val="accent1"/>
+              </a:buClr>
+              <a:buSzPct val="95000"/>
+              <a:buFont typeface="Rage Italic" pitchFamily="66" charset="0"/>
+              <a:buChar char="0"/>
+              <a:defRPr sz="1400" kern="1200">
+                <a:solidFill>
+                  <a:schemeClr val="tx1">
+                    <a:lumMod val="75000"/>
+                    <a:lumOff val="25000"/>
+                  </a:schemeClr>
+                </a:solidFill>
+                <a:latin typeface="+mn-lt"/>
+                <a:ea typeface="+mn-ea"/>
+                <a:cs typeface="+mn-cs"/>
+              </a:defRPr>
+            </a:lvl7pPr>
+            <a:lvl8pPr marL="2194560" indent="-182880" algn="l" defTabSz="457200" rtl="0" eaLnBrk="1" latinLnBrk="0" hangingPunct="1">
+              <a:spcBef>
+                <a:spcPct val="20000"/>
+              </a:spcBef>
+              <a:buClr>
+                <a:schemeClr val="accent1"/>
+              </a:buClr>
+              <a:buSzPct val="95000"/>
+              <a:buFont typeface="Rage Italic" pitchFamily="66" charset="0"/>
+              <a:buChar char="0"/>
+              <a:defRPr sz="1400" kern="1200">
+                <a:solidFill>
+                  <a:schemeClr val="tx1">
+                    <a:lumMod val="75000"/>
+                    <a:lumOff val="25000"/>
+                  </a:schemeClr>
+                </a:solidFill>
+                <a:latin typeface="+mn-lt"/>
+                <a:ea typeface="+mn-ea"/>
+                <a:cs typeface="+mn-cs"/>
+              </a:defRPr>
+            </a:lvl8pPr>
+            <a:lvl9pPr marL="2468880" indent="-182880" algn="l" defTabSz="457200" rtl="0" eaLnBrk="1" latinLnBrk="0" hangingPunct="1">
+              <a:spcBef>
+                <a:spcPct val="20000"/>
+              </a:spcBef>
+              <a:buClr>
+                <a:schemeClr val="accent1"/>
+              </a:buClr>
+              <a:buSzPct val="95000"/>
+              <a:buFont typeface="Rage Italic" pitchFamily="66" charset="0"/>
+              <a:buChar char="0"/>
+              <a:defRPr sz="1400" kern="1200">
+                <a:solidFill>
+                  <a:schemeClr val="tx1">
+                    <a:lumMod val="75000"/>
+                    <a:lumOff val="25000"/>
+                  </a:schemeClr>
+                </a:solidFill>
+                <a:latin typeface="+mn-lt"/>
+                <a:ea typeface="+mn-ea"/>
+                <a:cs typeface="+mn-cs"/>
+              </a:defRPr>
+            </a:lvl9pPr>
+          </a:lstStyle>
+          <a:p>
+            <a:pPr marL="0" indent="0">
+              <a:lnSpc>
+                <a:spcPct val="115000"/>
+              </a:lnSpc>
+              <a:spcAft>
+                <a:spcPts val="0"/>
+              </a:spcAft>
+              <a:buNone/>
+            </a:pPr>
+            <a:r>
+              <a:rPr lang="de-CH" sz="1200" dirty="0" err="1">
+                <a:solidFill>
+                  <a:srgbClr val="000000"/>
+                </a:solidFill>
+                <a:latin typeface="Courier New" pitchFamily="49" charset="0"/>
+                <a:ea typeface="Calibri"/>
+                <a:cs typeface="Courier New" pitchFamily="49" charset="0"/>
+              </a:rPr>
+              <a:t>Ext</a:t>
+            </a:r>
+            <a:r>
+              <a:rPr lang="de-CH" sz="1200" b="1" dirty="0" err="1">
+                <a:solidFill>
+                  <a:srgbClr val="000000"/>
+                </a:solidFill>
+                <a:latin typeface="Courier New" pitchFamily="49" charset="0"/>
+                <a:ea typeface="Calibri"/>
+                <a:cs typeface="Courier New" pitchFamily="49" charset="0"/>
+              </a:rPr>
+              <a:t>.</a:t>
+            </a:r>
+            <a:r>
+              <a:rPr lang="de-CH" sz="1200" dirty="0" err="1">
+                <a:solidFill>
+                  <a:srgbClr val="000000"/>
+                </a:solidFill>
+                <a:latin typeface="Courier New" pitchFamily="49" charset="0"/>
+                <a:ea typeface="Calibri"/>
+                <a:cs typeface="Courier New" pitchFamily="49" charset="0"/>
+              </a:rPr>
+              <a:t>regController</a:t>
+            </a:r>
+            <a:r>
+              <a:rPr lang="de-CH" sz="1200" b="1" dirty="0">
+                <a:solidFill>
+                  <a:srgbClr val="000000"/>
+                </a:solidFill>
+                <a:latin typeface="Courier New" pitchFamily="49" charset="0"/>
+                <a:ea typeface="Calibri"/>
+                <a:cs typeface="Courier New" pitchFamily="49" charset="0"/>
+              </a:rPr>
+              <a:t>(</a:t>
+            </a:r>
+            <a:r>
+              <a:rPr lang="de-CH" sz="1200" dirty="0">
+                <a:solidFill>
+                  <a:srgbClr val="808080"/>
+                </a:solidFill>
+                <a:latin typeface="Courier New" pitchFamily="49" charset="0"/>
+                <a:ea typeface="Calibri"/>
+                <a:cs typeface="Courier New" pitchFamily="49" charset="0"/>
+              </a:rPr>
+              <a:t>'</a:t>
+            </a:r>
+            <a:r>
+              <a:rPr lang="de-CH" sz="1200" dirty="0" err="1">
+                <a:solidFill>
+                  <a:srgbClr val="808080"/>
+                </a:solidFill>
+                <a:latin typeface="Courier New" pitchFamily="49" charset="0"/>
+                <a:ea typeface="Calibri"/>
+                <a:cs typeface="Courier New" pitchFamily="49" charset="0"/>
+              </a:rPr>
+              <a:t>controller</a:t>
+            </a:r>
+            <a:r>
+              <a:rPr lang="de-CH" sz="1200" dirty="0">
+                <a:solidFill>
+                  <a:srgbClr val="808080"/>
+                </a:solidFill>
+                <a:latin typeface="Courier New" pitchFamily="49" charset="0"/>
+                <a:ea typeface="Calibri"/>
+                <a:cs typeface="Courier New" pitchFamily="49" charset="0"/>
+              </a:rPr>
+              <a:t>'</a:t>
+            </a:r>
+            <a:r>
+              <a:rPr lang="de-CH" sz="1200" b="1" dirty="0">
+                <a:solidFill>
+                  <a:srgbClr val="000000"/>
+                </a:solidFill>
+                <a:latin typeface="Courier New" pitchFamily="49" charset="0"/>
+                <a:ea typeface="Calibri"/>
+                <a:cs typeface="Courier New" pitchFamily="49" charset="0"/>
+              </a:rPr>
+              <a:t>,</a:t>
+            </a:r>
+            <a:r>
+              <a:rPr lang="de-CH" sz="1200" dirty="0">
+                <a:solidFill>
+                  <a:srgbClr val="000000"/>
+                </a:solidFill>
+                <a:latin typeface="Courier New" pitchFamily="49" charset="0"/>
+                <a:ea typeface="Calibri"/>
+                <a:cs typeface="Courier New" pitchFamily="49" charset="0"/>
+              </a:rPr>
+              <a:t> </a:t>
+            </a:r>
+            <a:r>
+              <a:rPr lang="de-CH" sz="1200" b="1" dirty="0">
+                <a:solidFill>
+                  <a:srgbClr val="000000"/>
+                </a:solidFill>
+                <a:latin typeface="Courier New" pitchFamily="49" charset="0"/>
+                <a:ea typeface="Calibri"/>
+                <a:cs typeface="Courier New" pitchFamily="49" charset="0"/>
+              </a:rPr>
+              <a:t>{</a:t>
+            </a:r>
+            <a:endParaRPr lang="de-CH" sz="1200" dirty="0">
+              <a:latin typeface="Courier New" pitchFamily="49" charset="0"/>
+              <a:ea typeface="Calibri"/>
+              <a:cs typeface="Courier New" pitchFamily="49" charset="0"/>
+            </a:endParaRPr>
+          </a:p>
+          <a:p>
+            <a:pPr marL="0" indent="0">
+              <a:lnSpc>
+                <a:spcPct val="115000"/>
+              </a:lnSpc>
+              <a:spcAft>
+                <a:spcPts val="0"/>
+              </a:spcAft>
+              <a:buNone/>
+            </a:pPr>
+            <a:r>
+              <a:rPr lang="de-CH" sz="1200" dirty="0">
+                <a:solidFill>
+                  <a:srgbClr val="000000"/>
+                </a:solidFill>
+                <a:latin typeface="Courier New" pitchFamily="49" charset="0"/>
+                <a:ea typeface="Calibri"/>
+                <a:cs typeface="Courier New" pitchFamily="49" charset="0"/>
+              </a:rPr>
+              <a:t>	</a:t>
+            </a:r>
+            <a:r>
+              <a:rPr lang="de-CH" sz="1200" dirty="0" err="1">
+                <a:solidFill>
+                  <a:srgbClr val="000000"/>
+                </a:solidFill>
+                <a:latin typeface="Courier New" pitchFamily="49" charset="0"/>
+                <a:ea typeface="Calibri"/>
+                <a:cs typeface="Courier New" pitchFamily="49" charset="0"/>
+              </a:rPr>
+              <a:t>addMarkers</a:t>
+            </a:r>
+            <a:r>
+              <a:rPr lang="de-CH" sz="1200" b="1" dirty="0">
+                <a:solidFill>
+                  <a:srgbClr val="000000"/>
+                </a:solidFill>
+                <a:latin typeface="Courier New" pitchFamily="49" charset="0"/>
+                <a:ea typeface="Calibri"/>
+                <a:cs typeface="Courier New" pitchFamily="49" charset="0"/>
+              </a:rPr>
+              <a:t>:</a:t>
+            </a:r>
+            <a:r>
+              <a:rPr lang="de-CH" sz="1200" dirty="0">
+                <a:solidFill>
+                  <a:srgbClr val="000000"/>
+                </a:solidFill>
+                <a:latin typeface="Courier New" pitchFamily="49" charset="0"/>
+                <a:ea typeface="Calibri"/>
+                <a:cs typeface="Courier New" pitchFamily="49" charset="0"/>
+              </a:rPr>
+              <a:t> </a:t>
+            </a:r>
+            <a:r>
+              <a:rPr lang="de-CH" sz="1200" b="1" dirty="0" err="1">
+                <a:solidFill>
+                  <a:srgbClr val="000080"/>
+                </a:solidFill>
+                <a:latin typeface="Courier New" pitchFamily="49" charset="0"/>
+                <a:ea typeface="Calibri"/>
+                <a:cs typeface="Courier New" pitchFamily="49" charset="0"/>
+              </a:rPr>
+              <a:t>function</a:t>
+            </a:r>
+            <a:r>
+              <a:rPr lang="de-CH" sz="1200" b="1" dirty="0">
+                <a:solidFill>
+                  <a:srgbClr val="000000"/>
+                </a:solidFill>
+                <a:latin typeface="Courier New" pitchFamily="49" charset="0"/>
+                <a:ea typeface="Calibri"/>
+                <a:cs typeface="Courier New" pitchFamily="49" charset="0"/>
+              </a:rPr>
+              <a:t>()</a:t>
+            </a:r>
+            <a:r>
+              <a:rPr lang="de-CH" sz="1200" dirty="0">
+                <a:solidFill>
+                  <a:srgbClr val="000000"/>
+                </a:solidFill>
+                <a:latin typeface="Courier New" pitchFamily="49" charset="0"/>
+                <a:ea typeface="Calibri"/>
+                <a:cs typeface="Courier New" pitchFamily="49" charset="0"/>
+              </a:rPr>
+              <a:t> </a:t>
+            </a:r>
+            <a:r>
+              <a:rPr lang="de-CH" sz="1200" b="1" dirty="0">
+                <a:solidFill>
+                  <a:srgbClr val="000000"/>
+                </a:solidFill>
+                <a:latin typeface="Courier New" pitchFamily="49" charset="0"/>
+                <a:ea typeface="Calibri"/>
+                <a:cs typeface="Courier New" pitchFamily="49" charset="0"/>
+              </a:rPr>
+              <a:t>{</a:t>
+            </a:r>
+            <a:r>
+              <a:rPr lang="de-CH" sz="1200" dirty="0">
+                <a:solidFill>
+                  <a:srgbClr val="000000"/>
+                </a:solidFill>
+                <a:latin typeface="Courier New" pitchFamily="49" charset="0"/>
+                <a:ea typeface="Calibri"/>
+                <a:cs typeface="Courier New" pitchFamily="49" charset="0"/>
+              </a:rPr>
+              <a:t> </a:t>
+            </a:r>
+            <a:r>
+              <a:rPr lang="de-CH" sz="1200" b="1" dirty="0">
+                <a:solidFill>
+                  <a:srgbClr val="000000"/>
+                </a:solidFill>
+                <a:latin typeface="Courier New" pitchFamily="49" charset="0"/>
+                <a:ea typeface="Calibri"/>
+                <a:cs typeface="Courier New" pitchFamily="49" charset="0"/>
+              </a:rPr>
+              <a:t>...</a:t>
+            </a:r>
+            <a:r>
+              <a:rPr lang="de-CH" sz="1200" dirty="0">
+                <a:solidFill>
+                  <a:srgbClr val="000000"/>
+                </a:solidFill>
+                <a:latin typeface="Courier New" pitchFamily="49" charset="0"/>
+                <a:ea typeface="Calibri"/>
+                <a:cs typeface="Courier New" pitchFamily="49" charset="0"/>
+              </a:rPr>
+              <a:t> </a:t>
+            </a:r>
+            <a:r>
+              <a:rPr lang="de-CH" sz="1200" b="1" dirty="0">
+                <a:solidFill>
+                  <a:srgbClr val="000000"/>
+                </a:solidFill>
+                <a:latin typeface="Courier New" pitchFamily="49" charset="0"/>
+                <a:ea typeface="Calibri"/>
+                <a:cs typeface="Courier New" pitchFamily="49" charset="0"/>
+              </a:rPr>
+              <a:t>}</a:t>
+            </a:r>
+            <a:endParaRPr lang="de-CH" sz="1200" dirty="0">
+              <a:latin typeface="Courier New" pitchFamily="49" charset="0"/>
+              <a:ea typeface="Calibri"/>
+              <a:cs typeface="Courier New" pitchFamily="49" charset="0"/>
+            </a:endParaRPr>
+          </a:p>
+          <a:p>
+            <a:pPr marL="0" indent="0">
+              <a:lnSpc>
+                <a:spcPct val="115000"/>
+              </a:lnSpc>
+              <a:spcAft>
+                <a:spcPts val="1000"/>
+              </a:spcAft>
+              <a:buNone/>
+            </a:pPr>
+            <a:r>
+              <a:rPr lang="de-CH" sz="1200" b="1" dirty="0">
+                <a:solidFill>
+                  <a:srgbClr val="000000"/>
+                </a:solidFill>
+                <a:latin typeface="Courier New" pitchFamily="49" charset="0"/>
+                <a:ea typeface="Calibri"/>
+                <a:cs typeface="Courier New" pitchFamily="49" charset="0"/>
+              </a:rPr>
+              <a:t>});</a:t>
+            </a:r>
+            <a:endParaRPr lang="de-CH" sz="1200" dirty="0">
+              <a:effectLst/>
+              <a:latin typeface="Courier New" pitchFamily="49" charset="0"/>
+              <a:ea typeface="Calibri"/>
+              <a:cs typeface="Courier New" pitchFamily="49" charset="0"/>
+            </a:endParaRPr>
           </a:p>
         </p:txBody>
       </p:sp>
@@ -14894,10 +16598,1074 @@
           <a:bodyPr/>
           <a:lstStyle/>
           <a:p>
-            <a:endParaRPr lang="de-CH"/>
+            <a:endParaRPr lang="de-CH" dirty="0"/>
           </a:p>
         </p:txBody>
       </p:sp>
+      <p:sp>
+        <p:nvSpPr>
+          <p:cNvPr id="5" name="Content Placeholder 2"/>
+          <p:cNvSpPr txBox="1">
+            <a:spLocks/>
+          </p:cNvSpPr>
+          <p:nvPr/>
+        </p:nvSpPr>
+        <p:spPr>
+          <a:xfrm>
+            <a:off x="848816" y="1988840"/>
+            <a:ext cx="7467600" cy="3528392"/>
+          </a:xfrm>
+          <a:prstGeom prst="rect">
+            <a:avLst/>
+          </a:prstGeom>
+          <a:solidFill>
+            <a:schemeClr val="bg1"/>
+          </a:solidFill>
+          <a:ln w="19050">
+            <a:solidFill>
+              <a:schemeClr val="bg1">
+                <a:lumMod val="50000"/>
+              </a:schemeClr>
+            </a:solidFill>
+            <a:prstDash val="solid"/>
+          </a:ln>
+        </p:spPr>
+        <p:txBody>
+          <a:bodyPr vert="horz" lIns="180000" tIns="108000" rIns="180000" bIns="108000" rtlCol="0">
+            <a:noAutofit/>
+          </a:bodyPr>
+          <a:lstStyle>
+            <a:lvl1pPr marL="228600" indent="-228600" algn="l" defTabSz="457200" rtl="0" eaLnBrk="1" latinLnBrk="0" hangingPunct="1">
+              <a:spcBef>
+                <a:spcPct val="20000"/>
+              </a:spcBef>
+              <a:buClr>
+                <a:schemeClr val="accent1"/>
+              </a:buClr>
+              <a:buSzPct val="95000"/>
+              <a:buFont typeface="Rage Italic" pitchFamily="66" charset="0"/>
+              <a:buChar char="0"/>
+              <a:defRPr sz="2400" kern="1200">
+                <a:solidFill>
+                  <a:schemeClr val="tx1">
+                    <a:lumMod val="75000"/>
+                    <a:lumOff val="25000"/>
+                  </a:schemeClr>
+                </a:solidFill>
+                <a:latin typeface="+mn-lt"/>
+                <a:ea typeface="+mn-ea"/>
+                <a:cs typeface="+mn-cs"/>
+              </a:defRPr>
+            </a:lvl1pPr>
+            <a:lvl2pPr marL="557784" indent="-228600" algn="l" defTabSz="457200" rtl="0" eaLnBrk="1" latinLnBrk="0" hangingPunct="1">
+              <a:spcBef>
+                <a:spcPct val="20000"/>
+              </a:spcBef>
+              <a:buClr>
+                <a:schemeClr val="accent1"/>
+              </a:buClr>
+              <a:buSzPct val="95000"/>
+              <a:buFont typeface="Rage Italic" pitchFamily="66" charset="0"/>
+              <a:buChar char="0"/>
+              <a:defRPr sz="2200" kern="1200">
+                <a:solidFill>
+                  <a:schemeClr val="tx1">
+                    <a:lumMod val="75000"/>
+                    <a:lumOff val="25000"/>
+                  </a:schemeClr>
+                </a:solidFill>
+                <a:latin typeface="+mn-lt"/>
+                <a:ea typeface="+mn-ea"/>
+                <a:cs typeface="+mn-cs"/>
+              </a:defRPr>
+            </a:lvl2pPr>
+            <a:lvl3pPr marL="822960" indent="-182880" algn="l" defTabSz="457200" rtl="0" eaLnBrk="1" latinLnBrk="0" hangingPunct="1">
+              <a:spcBef>
+                <a:spcPct val="20000"/>
+              </a:spcBef>
+              <a:buClr>
+                <a:schemeClr val="accent1"/>
+              </a:buClr>
+              <a:buSzPct val="95000"/>
+              <a:buFont typeface="Rage Italic" pitchFamily="66" charset="0"/>
+              <a:buChar char="0"/>
+              <a:defRPr sz="2000" kern="1200">
+                <a:solidFill>
+                  <a:schemeClr val="tx1">
+                    <a:lumMod val="75000"/>
+                    <a:lumOff val="25000"/>
+                  </a:schemeClr>
+                </a:solidFill>
+                <a:latin typeface="+mn-lt"/>
+                <a:ea typeface="+mn-ea"/>
+                <a:cs typeface="+mn-cs"/>
+              </a:defRPr>
+            </a:lvl3pPr>
+            <a:lvl4pPr marL="1097280" indent="-182880" algn="l" defTabSz="457200" rtl="0" eaLnBrk="1" latinLnBrk="0" hangingPunct="1">
+              <a:spcBef>
+                <a:spcPct val="20000"/>
+              </a:spcBef>
+              <a:buClr>
+                <a:schemeClr val="accent1"/>
+              </a:buClr>
+              <a:buSzPct val="95000"/>
+              <a:buFont typeface="Rage Italic" pitchFamily="66" charset="0"/>
+              <a:buChar char="0"/>
+              <a:defRPr sz="1600" kern="1200">
+                <a:solidFill>
+                  <a:schemeClr val="tx1">
+                    <a:lumMod val="75000"/>
+                    <a:lumOff val="25000"/>
+                  </a:schemeClr>
+                </a:solidFill>
+                <a:latin typeface="+mn-lt"/>
+                <a:ea typeface="+mn-ea"/>
+                <a:cs typeface="+mn-cs"/>
+              </a:defRPr>
+            </a:lvl4pPr>
+            <a:lvl5pPr marL="1417320" indent="-182880" algn="l" defTabSz="457200" rtl="0" eaLnBrk="1" latinLnBrk="0" hangingPunct="1">
+              <a:spcBef>
+                <a:spcPct val="20000"/>
+              </a:spcBef>
+              <a:buClr>
+                <a:schemeClr val="accent1"/>
+              </a:buClr>
+              <a:buSzPct val="95000"/>
+              <a:buFont typeface="Rage Italic" pitchFamily="66" charset="0"/>
+              <a:buChar char="0"/>
+              <a:defRPr sz="1400" kern="1200" baseline="0">
+                <a:solidFill>
+                  <a:schemeClr val="tx1">
+                    <a:lumMod val="75000"/>
+                    <a:lumOff val="25000"/>
+                  </a:schemeClr>
+                </a:solidFill>
+                <a:latin typeface="+mn-lt"/>
+                <a:ea typeface="+mn-ea"/>
+                <a:cs typeface="+mn-cs"/>
+              </a:defRPr>
+            </a:lvl5pPr>
+            <a:lvl6pPr marL="1645920" indent="-182880" algn="l" defTabSz="457200" rtl="0" eaLnBrk="1" latinLnBrk="0" hangingPunct="1">
+              <a:spcBef>
+                <a:spcPct val="20000"/>
+              </a:spcBef>
+              <a:buClr>
+                <a:schemeClr val="accent1"/>
+              </a:buClr>
+              <a:buSzPct val="95000"/>
+              <a:buFont typeface="Rage Italic" pitchFamily="66" charset="0"/>
+              <a:buChar char="0"/>
+              <a:defRPr sz="1400" kern="1200">
+                <a:solidFill>
+                  <a:schemeClr val="tx1">
+                    <a:lumMod val="75000"/>
+                    <a:lumOff val="25000"/>
+                  </a:schemeClr>
+                </a:solidFill>
+                <a:latin typeface="+mn-lt"/>
+                <a:ea typeface="+mn-ea"/>
+                <a:cs typeface="+mn-cs"/>
+              </a:defRPr>
+            </a:lvl6pPr>
+            <a:lvl7pPr marL="1920240" indent="-182880" algn="l" defTabSz="457200" rtl="0" eaLnBrk="1" latinLnBrk="0" hangingPunct="1">
+              <a:spcBef>
+                <a:spcPct val="20000"/>
+              </a:spcBef>
+              <a:buClr>
+                <a:schemeClr val="accent1"/>
+              </a:buClr>
+              <a:buSzPct val="95000"/>
+              <a:buFont typeface="Rage Italic" pitchFamily="66" charset="0"/>
+              <a:buChar char="0"/>
+              <a:defRPr sz="1400" kern="1200">
+                <a:solidFill>
+                  <a:schemeClr val="tx1">
+                    <a:lumMod val="75000"/>
+                    <a:lumOff val="25000"/>
+                  </a:schemeClr>
+                </a:solidFill>
+                <a:latin typeface="+mn-lt"/>
+                <a:ea typeface="+mn-ea"/>
+                <a:cs typeface="+mn-cs"/>
+              </a:defRPr>
+            </a:lvl7pPr>
+            <a:lvl8pPr marL="2194560" indent="-182880" algn="l" defTabSz="457200" rtl="0" eaLnBrk="1" latinLnBrk="0" hangingPunct="1">
+              <a:spcBef>
+                <a:spcPct val="20000"/>
+              </a:spcBef>
+              <a:buClr>
+                <a:schemeClr val="accent1"/>
+              </a:buClr>
+              <a:buSzPct val="95000"/>
+              <a:buFont typeface="Rage Italic" pitchFamily="66" charset="0"/>
+              <a:buChar char="0"/>
+              <a:defRPr sz="1400" kern="1200">
+                <a:solidFill>
+                  <a:schemeClr val="tx1">
+                    <a:lumMod val="75000"/>
+                    <a:lumOff val="25000"/>
+                  </a:schemeClr>
+                </a:solidFill>
+                <a:latin typeface="+mn-lt"/>
+                <a:ea typeface="+mn-ea"/>
+                <a:cs typeface="+mn-cs"/>
+              </a:defRPr>
+            </a:lvl8pPr>
+            <a:lvl9pPr marL="2468880" indent="-182880" algn="l" defTabSz="457200" rtl="0" eaLnBrk="1" latinLnBrk="0" hangingPunct="1">
+              <a:spcBef>
+                <a:spcPct val="20000"/>
+              </a:spcBef>
+              <a:buClr>
+                <a:schemeClr val="accent1"/>
+              </a:buClr>
+              <a:buSzPct val="95000"/>
+              <a:buFont typeface="Rage Italic" pitchFamily="66" charset="0"/>
+              <a:buChar char="0"/>
+              <a:defRPr sz="1400" kern="1200">
+                <a:solidFill>
+                  <a:schemeClr val="tx1">
+                    <a:lumMod val="75000"/>
+                    <a:lumOff val="25000"/>
+                  </a:schemeClr>
+                </a:solidFill>
+                <a:latin typeface="+mn-lt"/>
+                <a:ea typeface="+mn-ea"/>
+                <a:cs typeface="+mn-cs"/>
+              </a:defRPr>
+            </a:lvl9pPr>
+          </a:lstStyle>
+          <a:p>
+            <a:pPr marL="0" indent="0">
+              <a:lnSpc>
+                <a:spcPct val="115000"/>
+              </a:lnSpc>
+              <a:spcAft>
+                <a:spcPts val="0"/>
+              </a:spcAft>
+              <a:buNone/>
+            </a:pPr>
+            <a:r>
+              <a:rPr lang="de-CH" sz="1600" b="1" dirty="0">
+                <a:solidFill>
+                  <a:srgbClr val="000000"/>
+                </a:solidFill>
+                <a:latin typeface="Courier New" pitchFamily="49" charset="0"/>
+                <a:ea typeface="Calibri"/>
+                <a:cs typeface="Courier New" pitchFamily="49" charset="0"/>
+              </a:rPr>
+              <a:t>&lt;</a:t>
+            </a:r>
+            <a:r>
+              <a:rPr lang="de-CH" sz="1600" dirty="0" err="1">
+                <a:solidFill>
+                  <a:srgbClr val="000000"/>
+                </a:solidFill>
+                <a:latin typeface="Courier New" pitchFamily="49" charset="0"/>
+                <a:ea typeface="Calibri"/>
+                <a:cs typeface="Courier New" pitchFamily="49" charset="0"/>
+              </a:rPr>
+              <a:t>script</a:t>
+            </a:r>
+            <a:r>
+              <a:rPr lang="de-CH" sz="1600" dirty="0">
+                <a:solidFill>
+                  <a:srgbClr val="000000"/>
+                </a:solidFill>
+                <a:latin typeface="Courier New" pitchFamily="49" charset="0"/>
+                <a:ea typeface="Calibri"/>
+                <a:cs typeface="Courier New" pitchFamily="49" charset="0"/>
+              </a:rPr>
+              <a:t> type</a:t>
+            </a:r>
+            <a:r>
+              <a:rPr lang="de-CH" sz="1600" b="1" dirty="0">
+                <a:solidFill>
+                  <a:srgbClr val="000000"/>
+                </a:solidFill>
+                <a:latin typeface="Courier New" pitchFamily="49" charset="0"/>
+                <a:ea typeface="Calibri"/>
+                <a:cs typeface="Courier New" pitchFamily="49" charset="0"/>
+              </a:rPr>
+              <a:t>=</a:t>
+            </a:r>
+            <a:r>
+              <a:rPr lang="de-CH" sz="1600" dirty="0">
+                <a:solidFill>
+                  <a:srgbClr val="808080"/>
+                </a:solidFill>
+                <a:latin typeface="Courier New" pitchFamily="49" charset="0"/>
+                <a:ea typeface="Calibri"/>
+                <a:cs typeface="Courier New" pitchFamily="49" charset="0"/>
+              </a:rPr>
+              <a:t>"</a:t>
+            </a:r>
+            <a:r>
+              <a:rPr lang="de-CH" sz="1600" dirty="0" err="1">
+                <a:solidFill>
+                  <a:srgbClr val="808080"/>
+                </a:solidFill>
+                <a:latin typeface="Courier New" pitchFamily="49" charset="0"/>
+                <a:ea typeface="Calibri"/>
+                <a:cs typeface="Courier New" pitchFamily="49" charset="0"/>
+              </a:rPr>
+              <a:t>text</a:t>
+            </a:r>
+            <a:r>
+              <a:rPr lang="de-CH" sz="1600" dirty="0">
+                <a:solidFill>
+                  <a:srgbClr val="808080"/>
+                </a:solidFill>
+                <a:latin typeface="Courier New" pitchFamily="49" charset="0"/>
+                <a:ea typeface="Calibri"/>
+                <a:cs typeface="Courier New" pitchFamily="49" charset="0"/>
+              </a:rPr>
+              <a:t>/</a:t>
+            </a:r>
+            <a:r>
+              <a:rPr lang="de-CH" sz="1600" dirty="0" err="1">
+                <a:solidFill>
+                  <a:srgbClr val="808080"/>
+                </a:solidFill>
+                <a:latin typeface="Courier New" pitchFamily="49" charset="0"/>
+                <a:ea typeface="Calibri"/>
+                <a:cs typeface="Courier New" pitchFamily="49" charset="0"/>
+              </a:rPr>
+              <a:t>javascript</a:t>
+            </a:r>
+            <a:r>
+              <a:rPr lang="de-CH" sz="1600" dirty="0">
+                <a:solidFill>
+                  <a:srgbClr val="808080"/>
+                </a:solidFill>
+                <a:latin typeface="Courier New" pitchFamily="49" charset="0"/>
+                <a:ea typeface="Calibri"/>
+                <a:cs typeface="Courier New" pitchFamily="49" charset="0"/>
+              </a:rPr>
+              <a:t>"</a:t>
+            </a:r>
+            <a:r>
+              <a:rPr lang="de-CH" sz="1600" b="1" dirty="0">
+                <a:solidFill>
+                  <a:srgbClr val="000000"/>
+                </a:solidFill>
+                <a:latin typeface="Courier New" pitchFamily="49" charset="0"/>
+                <a:ea typeface="Calibri"/>
+                <a:cs typeface="Courier New" pitchFamily="49" charset="0"/>
+              </a:rPr>
+              <a:t>&gt;</a:t>
+            </a:r>
+            <a:r>
+              <a:rPr lang="de-CH" sz="1600" dirty="0">
+                <a:solidFill>
+                  <a:srgbClr val="000000"/>
+                </a:solidFill>
+                <a:latin typeface="Courier New" pitchFamily="49" charset="0"/>
+                <a:ea typeface="Calibri"/>
+                <a:cs typeface="Courier New" pitchFamily="49" charset="0"/>
+              </a:rPr>
+              <a:t> </a:t>
+            </a:r>
+            <a:endParaRPr lang="de-CH" sz="1600" dirty="0">
+              <a:latin typeface="Courier New" pitchFamily="49" charset="0"/>
+              <a:ea typeface="Calibri"/>
+              <a:cs typeface="Courier New" pitchFamily="49" charset="0"/>
+            </a:endParaRPr>
+          </a:p>
+          <a:p>
+            <a:pPr marL="0" indent="0">
+              <a:lnSpc>
+                <a:spcPct val="115000"/>
+              </a:lnSpc>
+              <a:spcAft>
+                <a:spcPts val="0"/>
+              </a:spcAft>
+              <a:buNone/>
+            </a:pPr>
+            <a:r>
+              <a:rPr lang="de-CH" sz="1600" dirty="0">
+                <a:solidFill>
+                  <a:srgbClr val="000000"/>
+                </a:solidFill>
+                <a:latin typeface="Courier New" pitchFamily="49" charset="0"/>
+                <a:ea typeface="Calibri"/>
+                <a:cs typeface="Courier New" pitchFamily="49" charset="0"/>
+              </a:rPr>
+              <a:t>    </a:t>
+            </a:r>
+            <a:r>
+              <a:rPr lang="de-CH" sz="1600" b="1" dirty="0" err="1">
+                <a:solidFill>
+                  <a:srgbClr val="000080"/>
+                </a:solidFill>
+                <a:latin typeface="Courier New" pitchFamily="49" charset="0"/>
+                <a:ea typeface="Calibri"/>
+                <a:cs typeface="Courier New" pitchFamily="49" charset="0"/>
+              </a:rPr>
+              <a:t>new</a:t>
+            </a:r>
+            <a:r>
+              <a:rPr lang="de-CH" sz="1600" dirty="0">
+                <a:solidFill>
+                  <a:srgbClr val="000000"/>
+                </a:solidFill>
+                <a:latin typeface="Courier New" pitchFamily="49" charset="0"/>
+                <a:ea typeface="Calibri"/>
+                <a:cs typeface="Courier New" pitchFamily="49" charset="0"/>
+              </a:rPr>
+              <a:t> </a:t>
+            </a:r>
+            <a:r>
+              <a:rPr lang="de-CH" sz="1600" dirty="0" err="1">
+                <a:solidFill>
+                  <a:srgbClr val="000000"/>
+                </a:solidFill>
+                <a:latin typeface="Courier New" pitchFamily="49" charset="0"/>
+                <a:ea typeface="Calibri"/>
+                <a:cs typeface="Courier New" pitchFamily="49" charset="0"/>
+              </a:rPr>
+              <a:t>Ext</a:t>
+            </a:r>
+            <a:r>
+              <a:rPr lang="de-CH" sz="1600" b="1" dirty="0" err="1">
+                <a:solidFill>
+                  <a:srgbClr val="000000"/>
+                </a:solidFill>
+                <a:latin typeface="Courier New" pitchFamily="49" charset="0"/>
+                <a:ea typeface="Calibri"/>
+                <a:cs typeface="Courier New" pitchFamily="49" charset="0"/>
+              </a:rPr>
+              <a:t>.</a:t>
+            </a:r>
+            <a:r>
+              <a:rPr lang="de-CH" sz="1600" dirty="0" err="1">
+                <a:solidFill>
+                  <a:srgbClr val="000000"/>
+                </a:solidFill>
+                <a:latin typeface="Courier New" pitchFamily="49" charset="0"/>
+                <a:ea typeface="Calibri"/>
+                <a:cs typeface="Courier New" pitchFamily="49" charset="0"/>
+              </a:rPr>
+              <a:t>Application</a:t>
+            </a:r>
+            <a:r>
+              <a:rPr lang="de-CH" sz="1600" b="1" dirty="0">
+                <a:solidFill>
+                  <a:srgbClr val="000000"/>
+                </a:solidFill>
+                <a:latin typeface="Courier New" pitchFamily="49" charset="0"/>
+                <a:ea typeface="Calibri"/>
+                <a:cs typeface="Courier New" pitchFamily="49" charset="0"/>
+              </a:rPr>
+              <a:t>({</a:t>
+            </a:r>
+            <a:endParaRPr lang="de-CH" sz="1600" dirty="0">
+              <a:latin typeface="Courier New" pitchFamily="49" charset="0"/>
+              <a:ea typeface="Calibri"/>
+              <a:cs typeface="Courier New" pitchFamily="49" charset="0"/>
+            </a:endParaRPr>
+          </a:p>
+          <a:p>
+            <a:pPr marL="0" indent="0">
+              <a:lnSpc>
+                <a:spcPct val="115000"/>
+              </a:lnSpc>
+              <a:spcAft>
+                <a:spcPts val="0"/>
+              </a:spcAft>
+              <a:buNone/>
+            </a:pPr>
+            <a:r>
+              <a:rPr lang="de-CH" sz="1600" dirty="0">
+                <a:solidFill>
+                  <a:srgbClr val="000000"/>
+                </a:solidFill>
+                <a:latin typeface="Courier New" pitchFamily="49" charset="0"/>
+                <a:ea typeface="Calibri"/>
+                <a:cs typeface="Courier New" pitchFamily="49" charset="0"/>
+              </a:rPr>
+              <a:t>        </a:t>
+            </a:r>
+            <a:r>
+              <a:rPr lang="de-CH" sz="1600" dirty="0" err="1">
+                <a:solidFill>
+                  <a:srgbClr val="000000"/>
+                </a:solidFill>
+                <a:latin typeface="Courier New" pitchFamily="49" charset="0"/>
+                <a:ea typeface="Calibri"/>
+                <a:cs typeface="Courier New" pitchFamily="49" charset="0"/>
+              </a:rPr>
+              <a:t>launch</a:t>
+            </a:r>
+            <a:r>
+              <a:rPr lang="de-CH" sz="1600" b="1" dirty="0">
+                <a:solidFill>
+                  <a:srgbClr val="000000"/>
+                </a:solidFill>
+                <a:latin typeface="Courier New" pitchFamily="49" charset="0"/>
+                <a:ea typeface="Calibri"/>
+                <a:cs typeface="Courier New" pitchFamily="49" charset="0"/>
+              </a:rPr>
+              <a:t>:</a:t>
+            </a:r>
+            <a:r>
+              <a:rPr lang="de-CH" sz="1600" dirty="0">
+                <a:solidFill>
+                  <a:srgbClr val="000000"/>
+                </a:solidFill>
+                <a:latin typeface="Courier New" pitchFamily="49" charset="0"/>
+                <a:ea typeface="Calibri"/>
+                <a:cs typeface="Courier New" pitchFamily="49" charset="0"/>
+              </a:rPr>
+              <a:t> </a:t>
+            </a:r>
+            <a:r>
+              <a:rPr lang="de-CH" sz="1600" b="1" dirty="0" err="1">
+                <a:solidFill>
+                  <a:srgbClr val="000080"/>
+                </a:solidFill>
+                <a:latin typeface="Courier New" pitchFamily="49" charset="0"/>
+                <a:ea typeface="Calibri"/>
+                <a:cs typeface="Courier New" pitchFamily="49" charset="0"/>
+              </a:rPr>
+              <a:t>function</a:t>
+            </a:r>
+            <a:r>
+              <a:rPr lang="de-CH" sz="1600" b="1" dirty="0">
+                <a:solidFill>
+                  <a:srgbClr val="000000"/>
+                </a:solidFill>
+                <a:latin typeface="Courier New" pitchFamily="49" charset="0"/>
+                <a:ea typeface="Calibri"/>
+                <a:cs typeface="Courier New" pitchFamily="49" charset="0"/>
+              </a:rPr>
+              <a:t>()</a:t>
+            </a:r>
+            <a:r>
+              <a:rPr lang="de-CH" sz="1600" dirty="0">
+                <a:solidFill>
+                  <a:srgbClr val="000000"/>
+                </a:solidFill>
+                <a:latin typeface="Courier New" pitchFamily="49" charset="0"/>
+                <a:ea typeface="Calibri"/>
+                <a:cs typeface="Courier New" pitchFamily="49" charset="0"/>
+              </a:rPr>
+              <a:t> </a:t>
+            </a:r>
+            <a:r>
+              <a:rPr lang="de-CH" sz="1600" b="1" dirty="0">
+                <a:solidFill>
+                  <a:srgbClr val="000000"/>
+                </a:solidFill>
+                <a:latin typeface="Courier New" pitchFamily="49" charset="0"/>
+                <a:ea typeface="Calibri"/>
+                <a:cs typeface="Courier New" pitchFamily="49" charset="0"/>
+              </a:rPr>
+              <a:t>{</a:t>
+            </a:r>
+            <a:endParaRPr lang="de-CH" sz="1600" dirty="0">
+              <a:latin typeface="Courier New" pitchFamily="49" charset="0"/>
+              <a:ea typeface="Calibri"/>
+              <a:cs typeface="Courier New" pitchFamily="49" charset="0"/>
+            </a:endParaRPr>
+          </a:p>
+          <a:p>
+            <a:pPr marL="0" indent="0">
+              <a:lnSpc>
+                <a:spcPct val="115000"/>
+              </a:lnSpc>
+              <a:spcAft>
+                <a:spcPts val="0"/>
+              </a:spcAft>
+              <a:buNone/>
+            </a:pPr>
+            <a:r>
+              <a:rPr lang="de-CH" sz="1600" dirty="0">
+                <a:solidFill>
+                  <a:srgbClr val="000000"/>
+                </a:solidFill>
+                <a:latin typeface="Courier New" pitchFamily="49" charset="0"/>
+                <a:ea typeface="Calibri"/>
+                <a:cs typeface="Courier New" pitchFamily="49" charset="0"/>
+              </a:rPr>
+              <a:t>            </a:t>
+            </a:r>
+            <a:r>
+              <a:rPr lang="de-CH" sz="1600" b="1" dirty="0" err="1">
+                <a:solidFill>
+                  <a:srgbClr val="000080"/>
+                </a:solidFill>
+                <a:latin typeface="Courier New" pitchFamily="49" charset="0"/>
+                <a:ea typeface="Calibri"/>
+                <a:cs typeface="Courier New" pitchFamily="49" charset="0"/>
+              </a:rPr>
+              <a:t>new</a:t>
+            </a:r>
+            <a:r>
+              <a:rPr lang="de-CH" sz="1600" dirty="0">
+                <a:solidFill>
+                  <a:srgbClr val="000000"/>
+                </a:solidFill>
+                <a:latin typeface="Courier New" pitchFamily="49" charset="0"/>
+                <a:ea typeface="Calibri"/>
+                <a:cs typeface="Courier New" pitchFamily="49" charset="0"/>
+              </a:rPr>
+              <a:t> </a:t>
+            </a:r>
+            <a:r>
+              <a:rPr lang="de-CH" sz="1600" dirty="0" err="1">
+                <a:solidFill>
+                  <a:srgbClr val="000000"/>
+                </a:solidFill>
+                <a:latin typeface="Courier New" pitchFamily="49" charset="0"/>
+                <a:ea typeface="Calibri"/>
+                <a:cs typeface="Courier New" pitchFamily="49" charset="0"/>
+              </a:rPr>
+              <a:t>Ext</a:t>
+            </a:r>
+            <a:r>
+              <a:rPr lang="de-CH" sz="1600" b="1" dirty="0" err="1">
+                <a:solidFill>
+                  <a:srgbClr val="000000"/>
+                </a:solidFill>
+                <a:latin typeface="Courier New" pitchFamily="49" charset="0"/>
+                <a:ea typeface="Calibri"/>
+                <a:cs typeface="Courier New" pitchFamily="49" charset="0"/>
+              </a:rPr>
+              <a:t>.</a:t>
+            </a:r>
+            <a:r>
+              <a:rPr lang="de-CH" sz="1600" dirty="0" err="1">
+                <a:solidFill>
+                  <a:srgbClr val="000000"/>
+                </a:solidFill>
+                <a:latin typeface="Courier New" pitchFamily="49" charset="0"/>
+                <a:ea typeface="Calibri"/>
+                <a:cs typeface="Courier New" pitchFamily="49" charset="0"/>
+              </a:rPr>
+              <a:t>Panel</a:t>
+            </a:r>
+            <a:r>
+              <a:rPr lang="de-CH" sz="1600" b="1" dirty="0">
+                <a:solidFill>
+                  <a:srgbClr val="000000"/>
+                </a:solidFill>
+                <a:latin typeface="Courier New" pitchFamily="49" charset="0"/>
+                <a:ea typeface="Calibri"/>
+                <a:cs typeface="Courier New" pitchFamily="49" charset="0"/>
+              </a:rPr>
+              <a:t>({</a:t>
+            </a:r>
+            <a:endParaRPr lang="de-CH" sz="1600" dirty="0">
+              <a:latin typeface="Courier New" pitchFamily="49" charset="0"/>
+              <a:ea typeface="Calibri"/>
+              <a:cs typeface="Courier New" pitchFamily="49" charset="0"/>
+            </a:endParaRPr>
+          </a:p>
+          <a:p>
+            <a:pPr marL="0" indent="0">
+              <a:lnSpc>
+                <a:spcPct val="115000"/>
+              </a:lnSpc>
+              <a:spcAft>
+                <a:spcPts val="0"/>
+              </a:spcAft>
+              <a:buNone/>
+            </a:pPr>
+            <a:r>
+              <a:rPr lang="de-CH" sz="1600" dirty="0">
+                <a:solidFill>
+                  <a:srgbClr val="000000"/>
+                </a:solidFill>
+                <a:latin typeface="Courier New" pitchFamily="49" charset="0"/>
+                <a:ea typeface="Calibri"/>
+                <a:cs typeface="Courier New" pitchFamily="49" charset="0"/>
+              </a:rPr>
+              <a:t>                </a:t>
+            </a:r>
+            <a:r>
+              <a:rPr lang="de-CH" sz="1600" dirty="0" err="1">
+                <a:solidFill>
+                  <a:srgbClr val="000000"/>
+                </a:solidFill>
+                <a:latin typeface="Courier New" pitchFamily="49" charset="0"/>
+                <a:ea typeface="Calibri"/>
+                <a:cs typeface="Courier New" pitchFamily="49" charset="0"/>
+              </a:rPr>
+              <a:t>fullscreen</a:t>
+            </a:r>
+            <a:r>
+              <a:rPr lang="de-CH" sz="1600" b="1" dirty="0">
+                <a:solidFill>
+                  <a:srgbClr val="000000"/>
+                </a:solidFill>
+                <a:latin typeface="Courier New" pitchFamily="49" charset="0"/>
+                <a:ea typeface="Calibri"/>
+                <a:cs typeface="Courier New" pitchFamily="49" charset="0"/>
+              </a:rPr>
+              <a:t>:</a:t>
+            </a:r>
+            <a:r>
+              <a:rPr lang="de-CH" sz="1600" dirty="0">
+                <a:solidFill>
+                  <a:srgbClr val="000000"/>
+                </a:solidFill>
+                <a:latin typeface="Courier New" pitchFamily="49" charset="0"/>
+                <a:ea typeface="Calibri"/>
+                <a:cs typeface="Courier New" pitchFamily="49" charset="0"/>
+              </a:rPr>
+              <a:t> </a:t>
+            </a:r>
+            <a:r>
+              <a:rPr lang="de-CH" sz="1600" b="1" dirty="0" err="1">
+                <a:solidFill>
+                  <a:srgbClr val="000080"/>
+                </a:solidFill>
+                <a:latin typeface="Courier New" pitchFamily="49" charset="0"/>
+                <a:ea typeface="Calibri"/>
+                <a:cs typeface="Courier New" pitchFamily="49" charset="0"/>
+              </a:rPr>
+              <a:t>true</a:t>
+            </a:r>
+            <a:r>
+              <a:rPr lang="de-CH" sz="1600" b="1" dirty="0">
+                <a:solidFill>
+                  <a:srgbClr val="000000"/>
+                </a:solidFill>
+                <a:latin typeface="Courier New" pitchFamily="49" charset="0"/>
+                <a:ea typeface="Calibri"/>
+                <a:cs typeface="Courier New" pitchFamily="49" charset="0"/>
+              </a:rPr>
+              <a:t>,</a:t>
+            </a:r>
+            <a:endParaRPr lang="de-CH" sz="1600" dirty="0">
+              <a:latin typeface="Courier New" pitchFamily="49" charset="0"/>
+              <a:ea typeface="Calibri"/>
+              <a:cs typeface="Courier New" pitchFamily="49" charset="0"/>
+            </a:endParaRPr>
+          </a:p>
+          <a:p>
+            <a:pPr marL="0" indent="0">
+              <a:lnSpc>
+                <a:spcPct val="115000"/>
+              </a:lnSpc>
+              <a:spcAft>
+                <a:spcPts val="0"/>
+              </a:spcAft>
+              <a:buNone/>
+            </a:pPr>
+            <a:r>
+              <a:rPr lang="de-CH" sz="1600" dirty="0">
+                <a:solidFill>
+                  <a:srgbClr val="000000"/>
+                </a:solidFill>
+                <a:latin typeface="Courier New" pitchFamily="49" charset="0"/>
+                <a:ea typeface="Calibri"/>
+                <a:cs typeface="Courier New" pitchFamily="49" charset="0"/>
+              </a:rPr>
+              <a:t>                </a:t>
+            </a:r>
+            <a:r>
+              <a:rPr lang="de-CH" sz="1600" dirty="0" err="1">
+                <a:solidFill>
+                  <a:srgbClr val="000000"/>
+                </a:solidFill>
+                <a:latin typeface="Courier New" pitchFamily="49" charset="0"/>
+                <a:ea typeface="Calibri"/>
+                <a:cs typeface="Courier New" pitchFamily="49" charset="0"/>
+              </a:rPr>
+              <a:t>html</a:t>
+            </a:r>
+            <a:r>
+              <a:rPr lang="de-CH" sz="1600" b="1" dirty="0">
+                <a:solidFill>
+                  <a:srgbClr val="000000"/>
+                </a:solidFill>
+                <a:latin typeface="Courier New" pitchFamily="49" charset="0"/>
+                <a:ea typeface="Calibri"/>
+                <a:cs typeface="Courier New" pitchFamily="49" charset="0"/>
+              </a:rPr>
+              <a:t>:</a:t>
+            </a:r>
+            <a:r>
+              <a:rPr lang="de-CH" sz="1600" dirty="0">
+                <a:solidFill>
+                  <a:srgbClr val="000000"/>
+                </a:solidFill>
+                <a:latin typeface="Courier New" pitchFamily="49" charset="0"/>
+                <a:ea typeface="Calibri"/>
+                <a:cs typeface="Courier New" pitchFamily="49" charset="0"/>
+              </a:rPr>
+              <a:t> </a:t>
+            </a:r>
+            <a:r>
+              <a:rPr lang="de-CH" sz="1600" dirty="0">
+                <a:solidFill>
+                  <a:srgbClr val="808080"/>
+                </a:solidFill>
+                <a:latin typeface="Courier New" pitchFamily="49" charset="0"/>
+                <a:ea typeface="Calibri"/>
+                <a:cs typeface="Courier New" pitchFamily="49" charset="0"/>
+              </a:rPr>
+              <a:t>'</a:t>
+            </a:r>
+            <a:r>
+              <a:rPr lang="de-CH" sz="1600" dirty="0" err="1">
+                <a:solidFill>
+                  <a:srgbClr val="808080"/>
+                </a:solidFill>
+                <a:latin typeface="Courier New" pitchFamily="49" charset="0"/>
+                <a:ea typeface="Calibri"/>
+                <a:cs typeface="Courier New" pitchFamily="49" charset="0"/>
+              </a:rPr>
+              <a:t>Hello</a:t>
+            </a:r>
+            <a:r>
+              <a:rPr lang="de-CH" sz="1600" dirty="0">
+                <a:solidFill>
+                  <a:srgbClr val="808080"/>
+                </a:solidFill>
+                <a:latin typeface="Courier New" pitchFamily="49" charset="0"/>
+                <a:ea typeface="Calibri"/>
+                <a:cs typeface="Courier New" pitchFamily="49" charset="0"/>
+              </a:rPr>
+              <a:t> World!'</a:t>
+            </a:r>
+            <a:endParaRPr lang="de-CH" sz="1600" dirty="0">
+              <a:latin typeface="Courier New" pitchFamily="49" charset="0"/>
+              <a:ea typeface="Calibri"/>
+              <a:cs typeface="Courier New" pitchFamily="49" charset="0"/>
+            </a:endParaRPr>
+          </a:p>
+          <a:p>
+            <a:pPr marL="0" indent="0">
+              <a:lnSpc>
+                <a:spcPct val="115000"/>
+              </a:lnSpc>
+              <a:spcAft>
+                <a:spcPts val="0"/>
+              </a:spcAft>
+              <a:buNone/>
+            </a:pPr>
+            <a:r>
+              <a:rPr lang="de-CH" sz="1600" dirty="0">
+                <a:solidFill>
+                  <a:srgbClr val="000000"/>
+                </a:solidFill>
+                <a:latin typeface="Courier New" pitchFamily="49" charset="0"/>
+                <a:ea typeface="Calibri"/>
+                <a:cs typeface="Courier New" pitchFamily="49" charset="0"/>
+              </a:rPr>
+              <a:t>            </a:t>
+            </a:r>
+            <a:r>
+              <a:rPr lang="de-CH" sz="1600" b="1" dirty="0">
+                <a:solidFill>
+                  <a:srgbClr val="000000"/>
+                </a:solidFill>
+                <a:latin typeface="Courier New" pitchFamily="49" charset="0"/>
+                <a:ea typeface="Calibri"/>
+                <a:cs typeface="Courier New" pitchFamily="49" charset="0"/>
+              </a:rPr>
+              <a:t>});</a:t>
+            </a:r>
+            <a:endParaRPr lang="de-CH" sz="1600" dirty="0">
+              <a:latin typeface="Courier New" pitchFamily="49" charset="0"/>
+              <a:ea typeface="Calibri"/>
+              <a:cs typeface="Courier New" pitchFamily="49" charset="0"/>
+            </a:endParaRPr>
+          </a:p>
+          <a:p>
+            <a:pPr marL="0" indent="0">
+              <a:lnSpc>
+                <a:spcPct val="115000"/>
+              </a:lnSpc>
+              <a:spcAft>
+                <a:spcPts val="0"/>
+              </a:spcAft>
+              <a:buNone/>
+            </a:pPr>
+            <a:r>
+              <a:rPr lang="de-CH" sz="1600" dirty="0">
+                <a:solidFill>
+                  <a:srgbClr val="000000"/>
+                </a:solidFill>
+                <a:latin typeface="Courier New" pitchFamily="49" charset="0"/>
+                <a:ea typeface="Calibri"/>
+                <a:cs typeface="Courier New" pitchFamily="49" charset="0"/>
+              </a:rPr>
+              <a:t>        </a:t>
+            </a:r>
+            <a:r>
+              <a:rPr lang="de-CH" sz="1600" b="1" dirty="0">
+                <a:solidFill>
+                  <a:srgbClr val="000000"/>
+                </a:solidFill>
+                <a:latin typeface="Courier New" pitchFamily="49" charset="0"/>
+                <a:ea typeface="Calibri"/>
+                <a:cs typeface="Courier New" pitchFamily="49" charset="0"/>
+              </a:rPr>
+              <a:t>}</a:t>
+            </a:r>
+            <a:endParaRPr lang="de-CH" sz="1600" dirty="0">
+              <a:latin typeface="Courier New" pitchFamily="49" charset="0"/>
+              <a:ea typeface="Calibri"/>
+              <a:cs typeface="Courier New" pitchFamily="49" charset="0"/>
+            </a:endParaRPr>
+          </a:p>
+          <a:p>
+            <a:pPr marL="0" indent="0">
+              <a:lnSpc>
+                <a:spcPct val="115000"/>
+              </a:lnSpc>
+              <a:spcAft>
+                <a:spcPts val="0"/>
+              </a:spcAft>
+              <a:buNone/>
+            </a:pPr>
+            <a:r>
+              <a:rPr lang="de-CH" sz="1600" dirty="0">
+                <a:solidFill>
+                  <a:srgbClr val="000000"/>
+                </a:solidFill>
+                <a:latin typeface="Courier New" pitchFamily="49" charset="0"/>
+                <a:ea typeface="Calibri"/>
+                <a:cs typeface="Courier New" pitchFamily="49" charset="0"/>
+              </a:rPr>
+              <a:t>    </a:t>
+            </a:r>
+            <a:r>
+              <a:rPr lang="de-CH" sz="1600" b="1" dirty="0">
+                <a:solidFill>
+                  <a:srgbClr val="000000"/>
+                </a:solidFill>
+                <a:latin typeface="Courier New" pitchFamily="49" charset="0"/>
+                <a:ea typeface="Calibri"/>
+                <a:cs typeface="Courier New" pitchFamily="49" charset="0"/>
+              </a:rPr>
+              <a:t>});</a:t>
+            </a:r>
+            <a:endParaRPr lang="de-CH" sz="1600" dirty="0">
+              <a:latin typeface="Courier New" pitchFamily="49" charset="0"/>
+              <a:ea typeface="Calibri"/>
+              <a:cs typeface="Courier New" pitchFamily="49" charset="0"/>
+            </a:endParaRPr>
+          </a:p>
+          <a:p>
+            <a:pPr marL="0" indent="0">
+              <a:lnSpc>
+                <a:spcPct val="115000"/>
+              </a:lnSpc>
+              <a:spcAft>
+                <a:spcPts val="1000"/>
+              </a:spcAft>
+              <a:buNone/>
+            </a:pPr>
+            <a:r>
+              <a:rPr lang="de-CH" sz="1600" b="1" dirty="0">
+                <a:solidFill>
+                  <a:srgbClr val="000000"/>
+                </a:solidFill>
+                <a:latin typeface="Courier New" pitchFamily="49" charset="0"/>
+                <a:ea typeface="Calibri"/>
+                <a:cs typeface="Courier New" pitchFamily="49" charset="0"/>
+              </a:rPr>
+              <a:t>&lt;/</a:t>
+            </a:r>
+            <a:r>
+              <a:rPr lang="de-CH" sz="1600" dirty="0" err="1">
+                <a:solidFill>
+                  <a:srgbClr val="000000"/>
+                </a:solidFill>
+                <a:latin typeface="Courier New" pitchFamily="49" charset="0"/>
+                <a:ea typeface="Calibri"/>
+                <a:cs typeface="Courier New" pitchFamily="49" charset="0"/>
+              </a:rPr>
+              <a:t>script</a:t>
+            </a:r>
+            <a:r>
+              <a:rPr lang="de-CH" sz="1600" b="1" dirty="0">
+                <a:solidFill>
+                  <a:srgbClr val="000000"/>
+                </a:solidFill>
+                <a:latin typeface="Courier New" pitchFamily="49" charset="0"/>
+                <a:ea typeface="Calibri"/>
+                <a:cs typeface="Courier New" pitchFamily="49" charset="0"/>
+              </a:rPr>
+              <a:t>&gt;</a:t>
+            </a:r>
+            <a:endParaRPr lang="de-CH" sz="1600" dirty="0">
+              <a:effectLst/>
+              <a:latin typeface="Courier New" pitchFamily="49" charset="0"/>
+              <a:ea typeface="Calibri"/>
+              <a:cs typeface="Courier New" pitchFamily="49" charset="0"/>
+            </a:endParaRPr>
+          </a:p>
+        </p:txBody>
+      </p:sp>
+      <p:pic>
+        <p:nvPicPr>
+          <p:cNvPr id="1027" name="Picture 3"/>
+          <p:cNvPicPr>
+            <a:picLocks noChangeAspect="1" noChangeArrowheads="1"/>
+          </p:cNvPicPr>
+          <p:nvPr/>
+        </p:nvPicPr>
+        <p:blipFill>
+          <a:blip r:embed="rId2">
+            <a:extLst>
+              <a:ext uri="{28A0092B-C50C-407E-A947-70E740481C1C}">
+                <a14:useLocalDpi xmlns:a14="http://schemas.microsoft.com/office/drawing/2010/main" val="0"/>
+              </a:ext>
+            </a:extLst>
+          </a:blip>
+          <a:srcRect/>
+          <a:stretch>
+            <a:fillRect/>
+          </a:stretch>
+        </p:blipFill>
+        <p:spPr bwMode="auto">
+          <a:xfrm>
+            <a:off x="3851920" y="4509120"/>
+            <a:ext cx="4848225" cy="1543050"/>
+          </a:xfrm>
+          <a:prstGeom prst="rect">
+            <a:avLst/>
+          </a:prstGeom>
+          <a:noFill/>
+          <a:ln>
+            <a:noFill/>
+          </a:ln>
+          <a:effectLst/>
+          <a:extLst>
+            <a:ext uri="{909E8E84-426E-40DD-AFC4-6F175D3DCCD1}">
+              <a14:hiddenFill xmlns:a14="http://schemas.microsoft.com/office/drawing/2010/main">
+                <a:solidFill>
+                  <a:schemeClr val="accent1"/>
+                </a:solidFill>
+              </a14:hiddenFill>
+            </a:ext>
+            <a:ext uri="{91240B29-F687-4F45-9708-019B960494DF}">
+              <a14:hiddenLine xmlns:a14="http://schemas.microsoft.com/office/drawing/2010/main" w="9525">
+                <a:solidFill>
+                  <a:schemeClr val="tx1"/>
+                </a:solidFill>
+                <a:miter lim="800000"/>
+                <a:headEnd/>
+                <a:tailEnd/>
+              </a14:hiddenLine>
+            </a:ext>
+            <a:ext uri="{AF507438-7753-43E0-B8FC-AC1667EBCBE1}">
+              <a14:hiddenEffects xmlns:a14="http://schemas.microsoft.com/office/drawing/2010/main">
+                <a:effectLst>
+                  <a:outerShdw dist="35921" dir="2700000" algn="ctr" rotWithShape="0">
+                    <a:schemeClr val="bg2"/>
+                  </a:outerShdw>
+                </a:effectLst>
+              </a14:hiddenEffects>
+            </a:ext>
+          </a:extLst>
+        </p:spPr>
+      </p:pic>
     </p:spTree>
     <p:extLst>
       <p:ext uri="{BB962C8B-B14F-4D97-AF65-F5344CB8AC3E}">

</xml_diff>

<commit_message>
worked on presentation: fixed styling issues
</commit_message>
<xml_diff>
--- a/_DOCUMENTATION/Presentation/Praesentation-Traildevils-XPl2.pptx
+++ b/_DOCUMENTATION/Presentation/Praesentation-Traildevils-XPl2.pptx
@@ -10948,6 +10948,18 @@
               <a:t>Sencha.io</a:t>
             </a:r>
           </a:p>
+          <a:p>
+            <a:pPr lvl="1"/>
+            <a:r>
+              <a:rPr lang="de-CH" dirty="0" err="1" smtClean="0"/>
+              <a:t>Clouddienst</a:t>
+            </a:r>
+            <a:r>
+              <a:rPr lang="de-CH" dirty="0" smtClean="0"/>
+              <a:t> für Mobile-Applikationen</a:t>
+            </a:r>
+            <a:endParaRPr lang="de-CH" dirty="0" smtClean="0"/>
+          </a:p>
         </p:txBody>
       </p:sp>
     </p:spTree>
@@ -12137,8 +12149,8 @@
         </p:nvSpPr>
         <p:spPr>
           <a:xfrm>
-            <a:off x="7545068" y="1962447"/>
-            <a:ext cx="1296144" cy="648072"/>
+            <a:off x="7308304" y="1962447"/>
+            <a:ext cx="1532908" cy="648072"/>
           </a:xfrm>
           <a:prstGeom prst="borderCallout2">
             <a:avLst>
@@ -12146,8 +12158,8 @@
               <a:gd name="adj2" fmla="val -799"/>
               <a:gd name="adj3" fmla="val 18750"/>
               <a:gd name="adj4" fmla="val -16667"/>
-              <a:gd name="adj5" fmla="val 156334"/>
-              <a:gd name="adj6" fmla="val -282968"/>
+              <a:gd name="adj5" fmla="val 143507"/>
+              <a:gd name="adj6" fmla="val -224221"/>
             </a:avLst>
           </a:prstGeom>
         </p:spPr>
@@ -12210,8 +12222,8 @@
               <a:gd name="adj2" fmla="val -799"/>
               <a:gd name="adj3" fmla="val 18750"/>
               <a:gd name="adj4" fmla="val -16667"/>
-              <a:gd name="adj5" fmla="val 187841"/>
-              <a:gd name="adj6" fmla="val -185682"/>
+              <a:gd name="adj5" fmla="val 177152"/>
+              <a:gd name="adj6" fmla="val -181163"/>
             </a:avLst>
           </a:prstGeom>
         </p:spPr>
@@ -12290,8 +12302,8 @@
               <a:gd name="adj2" fmla="val -799"/>
               <a:gd name="adj3" fmla="val 18750"/>
               <a:gd name="adj4" fmla="val -16667"/>
-              <a:gd name="adj5" fmla="val 82362"/>
-              <a:gd name="adj6" fmla="val -219858"/>
+              <a:gd name="adj5" fmla="val 67398"/>
+              <a:gd name="adj6" fmla="val -215339"/>
             </a:avLst>
           </a:prstGeom>
         </p:spPr>
@@ -12353,8 +12365,8 @@
         </p:nvSpPr>
         <p:spPr>
           <a:xfrm>
-            <a:off x="7545081" y="1052736"/>
-            <a:ext cx="1296144" cy="648072"/>
+            <a:off x="7308304" y="1196752"/>
+            <a:ext cx="1532908" cy="648072"/>
           </a:xfrm>
           <a:prstGeom prst="borderCallout2">
             <a:avLst>
@@ -12362,8 +12374,8 @@
               <a:gd name="adj2" fmla="val -799"/>
               <a:gd name="adj3" fmla="val 18750"/>
               <a:gd name="adj4" fmla="val -16667"/>
-              <a:gd name="adj5" fmla="val 223457"/>
-              <a:gd name="adj6" fmla="val -282283"/>
+              <a:gd name="adj5" fmla="val 193528"/>
+              <a:gd name="adj6" fmla="val -219920"/>
             </a:avLst>
           </a:prstGeom>
         </p:spPr>
@@ -13160,7 +13172,6 @@
               <a:rPr lang="de-CH" dirty="0" smtClean="0"/>
               <a:t>Grenzen</a:t>
             </a:r>
-            <a:endParaRPr lang="de-CH" dirty="0" smtClean="0"/>
           </a:p>
           <a:p>
             <a:pPr lvl="1"/>

</xml_diff>

<commit_message>
aufteilung / demo ablauf added
</commit_message>
<xml_diff>
--- a/_DOCUMENTATION/Presentation/Praesentation-Traildevils-XPl2.pptx
+++ b/_DOCUMENTATION/Presentation/Praesentation-Traildevils-XPl2.pptx
@@ -16,11 +16,14 @@
     <p:sldId id="264" r:id="rId10"/>
     <p:sldId id="259" r:id="rId11"/>
     <p:sldId id="274" r:id="rId12"/>
-    <p:sldId id="261" r:id="rId13"/>
+    <p:sldId id="276" r:id="rId13"/>
     <p:sldId id="262" r:id="rId14"/>
-    <p:sldId id="269" r:id="rId15"/>
-    <p:sldId id="270" r:id="rId16"/>
-    <p:sldId id="265" r:id="rId17"/>
+    <p:sldId id="265" r:id="rId15"/>
+    <p:sldId id="277" r:id="rId16"/>
+    <p:sldId id="278" r:id="rId17"/>
+    <p:sldId id="261" r:id="rId18"/>
+    <p:sldId id="269" r:id="rId19"/>
+    <p:sldId id="270" r:id="rId20"/>
   </p:sldIdLst>
   <p:sldSz cx="9144000" cy="6858000" type="screen4x3"/>
   <p:notesSz cx="6858000" cy="9144000"/>
@@ -10627,6 +10630,13 @@
   <p:clrMapOvr>
     <a:masterClrMapping/>
   </p:clrMapOvr>
+  <p:timing>
+    <p:tnLst>
+      <p:par>
+        <p:cTn id="1" dur="indefinite" restart="never" nodeType="tmRoot"/>
+      </p:par>
+    </p:tnLst>
+  </p:timing>
 </p:sld>
 </file>
 
@@ -10659,32 +10669,14 @@
         </p:nvSpPr>
         <p:spPr/>
         <p:txBody>
-          <a:bodyPr>
-            <a:normAutofit/>
-          </a:bodyPr>
+          <a:bodyPr/>
           <a:lstStyle/>
           <a:p>
             <a:r>
               <a:rPr lang="de-CH" dirty="0" smtClean="0"/>
-              <a:t>Grenzen </a:t>
-            </a:r>
-            <a:r>
-              <a:rPr lang="de-CH" sz="3500" dirty="0" smtClean="0">
-                <a:solidFill>
-                  <a:schemeClr val="bg1">
-                    <a:lumMod val="50000"/>
-                  </a:schemeClr>
-                </a:solidFill>
-              </a:rPr>
-              <a:t>von Web-Applikationen</a:t>
-            </a:r>
-            <a:endParaRPr lang="de-CH" sz="3500" dirty="0">
-              <a:solidFill>
-                <a:schemeClr val="bg1">
-                  <a:lumMod val="50000"/>
-                </a:schemeClr>
-              </a:solidFill>
-            </a:endParaRPr>
+              <a:t>Offlinefähigkeit</a:t>
+            </a:r>
+            <a:endParaRPr lang="de-CH" dirty="0"/>
           </a:p>
         </p:txBody>
       </p:sp>
@@ -10700,141 +10692,144 @@
         </p:nvSpPr>
         <p:spPr/>
         <p:txBody>
-          <a:bodyPr>
-            <a:normAutofit/>
-          </a:bodyPr>
+          <a:bodyPr/>
           <a:lstStyle/>
           <a:p>
             <a:r>
+              <a:rPr lang="de-CH" dirty="0"/>
+              <a:t>Caching der </a:t>
+            </a:r>
+            <a:r>
+              <a:rPr lang="de-CH" dirty="0" err="1"/>
+              <a:t>Sourcen</a:t>
+            </a:r>
+            <a:r>
+              <a:rPr lang="de-CH" dirty="0"/>
+              <a:t> (JavaScript, CSS, HTML usw</a:t>
+            </a:r>
+            <a:r>
               <a:rPr lang="de-CH" dirty="0" smtClean="0"/>
-              <a:t>Weniger native Features im Browser</a:t>
+              <a:t>.)</a:t>
             </a:r>
           </a:p>
           <a:p>
             <a:pPr lvl="1"/>
             <a:r>
               <a:rPr lang="de-CH" dirty="0" smtClean="0"/>
-              <a:t>Es werden aber laufend neue Features dazukommen</a:t>
+              <a:t>Definition in Manifest-File</a:t>
+            </a:r>
+          </a:p>
+          <a:p>
+            <a:r>
+              <a:rPr lang="de-CH" dirty="0" smtClean="0"/>
+              <a:t>Datenablage im </a:t>
+            </a:r>
+            <a:r>
+              <a:rPr lang="de-CH" dirty="0" err="1" smtClean="0"/>
+              <a:t>Local</a:t>
+            </a:r>
+            <a:r>
+              <a:rPr lang="de-CH" dirty="0" smtClean="0"/>
+              <a:t> Storage des Browsers</a:t>
             </a:r>
           </a:p>
           <a:p>
             <a:pPr lvl="1"/>
             <a:r>
-              <a:rPr lang="de-CH" b="1" dirty="0"/>
-              <a:t>43</a:t>
-            </a:r>
-            <a:r>
-              <a:rPr lang="de-CH" dirty="0"/>
-              <a:t> </a:t>
-            </a:r>
-            <a:r>
               <a:rPr lang="de-CH" dirty="0" smtClean="0"/>
-              <a:t>Offene </a:t>
-            </a:r>
-            <a:r>
-              <a:rPr lang="de-CH" dirty="0" err="1" smtClean="0"/>
-              <a:t>JavaScipt</a:t>
-            </a:r>
+              <a:t>Key/Value Pairs mit primitiven Datentypen</a:t>
+            </a:r>
+          </a:p>
+          <a:p>
             <a:r>
               <a:rPr lang="de-CH" dirty="0" smtClean="0"/>
-              <a:t> API </a:t>
-            </a:r>
-            <a:r>
-              <a:rPr lang="de-CH" dirty="0" err="1" smtClean="0"/>
-              <a:t>Drafts</a:t>
-            </a:r>
+              <a:t>Problem: Bilder</a:t>
+            </a:r>
+          </a:p>
+          <a:p>
+            <a:pPr lvl="1"/>
             <a:r>
               <a:rPr lang="de-CH" dirty="0" smtClean="0"/>
-              <a:t> auf W3C</a:t>
-            </a:r>
-            <a:br>
-              <a:rPr lang="de-CH" dirty="0" smtClean="0"/>
-            </a:br>
-            <a:r>
-              <a:rPr lang="de-CH" dirty="0" smtClean="0"/>
-              <a:t>(Bsp.: File API,  Vibration API, </a:t>
-            </a:r>
-            <a:r>
-              <a:rPr lang="de-CH" dirty="0" err="1" smtClean="0"/>
-              <a:t>DeviceOrientation</a:t>
-            </a:r>
-            <a:r>
-              <a:rPr lang="de-CH" dirty="0" smtClean="0"/>
-              <a:t>, </a:t>
-            </a:r>
-            <a:r>
-              <a:rPr lang="de-CH" dirty="0" err="1" smtClean="0"/>
-              <a:t>Battery</a:t>
-            </a:r>
-            <a:r>
-              <a:rPr lang="de-CH" dirty="0" smtClean="0"/>
-              <a:t> Status, XML </a:t>
-            </a:r>
-            <a:r>
-              <a:rPr lang="de-CH" dirty="0" err="1" smtClean="0"/>
-              <a:t>HttpRequest</a:t>
-            </a:r>
-            <a:r>
-              <a:rPr lang="de-CH" dirty="0" smtClean="0"/>
-              <a:t> L2, Web </a:t>
-            </a:r>
-            <a:r>
-              <a:rPr lang="de-CH" dirty="0" err="1" smtClean="0"/>
-              <a:t>Notifications</a:t>
-            </a:r>
-            <a:r>
-              <a:rPr lang="de-CH" dirty="0" smtClean="0"/>
-              <a:t>)</a:t>
-            </a:r>
-          </a:p>
-          <a:p>
-            <a:r>
-              <a:rPr lang="de-CH" dirty="0" smtClean="0"/>
-              <a:t>Performance</a:t>
-            </a:r>
-          </a:p>
-          <a:p>
-            <a:pPr lvl="1"/>
-            <a:r>
-              <a:rPr lang="de-CH" dirty="0" smtClean="0"/>
-              <a:t>JavaScript ist vergleichsweise langsam</a:t>
-            </a:r>
-          </a:p>
-          <a:p>
-            <a:r>
-              <a:rPr lang="de-CH" dirty="0" smtClean="0"/>
-              <a:t>Speicher/Cache (Web Storage) nur </a:t>
-            </a:r>
-            <a:r>
-              <a:rPr lang="de-CH" b="1" dirty="0" smtClean="0"/>
-              <a:t>vollständig</a:t>
-            </a:r>
-            <a:r>
-              <a:rPr lang="de-CH" dirty="0" smtClean="0"/>
-              <a:t> löschbar</a:t>
-            </a:r>
+              <a:t>Umwandlung in Base64 (Data-URL)</a:t>
+            </a:r>
+          </a:p>
+          <a:p>
             <a:endParaRPr lang="de-CH" dirty="0"/>
           </a:p>
         </p:txBody>
       </p:sp>
+      <p:pic>
+        <p:nvPicPr>
+          <p:cNvPr id="1027" name="Picture 3"/>
+          <p:cNvPicPr>
+            <a:picLocks noChangeAspect="1" noChangeArrowheads="1"/>
+          </p:cNvPicPr>
+          <p:nvPr/>
+        </p:nvPicPr>
+        <p:blipFill rotWithShape="1">
+          <a:blip r:embed="rId2">
+            <a:extLst>
+              <a:ext uri="{28A0092B-C50C-407E-A947-70E740481C1C}">
+                <a14:useLocalDpi xmlns:a14="http://schemas.microsoft.com/office/drawing/2010/main" val="0"/>
+              </a:ext>
+            </a:extLst>
+          </a:blip>
+          <a:srcRect r="16161"/>
+          <a:stretch/>
+        </p:blipFill>
+        <p:spPr bwMode="auto">
+          <a:xfrm>
+            <a:off x="323528" y="4703471"/>
+            <a:ext cx="8063943" cy="1749865"/>
+          </a:xfrm>
+          <a:prstGeom prst="rect">
+            <a:avLst/>
+          </a:prstGeom>
+          <a:noFill/>
+          <a:ln>
+            <a:noFill/>
+          </a:ln>
+          <a:effectLst/>
+          <a:extLst>
+            <a:ext uri="{909E8E84-426E-40DD-AFC4-6F175D3DCCD1}">
+              <a14:hiddenFill xmlns:a14="http://schemas.microsoft.com/office/drawing/2010/main">
+                <a:solidFill>
+                  <a:schemeClr val="accent1"/>
+                </a:solidFill>
+              </a14:hiddenFill>
+            </a:ext>
+            <a:ext uri="{91240B29-F687-4F45-9708-019B960494DF}">
+              <a14:hiddenLine xmlns:a14="http://schemas.microsoft.com/office/drawing/2010/main" w="9525">
+                <a:solidFill>
+                  <a:schemeClr val="tx1"/>
+                </a:solidFill>
+                <a:miter lim="800000"/>
+                <a:headEnd/>
+                <a:tailEnd/>
+              </a14:hiddenLine>
+            </a:ext>
+            <a:ext uri="{AF507438-7753-43E0-B8FC-AC1667EBCBE1}">
+              <a14:hiddenEffects xmlns:a14="http://schemas.microsoft.com/office/drawing/2010/main">
+                <a:effectLst>
+                  <a:outerShdw dist="35921" dir="2700000" algn="ctr" rotWithShape="0">
+                    <a:schemeClr val="bg2"/>
+                  </a:outerShdw>
+                </a:effectLst>
+              </a14:hiddenEffects>
+            </a:ext>
+          </a:extLst>
+        </p:spPr>
+      </p:pic>
     </p:spTree>
     <p:extLst>
       <p:ext uri="{BB962C8B-B14F-4D97-AF65-F5344CB8AC3E}">
-        <p14:creationId xmlns:p14="http://schemas.microsoft.com/office/powerpoint/2010/main" val="993603494"/>
+        <p14:creationId xmlns:p14="http://schemas.microsoft.com/office/powerpoint/2010/main" val="2101432062"/>
       </p:ext>
     </p:extLst>
   </p:cSld>
   <p:clrMapOvr>
     <a:masterClrMapping/>
   </p:clrMapOvr>
-  <mc:AlternateContent xmlns:mc="http://schemas.openxmlformats.org/markup-compatibility/2006" xmlns:p14="http://schemas.microsoft.com/office/powerpoint/2010/main">
-    <mc:Choice Requires="p14">
-      <p:transition spd="slow" p14:dur="2000"/>
-    </mc:Choice>
-    <mc:Fallback xmlns="">
-      <p:transition spd="slow"/>
-    </mc:Fallback>
-  </mc:AlternateContent>
   <p:timing>
     <p:tnLst>
       <p:par>
@@ -10927,7 +10922,11 @@
             <a:pPr lvl="1"/>
             <a:r>
               <a:rPr lang="de-CH" dirty="0" smtClean="0"/>
-              <a:t>Höhere Performance auf </a:t>
+              <a:t>Bessere Performance </a:t>
+            </a:r>
+            <a:r>
+              <a:rPr lang="de-CH" dirty="0" smtClean="0"/>
+              <a:t>auf </a:t>
             </a:r>
             <a:r>
               <a:rPr lang="de-CH" dirty="0" err="1" smtClean="0"/>
@@ -10939,8 +10938,20 @@
             <a:pPr lvl="1"/>
             <a:r>
               <a:rPr lang="de-CH" dirty="0" smtClean="0"/>
-              <a:t>Neues Klassensystem</a:t>
-            </a:r>
+              <a:t>Neues </a:t>
+            </a:r>
+            <a:r>
+              <a:rPr lang="de-CH" dirty="0" smtClean="0"/>
+              <a:t>Klassensystem</a:t>
+            </a:r>
+          </a:p>
+          <a:p>
+            <a:pPr lvl="1"/>
+            <a:r>
+              <a:rPr lang="de-CH" dirty="0" smtClean="0"/>
+              <a:t>Dynamisches Laden von JavaScript</a:t>
+            </a:r>
+            <a:endParaRPr lang="de-CH" dirty="0" smtClean="0"/>
           </a:p>
           <a:p>
             <a:r>
@@ -10958,10 +10969,201 @@
               <a:rPr lang="de-CH" dirty="0" smtClean="0"/>
               <a:t> für Mobile-Applikationen</a:t>
             </a:r>
-            <a:endParaRPr lang="de-CH" dirty="0" smtClean="0"/>
           </a:p>
         </p:txBody>
       </p:sp>
+      <p:pic>
+        <p:nvPicPr>
+          <p:cNvPr id="4" name="Picture 2"/>
+          <p:cNvPicPr>
+            <a:picLocks noChangeAspect="1" noChangeArrowheads="1"/>
+          </p:cNvPicPr>
+          <p:nvPr/>
+        </p:nvPicPr>
+        <p:blipFill>
+          <a:blip r:embed="rId2">
+            <a:extLst>
+              <a:ext uri="{28A0092B-C50C-407E-A947-70E740481C1C}">
+                <a14:useLocalDpi xmlns:a14="http://schemas.microsoft.com/office/drawing/2010/main" val="0"/>
+              </a:ext>
+            </a:extLst>
+          </a:blip>
+          <a:srcRect/>
+          <a:stretch>
+            <a:fillRect/>
+          </a:stretch>
+        </p:blipFill>
+        <p:spPr bwMode="auto">
+          <a:xfrm>
+            <a:off x="6509019" y="4221087"/>
+            <a:ext cx="1857375" cy="523875"/>
+          </a:xfrm>
+          <a:prstGeom prst="rect">
+            <a:avLst/>
+          </a:prstGeom>
+          <a:noFill/>
+          <a:ln>
+            <a:noFill/>
+          </a:ln>
+          <a:effectLst/>
+          <a:extLst>
+            <a:ext uri="{909E8E84-426E-40DD-AFC4-6F175D3DCCD1}">
+              <a14:hiddenFill xmlns:a14="http://schemas.microsoft.com/office/drawing/2010/main">
+                <a:solidFill>
+                  <a:schemeClr val="accent1"/>
+                </a:solidFill>
+              </a14:hiddenFill>
+            </a:ext>
+            <a:ext uri="{91240B29-F687-4F45-9708-019B960494DF}">
+              <a14:hiddenLine xmlns:a14="http://schemas.microsoft.com/office/drawing/2010/main" w="9525">
+                <a:solidFill>
+                  <a:schemeClr val="tx1"/>
+                </a:solidFill>
+                <a:miter lim="800000"/>
+                <a:headEnd/>
+                <a:tailEnd/>
+              </a14:hiddenLine>
+            </a:ext>
+            <a:ext uri="{AF507438-7753-43E0-B8FC-AC1667EBCBE1}">
+              <a14:hiddenEffects xmlns:a14="http://schemas.microsoft.com/office/drawing/2010/main">
+                <a:effectLst>
+                  <a:outerShdw dist="35921" dir="2700000" algn="ctr" rotWithShape="0">
+                    <a:schemeClr val="bg2"/>
+                  </a:outerShdw>
+                </a:effectLst>
+              </a14:hiddenEffects>
+            </a:ext>
+          </a:extLst>
+        </p:spPr>
+      </p:pic>
+      <p:pic>
+        <p:nvPicPr>
+          <p:cNvPr id="5" name="Picture 2"/>
+          <p:cNvPicPr>
+            <a:picLocks noChangeAspect="1" noChangeArrowheads="1"/>
+          </p:cNvPicPr>
+          <p:nvPr/>
+        </p:nvPicPr>
+        <p:blipFill>
+          <a:blip r:embed="rId3">
+            <a:extLst>
+              <a:ext uri="{28A0092B-C50C-407E-A947-70E740481C1C}">
+                <a14:useLocalDpi xmlns:a14="http://schemas.microsoft.com/office/drawing/2010/main" val="0"/>
+              </a:ext>
+            </a:extLst>
+          </a:blip>
+          <a:srcRect/>
+          <a:stretch>
+            <a:fillRect/>
+          </a:stretch>
+        </p:blipFill>
+        <p:spPr bwMode="auto">
+          <a:xfrm>
+            <a:off x="6509019" y="1988840"/>
+            <a:ext cx="1400175" cy="619125"/>
+          </a:xfrm>
+          <a:prstGeom prst="rect">
+            <a:avLst/>
+          </a:prstGeom>
+          <a:noFill/>
+          <a:ln>
+            <a:noFill/>
+          </a:ln>
+          <a:effectLst/>
+          <a:extLst>
+            <a:ext uri="{909E8E84-426E-40DD-AFC4-6F175D3DCCD1}">
+              <a14:hiddenFill xmlns:a14="http://schemas.microsoft.com/office/drawing/2010/main">
+                <a:solidFill>
+                  <a:schemeClr val="accent1"/>
+                </a:solidFill>
+              </a14:hiddenFill>
+            </a:ext>
+            <a:ext uri="{91240B29-F687-4F45-9708-019B960494DF}">
+              <a14:hiddenLine xmlns:a14="http://schemas.microsoft.com/office/drawing/2010/main" w="9525">
+                <a:solidFill>
+                  <a:schemeClr val="tx1"/>
+                </a:solidFill>
+                <a:miter lim="800000"/>
+                <a:headEnd/>
+                <a:tailEnd/>
+              </a14:hiddenLine>
+            </a:ext>
+            <a:ext uri="{AF507438-7753-43E0-B8FC-AC1667EBCBE1}">
+              <a14:hiddenEffects xmlns:a14="http://schemas.microsoft.com/office/drawing/2010/main">
+                <a:effectLst>
+                  <a:outerShdw dist="35921" dir="2700000" algn="ctr" rotWithShape="0">
+                    <a:schemeClr val="bg2"/>
+                  </a:outerShdw>
+                </a:effectLst>
+              </a14:hiddenEffects>
+            </a:ext>
+          </a:extLst>
+        </p:spPr>
+      </p:pic>
+      <p:pic>
+        <p:nvPicPr>
+          <p:cNvPr id="6" name="Picture 3"/>
+          <p:cNvPicPr>
+            <a:picLocks noChangeAspect="1" noChangeArrowheads="1"/>
+          </p:cNvPicPr>
+          <p:nvPr/>
+        </p:nvPicPr>
+        <p:blipFill>
+          <a:blip r:embed="rId4">
+            <a:extLst>
+              <a:ext uri="{28A0092B-C50C-407E-A947-70E740481C1C}">
+                <a14:useLocalDpi xmlns:a14="http://schemas.microsoft.com/office/drawing/2010/main" val="0"/>
+              </a:ext>
+            </a:extLst>
+          </a:blip>
+          <a:srcRect/>
+          <a:stretch>
+            <a:fillRect/>
+          </a:stretch>
+        </p:blipFill>
+        <p:spPr bwMode="auto">
+          <a:xfrm>
+            <a:off x="1835696" y="4941168"/>
+            <a:ext cx="2629792" cy="1577875"/>
+          </a:xfrm>
+          <a:prstGeom prst="rect">
+            <a:avLst/>
+          </a:prstGeom>
+          <a:noFill/>
+          <a:ln>
+            <a:noFill/>
+          </a:ln>
+          <a:effectLst/>
+          <a:extLst>
+            <a:ext uri="{909E8E84-426E-40DD-AFC4-6F175D3DCCD1}">
+              <a14:hiddenFill xmlns:a14="http://schemas.microsoft.com/office/drawing/2010/main">
+                <a:solidFill>
+                  <a:schemeClr val="accent1"/>
+                </a:solidFill>
+              </a14:hiddenFill>
+            </a:ext>
+            <a:ext uri="{91240B29-F687-4F45-9708-019B960494DF}">
+              <a14:hiddenLine xmlns:a14="http://schemas.microsoft.com/office/drawing/2010/main" w="9525">
+                <a:solidFill>
+                  <a:schemeClr val="tx1"/>
+                </a:solidFill>
+                <a:miter lim="800000"/>
+                <a:headEnd/>
+                <a:tailEnd/>
+              </a14:hiddenLine>
+            </a:ext>
+            <a:ext uri="{AF507438-7753-43E0-B8FC-AC1667EBCBE1}">
+              <a14:hiddenEffects xmlns:a14="http://schemas.microsoft.com/office/drawing/2010/main">
+                <a:effectLst>
+                  <a:outerShdw dist="35921" dir="2700000" algn="ctr" rotWithShape="0">
+                    <a:schemeClr val="bg2"/>
+                  </a:outerShdw>
+                </a:effectLst>
+              </a14:hiddenEffects>
+            </a:ext>
+          </a:extLst>
+        </p:spPr>
+      </p:pic>
     </p:spTree>
     <p:extLst>
       <p:ext uri="{BB962C8B-B14F-4D97-AF65-F5344CB8AC3E}">
@@ -11009,6 +11211,567 @@
       </p:grpSpPr>
       <p:sp>
         <p:nvSpPr>
+          <p:cNvPr id="2" name="Titel 1"/>
+          <p:cNvSpPr>
+            <a:spLocks noGrp="1"/>
+          </p:cNvSpPr>
+          <p:nvPr>
+            <p:ph type="title"/>
+          </p:nvPr>
+        </p:nvSpPr>
+        <p:spPr/>
+        <p:txBody>
+          <a:bodyPr/>
+          <a:lstStyle/>
+          <a:p>
+            <a:r>
+              <a:rPr lang="de-CH" dirty="0" smtClean="0"/>
+              <a:t>Das müssen Sie wissen!</a:t>
+            </a:r>
+            <a:br>
+              <a:rPr lang="de-CH" dirty="0" smtClean="0"/>
+            </a:br>
+            <a:r>
+              <a:rPr lang="de-CH" sz="3500" dirty="0" err="1" smtClean="0">
+                <a:solidFill>
+                  <a:schemeClr val="bg1">
+                    <a:lumMod val="50000"/>
+                  </a:schemeClr>
+                </a:solidFill>
+              </a:rPr>
+              <a:t>Lessons</a:t>
+            </a:r>
+            <a:r>
+              <a:rPr lang="de-CH" sz="3500" dirty="0" smtClean="0">
+                <a:solidFill>
+                  <a:schemeClr val="bg1">
+                    <a:lumMod val="50000"/>
+                  </a:schemeClr>
+                </a:solidFill>
+              </a:rPr>
+              <a:t> </a:t>
+            </a:r>
+            <a:r>
+              <a:rPr lang="de-CH" sz="3500" dirty="0" err="1" smtClean="0">
+                <a:solidFill>
+                  <a:schemeClr val="bg1">
+                    <a:lumMod val="50000"/>
+                  </a:schemeClr>
+                </a:solidFill>
+              </a:rPr>
+              <a:t>learned</a:t>
+            </a:r>
+            <a:endParaRPr lang="de-CH" sz="3500" dirty="0">
+              <a:solidFill>
+                <a:schemeClr val="bg1">
+                  <a:lumMod val="50000"/>
+                </a:schemeClr>
+              </a:solidFill>
+            </a:endParaRPr>
+          </a:p>
+        </p:txBody>
+      </p:sp>
+      <p:sp>
+        <p:nvSpPr>
+          <p:cNvPr id="3" name="Inhaltsplatzhalter 2"/>
+          <p:cNvSpPr>
+            <a:spLocks noGrp="1"/>
+          </p:cNvSpPr>
+          <p:nvPr>
+            <p:ph idx="1"/>
+          </p:nvPr>
+        </p:nvSpPr>
+        <p:spPr/>
+        <p:txBody>
+          <a:bodyPr/>
+          <a:lstStyle/>
+          <a:p>
+            <a:r>
+              <a:rPr lang="de-CH" dirty="0" err="1" smtClean="0"/>
+              <a:t>Sencha</a:t>
+            </a:r>
+            <a:r>
+              <a:rPr lang="de-CH" dirty="0" smtClean="0"/>
+              <a:t> Touch macht Freude</a:t>
+            </a:r>
+          </a:p>
+          <a:p>
+            <a:r>
+              <a:rPr lang="de-CH" dirty="0" smtClean="0"/>
+              <a:t>JavaScript eher weniger</a:t>
+            </a:r>
+          </a:p>
+          <a:p>
+            <a:r>
+              <a:rPr lang="de-CH" dirty="0" smtClean="0"/>
+              <a:t>Grössere mobile Web-Applikationen sind noch nicht «salonfähig»</a:t>
+            </a:r>
+          </a:p>
+          <a:p>
+            <a:pPr lvl="1"/>
+            <a:r>
+              <a:rPr lang="de-CH" dirty="0" smtClean="0"/>
+              <a:t>Es fehlt der native Touch</a:t>
+            </a:r>
+          </a:p>
+          <a:p>
+            <a:pPr lvl="1"/>
+            <a:r>
+              <a:rPr lang="de-CH" dirty="0" smtClean="0"/>
+              <a:t>Zu hohe Reaktionszeiten</a:t>
+            </a:r>
+          </a:p>
+          <a:p>
+            <a:r>
+              <a:rPr lang="de-CH" dirty="0" smtClean="0"/>
+              <a:t>Übergangslösung: Hybrid-Apps (z.B. </a:t>
+            </a:r>
+            <a:r>
+              <a:rPr lang="de-CH" dirty="0" smtClean="0"/>
+              <a:t>mit </a:t>
+            </a:r>
+            <a:r>
+              <a:rPr lang="de-CH" dirty="0" err="1" smtClean="0"/>
+              <a:t>PhoneGap</a:t>
+            </a:r>
+            <a:r>
+              <a:rPr lang="de-CH" dirty="0" smtClean="0"/>
+              <a:t>)</a:t>
+            </a:r>
+          </a:p>
+          <a:p>
+            <a:endParaRPr lang="de-CH" dirty="0" smtClean="0"/>
+          </a:p>
+        </p:txBody>
+      </p:sp>
+    </p:spTree>
+    <p:extLst>
+      <p:ext uri="{BB962C8B-B14F-4D97-AF65-F5344CB8AC3E}">
+        <p14:creationId xmlns:p14="http://schemas.microsoft.com/office/powerpoint/2010/main" val="2720684902"/>
+      </p:ext>
+    </p:extLst>
+  </p:cSld>
+  <p:clrMapOvr>
+    <a:masterClrMapping/>
+  </p:clrMapOvr>
+  <p:timing>
+    <p:tnLst>
+      <p:par>
+        <p:cTn id="1" dur="indefinite" restart="never" nodeType="tmRoot"/>
+      </p:par>
+    </p:tnLst>
+  </p:timing>
+</p:sld>
+</file>
+
+<file path=ppt/slides/slide15.xml><?xml version="1.0" encoding="utf-8"?>
+<p:sld xmlns:a="http://schemas.openxmlformats.org/drawingml/2006/main" xmlns:r="http://schemas.openxmlformats.org/officeDocument/2006/relationships" xmlns:p="http://schemas.openxmlformats.org/presentationml/2006/main">
+  <p:cSld>
+    <p:spTree>
+      <p:nvGrpSpPr>
+        <p:cNvPr id="1" name=""/>
+        <p:cNvGrpSpPr/>
+        <p:nvPr/>
+      </p:nvGrpSpPr>
+      <p:grpSpPr>
+        <a:xfrm>
+          <a:off x="0" y="0"/>
+          <a:ext cx="0" cy="0"/>
+          <a:chOff x="0" y="0"/>
+          <a:chExt cx="0" cy="0"/>
+        </a:xfrm>
+      </p:grpSpPr>
+      <p:sp>
+        <p:nvSpPr>
+          <p:cNvPr id="2" name="Titel 1"/>
+          <p:cNvSpPr>
+            <a:spLocks noGrp="1"/>
+          </p:cNvSpPr>
+          <p:nvPr>
+            <p:ph type="title"/>
+          </p:nvPr>
+        </p:nvSpPr>
+        <p:spPr/>
+        <p:txBody>
+          <a:bodyPr/>
+          <a:lstStyle/>
+          <a:p>
+            <a:r>
+              <a:rPr lang="de-CH" dirty="0" smtClean="0"/>
+              <a:t>Happy </a:t>
+            </a:r>
+            <a:r>
+              <a:rPr lang="de-CH" dirty="0" err="1" smtClean="0"/>
+              <a:t>Birthday</a:t>
+            </a:r>
+            <a:r>
+              <a:rPr lang="de-CH" dirty="0" smtClean="0"/>
+              <a:t>, Herr Müller!</a:t>
+            </a:r>
+            <a:endParaRPr lang="de-CH" dirty="0"/>
+          </a:p>
+        </p:txBody>
+      </p:sp>
+      <p:sp>
+        <p:nvSpPr>
+          <p:cNvPr id="3" name="Inhaltsplatzhalter 2"/>
+          <p:cNvSpPr>
+            <a:spLocks noGrp="1"/>
+          </p:cNvSpPr>
+          <p:nvPr>
+            <p:ph idx="1"/>
+          </p:nvPr>
+        </p:nvSpPr>
+        <p:spPr/>
+        <p:txBody>
+          <a:bodyPr/>
+          <a:lstStyle/>
+          <a:p>
+            <a:endParaRPr lang="de-CH"/>
+          </a:p>
+        </p:txBody>
+      </p:sp>
+    </p:spTree>
+    <p:extLst>
+      <p:ext uri="{BB962C8B-B14F-4D97-AF65-F5344CB8AC3E}">
+        <p14:creationId xmlns:p14="http://schemas.microsoft.com/office/powerpoint/2010/main" val="589852139"/>
+      </p:ext>
+    </p:extLst>
+  </p:cSld>
+  <p:clrMapOvr>
+    <a:masterClrMapping/>
+  </p:clrMapOvr>
+</p:sld>
+</file>
+
+<file path=ppt/slides/slide16.xml><?xml version="1.0" encoding="utf-8"?>
+<p:sld xmlns:a="http://schemas.openxmlformats.org/drawingml/2006/main" xmlns:r="http://schemas.openxmlformats.org/officeDocument/2006/relationships" xmlns:p="http://schemas.openxmlformats.org/presentationml/2006/main">
+  <p:cSld>
+    <p:spTree>
+      <p:nvGrpSpPr>
+        <p:cNvPr id="1" name=""/>
+        <p:cNvGrpSpPr/>
+        <p:nvPr/>
+      </p:nvGrpSpPr>
+      <p:grpSpPr>
+        <a:xfrm>
+          <a:off x="0" y="0"/>
+          <a:ext cx="0" cy="0"/>
+          <a:chOff x="0" y="0"/>
+          <a:chExt cx="0" cy="0"/>
+        </a:xfrm>
+      </p:grpSpPr>
+      <p:sp>
+        <p:nvSpPr>
+          <p:cNvPr id="2" name="Titel 1"/>
+          <p:cNvSpPr>
+            <a:spLocks noGrp="1"/>
+          </p:cNvSpPr>
+          <p:nvPr>
+            <p:ph type="title"/>
+          </p:nvPr>
+        </p:nvSpPr>
+        <p:spPr/>
+        <p:txBody>
+          <a:bodyPr/>
+          <a:lstStyle/>
+          <a:p>
+            <a:endParaRPr lang="de-CH" dirty="0"/>
+          </a:p>
+        </p:txBody>
+      </p:sp>
+      <p:sp>
+        <p:nvSpPr>
+          <p:cNvPr id="3" name="Inhaltsplatzhalter 2"/>
+          <p:cNvSpPr>
+            <a:spLocks noGrp="1"/>
+          </p:cNvSpPr>
+          <p:nvPr>
+            <p:ph idx="1"/>
+          </p:nvPr>
+        </p:nvSpPr>
+        <p:spPr/>
+        <p:txBody>
+          <a:bodyPr/>
+          <a:lstStyle/>
+          <a:p>
+            <a:r>
+              <a:rPr lang="de-CH" dirty="0" err="1" smtClean="0"/>
+              <a:t>Todo</a:t>
+            </a:r>
+            <a:r>
+              <a:rPr lang="de-CH" dirty="0" smtClean="0"/>
+              <a:t>:</a:t>
+            </a:r>
+          </a:p>
+          <a:p>
+            <a:r>
+              <a:rPr lang="de-CH" dirty="0" smtClean="0"/>
+              <a:t>Suche -&gt; Filter</a:t>
+            </a:r>
+          </a:p>
+          <a:p>
+            <a:r>
+              <a:rPr lang="de-CH" dirty="0" smtClean="0"/>
+              <a:t>Geburtstag</a:t>
+            </a:r>
+          </a:p>
+          <a:p>
+            <a:r>
+              <a:rPr lang="de-CH" dirty="0" smtClean="0"/>
+              <a:t>Fragen</a:t>
+            </a:r>
+            <a:endParaRPr lang="de-CH" dirty="0"/>
+          </a:p>
+        </p:txBody>
+      </p:sp>
+    </p:spTree>
+    <p:extLst>
+      <p:ext uri="{BB962C8B-B14F-4D97-AF65-F5344CB8AC3E}">
+        <p14:creationId xmlns:p14="http://schemas.microsoft.com/office/powerpoint/2010/main" val="2877869851"/>
+      </p:ext>
+    </p:extLst>
+  </p:cSld>
+  <p:clrMapOvr>
+    <a:masterClrMapping/>
+  </p:clrMapOvr>
+</p:sld>
+</file>
+
+<file path=ppt/slides/slide17.xml><?xml version="1.0" encoding="utf-8"?>
+<p:sld xmlns:a="http://schemas.openxmlformats.org/drawingml/2006/main" xmlns:r="http://schemas.openxmlformats.org/officeDocument/2006/relationships" xmlns:p="http://schemas.openxmlformats.org/presentationml/2006/main">
+  <p:cSld>
+    <p:spTree>
+      <p:nvGrpSpPr>
+        <p:cNvPr id="1" name=""/>
+        <p:cNvGrpSpPr/>
+        <p:nvPr/>
+      </p:nvGrpSpPr>
+      <p:grpSpPr>
+        <a:xfrm>
+          <a:off x="0" y="0"/>
+          <a:ext cx="0" cy="0"/>
+          <a:chOff x="0" y="0"/>
+          <a:chExt cx="0" cy="0"/>
+        </a:xfrm>
+      </p:grpSpPr>
+      <p:sp>
+        <p:nvSpPr>
+          <p:cNvPr id="2" name="Titel 1"/>
+          <p:cNvSpPr>
+            <a:spLocks noGrp="1"/>
+          </p:cNvSpPr>
+          <p:nvPr>
+            <p:ph type="title"/>
+          </p:nvPr>
+        </p:nvSpPr>
+        <p:spPr/>
+        <p:txBody>
+          <a:bodyPr>
+            <a:normAutofit/>
+          </a:bodyPr>
+          <a:lstStyle/>
+          <a:p>
+            <a:r>
+              <a:rPr lang="de-CH" dirty="0" smtClean="0"/>
+              <a:t>Grenzen </a:t>
+            </a:r>
+            <a:r>
+              <a:rPr lang="de-CH" sz="3500" dirty="0" smtClean="0">
+                <a:solidFill>
+                  <a:schemeClr val="bg1">
+                    <a:lumMod val="50000"/>
+                  </a:schemeClr>
+                </a:solidFill>
+              </a:rPr>
+              <a:t>von Web-Applikationen</a:t>
+            </a:r>
+            <a:endParaRPr lang="de-CH" sz="3500" dirty="0">
+              <a:solidFill>
+                <a:schemeClr val="bg1">
+                  <a:lumMod val="50000"/>
+                </a:schemeClr>
+              </a:solidFill>
+            </a:endParaRPr>
+          </a:p>
+        </p:txBody>
+      </p:sp>
+      <p:sp>
+        <p:nvSpPr>
+          <p:cNvPr id="3" name="Inhaltsplatzhalter 2"/>
+          <p:cNvSpPr>
+            <a:spLocks noGrp="1"/>
+          </p:cNvSpPr>
+          <p:nvPr>
+            <p:ph idx="1"/>
+          </p:nvPr>
+        </p:nvSpPr>
+        <p:spPr/>
+        <p:txBody>
+          <a:bodyPr>
+            <a:normAutofit/>
+          </a:bodyPr>
+          <a:lstStyle/>
+          <a:p>
+            <a:r>
+              <a:rPr lang="de-CH" dirty="0" smtClean="0"/>
+              <a:t>Weniger native Features im Browser</a:t>
+            </a:r>
+          </a:p>
+          <a:p>
+            <a:pPr lvl="1"/>
+            <a:r>
+              <a:rPr lang="de-CH" dirty="0" smtClean="0"/>
+              <a:t>Es werden aber laufend neue Features dazukommen</a:t>
+            </a:r>
+          </a:p>
+          <a:p>
+            <a:pPr lvl="1"/>
+            <a:r>
+              <a:rPr lang="de-CH" b="1" dirty="0"/>
+              <a:t>43</a:t>
+            </a:r>
+            <a:r>
+              <a:rPr lang="de-CH" dirty="0"/>
+              <a:t> </a:t>
+            </a:r>
+            <a:r>
+              <a:rPr lang="de-CH" dirty="0" smtClean="0"/>
+              <a:t>Offene </a:t>
+            </a:r>
+            <a:r>
+              <a:rPr lang="de-CH" dirty="0" err="1" smtClean="0"/>
+              <a:t>JavaScipt</a:t>
+            </a:r>
+            <a:r>
+              <a:rPr lang="de-CH" dirty="0" smtClean="0"/>
+              <a:t> API </a:t>
+            </a:r>
+            <a:r>
+              <a:rPr lang="de-CH" dirty="0" err="1" smtClean="0"/>
+              <a:t>Drafts</a:t>
+            </a:r>
+            <a:r>
+              <a:rPr lang="de-CH" dirty="0" smtClean="0"/>
+              <a:t> auf W3C</a:t>
+            </a:r>
+            <a:br>
+              <a:rPr lang="de-CH" dirty="0" smtClean="0"/>
+            </a:br>
+            <a:r>
+              <a:rPr lang="de-CH" dirty="0" smtClean="0"/>
+              <a:t>(Bsp.: File API,  Vibration API, </a:t>
+            </a:r>
+            <a:r>
+              <a:rPr lang="de-CH" dirty="0" err="1" smtClean="0"/>
+              <a:t>DeviceOrientation</a:t>
+            </a:r>
+            <a:r>
+              <a:rPr lang="de-CH" dirty="0" smtClean="0"/>
+              <a:t>, </a:t>
+            </a:r>
+            <a:r>
+              <a:rPr lang="de-CH" dirty="0" err="1" smtClean="0"/>
+              <a:t>Battery</a:t>
+            </a:r>
+            <a:r>
+              <a:rPr lang="de-CH" dirty="0" smtClean="0"/>
+              <a:t> Status, XML </a:t>
+            </a:r>
+            <a:r>
+              <a:rPr lang="de-CH" dirty="0" err="1" smtClean="0"/>
+              <a:t>HttpRequest</a:t>
+            </a:r>
+            <a:r>
+              <a:rPr lang="de-CH" dirty="0" smtClean="0"/>
+              <a:t> L2, Web </a:t>
+            </a:r>
+            <a:r>
+              <a:rPr lang="de-CH" dirty="0" err="1" smtClean="0"/>
+              <a:t>Notifications</a:t>
+            </a:r>
+            <a:r>
+              <a:rPr lang="de-CH" dirty="0" smtClean="0"/>
+              <a:t>)</a:t>
+            </a:r>
+          </a:p>
+          <a:p>
+            <a:r>
+              <a:rPr lang="de-CH" dirty="0" smtClean="0"/>
+              <a:t>Performance</a:t>
+            </a:r>
+          </a:p>
+          <a:p>
+            <a:pPr lvl="1"/>
+            <a:r>
+              <a:rPr lang="de-CH" dirty="0" smtClean="0"/>
+              <a:t>JavaScript ist vergleichsweise langsam</a:t>
+            </a:r>
+          </a:p>
+          <a:p>
+            <a:r>
+              <a:rPr lang="de-CH" dirty="0" smtClean="0"/>
+              <a:t>Speicher/Cache (Web Storage) nur </a:t>
+            </a:r>
+            <a:r>
+              <a:rPr lang="de-CH" b="1" dirty="0" smtClean="0"/>
+              <a:t>vollständig</a:t>
+            </a:r>
+            <a:r>
+              <a:rPr lang="de-CH" dirty="0" smtClean="0"/>
+              <a:t> löschbar</a:t>
+            </a:r>
+            <a:endParaRPr lang="de-CH" dirty="0"/>
+          </a:p>
+        </p:txBody>
+      </p:sp>
+    </p:spTree>
+    <p:extLst>
+      <p:ext uri="{BB962C8B-B14F-4D97-AF65-F5344CB8AC3E}">
+        <p14:creationId xmlns:p14="http://schemas.microsoft.com/office/powerpoint/2010/main" val="993603494"/>
+      </p:ext>
+    </p:extLst>
+  </p:cSld>
+  <p:clrMapOvr>
+    <a:masterClrMapping/>
+  </p:clrMapOvr>
+  <mc:AlternateContent xmlns:mc="http://schemas.openxmlformats.org/markup-compatibility/2006" xmlns:p14="http://schemas.microsoft.com/office/powerpoint/2010/main">
+    <mc:Choice Requires="p14">
+      <p:transition spd="slow" p14:dur="2000"/>
+    </mc:Choice>
+    <mc:Fallback xmlns="">
+      <p:transition spd="slow"/>
+    </mc:Fallback>
+  </mc:AlternateContent>
+  <p:timing>
+    <p:tnLst>
+      <p:par>
+        <p:cTn id="1" dur="indefinite" restart="never" nodeType="tmRoot"/>
+      </p:par>
+    </p:tnLst>
+  </p:timing>
+</p:sld>
+</file>
+
+<file path=ppt/slides/slide18.xml><?xml version="1.0" encoding="utf-8"?>
+<p:sld xmlns:a="http://schemas.openxmlformats.org/drawingml/2006/main" xmlns:r="http://schemas.openxmlformats.org/officeDocument/2006/relationships" xmlns:p="http://schemas.openxmlformats.org/presentationml/2006/main">
+  <p:cSld>
+    <p:spTree>
+      <p:nvGrpSpPr>
+        <p:cNvPr id="1" name=""/>
+        <p:cNvGrpSpPr/>
+        <p:nvPr/>
+      </p:nvGrpSpPr>
+      <p:grpSpPr>
+        <a:xfrm>
+          <a:off x="0" y="0"/>
+          <a:ext cx="0" cy="0"/>
+          <a:chOff x="0" y="0"/>
+          <a:chExt cx="0" cy="0"/>
+        </a:xfrm>
+      </p:grpSpPr>
+      <p:sp>
+        <p:nvSpPr>
           <p:cNvPr id="2" name="Title 1"/>
           <p:cNvSpPr>
             <a:spLocks noGrp="1"/>
@@ -12492,7 +13255,7 @@
 </p:sld>
 </file>
 
-<file path=ppt/slides/slide15.xml><?xml version="1.0" encoding="utf-8"?>
+<file path=ppt/slides/slide19.xml><?xml version="1.0" encoding="utf-8"?>
 <p:sld xmlns:a="http://schemas.openxmlformats.org/drawingml/2006/main" xmlns:r="http://schemas.openxmlformats.org/officeDocument/2006/relationships" xmlns:p="http://schemas.openxmlformats.org/presentationml/2006/main">
   <p:cSld>
     <p:spTree>
@@ -12902,174 +13665,6 @@
 </p:sld>
 </file>
 
-<file path=ppt/slides/slide16.xml><?xml version="1.0" encoding="utf-8"?>
-<p:sld xmlns:a="http://schemas.openxmlformats.org/drawingml/2006/main" xmlns:r="http://schemas.openxmlformats.org/officeDocument/2006/relationships" xmlns:p="http://schemas.openxmlformats.org/presentationml/2006/main">
-  <p:cSld>
-    <p:spTree>
-      <p:nvGrpSpPr>
-        <p:cNvPr id="1" name=""/>
-        <p:cNvGrpSpPr/>
-        <p:nvPr/>
-      </p:nvGrpSpPr>
-      <p:grpSpPr>
-        <a:xfrm>
-          <a:off x="0" y="0"/>
-          <a:ext cx="0" cy="0"/>
-          <a:chOff x="0" y="0"/>
-          <a:chExt cx="0" cy="0"/>
-        </a:xfrm>
-      </p:grpSpPr>
-      <p:sp>
-        <p:nvSpPr>
-          <p:cNvPr id="2" name="Titel 1"/>
-          <p:cNvSpPr>
-            <a:spLocks noGrp="1"/>
-          </p:cNvSpPr>
-          <p:nvPr>
-            <p:ph type="title"/>
-          </p:nvPr>
-        </p:nvSpPr>
-        <p:spPr/>
-        <p:txBody>
-          <a:bodyPr/>
-          <a:lstStyle/>
-          <a:p>
-            <a:r>
-              <a:rPr lang="de-CH" dirty="0" smtClean="0"/>
-              <a:t>Das müssen Sie wissen!</a:t>
-            </a:r>
-            <a:br>
-              <a:rPr lang="de-CH" dirty="0" smtClean="0"/>
-            </a:br>
-            <a:r>
-              <a:rPr lang="de-CH" sz="3500" dirty="0" err="1" smtClean="0">
-                <a:solidFill>
-                  <a:schemeClr val="bg1">
-                    <a:lumMod val="50000"/>
-                  </a:schemeClr>
-                </a:solidFill>
-              </a:rPr>
-              <a:t>Lessons</a:t>
-            </a:r>
-            <a:r>
-              <a:rPr lang="de-CH" sz="3500" dirty="0" smtClean="0">
-                <a:solidFill>
-                  <a:schemeClr val="bg1">
-                    <a:lumMod val="50000"/>
-                  </a:schemeClr>
-                </a:solidFill>
-              </a:rPr>
-              <a:t> </a:t>
-            </a:r>
-            <a:r>
-              <a:rPr lang="de-CH" sz="3500" dirty="0" err="1" smtClean="0">
-                <a:solidFill>
-                  <a:schemeClr val="bg1">
-                    <a:lumMod val="50000"/>
-                  </a:schemeClr>
-                </a:solidFill>
-              </a:rPr>
-              <a:t>learned</a:t>
-            </a:r>
-            <a:endParaRPr lang="de-CH" sz="3500" dirty="0">
-              <a:solidFill>
-                <a:schemeClr val="bg1">
-                  <a:lumMod val="50000"/>
-                </a:schemeClr>
-              </a:solidFill>
-            </a:endParaRPr>
-          </a:p>
-        </p:txBody>
-      </p:sp>
-      <p:sp>
-        <p:nvSpPr>
-          <p:cNvPr id="3" name="Inhaltsplatzhalter 2"/>
-          <p:cNvSpPr>
-            <a:spLocks noGrp="1"/>
-          </p:cNvSpPr>
-          <p:nvPr>
-            <p:ph idx="1"/>
-          </p:nvPr>
-        </p:nvSpPr>
-        <p:spPr/>
-        <p:txBody>
-          <a:bodyPr/>
-          <a:lstStyle/>
-          <a:p>
-            <a:r>
-              <a:rPr lang="de-CH" dirty="0" err="1" smtClean="0"/>
-              <a:t>Sencha</a:t>
-            </a:r>
-            <a:r>
-              <a:rPr lang="de-CH" dirty="0" smtClean="0"/>
-              <a:t> Touch macht Freude</a:t>
-            </a:r>
-          </a:p>
-          <a:p>
-            <a:r>
-              <a:rPr lang="de-CH" dirty="0" smtClean="0"/>
-              <a:t>JavaScript eher weniger</a:t>
-            </a:r>
-          </a:p>
-          <a:p>
-            <a:r>
-              <a:rPr lang="de-CH" dirty="0" smtClean="0"/>
-              <a:t>Grössere mobile Web-Applikationen sind noch nicht «salonfähig»</a:t>
-            </a:r>
-          </a:p>
-          <a:p>
-            <a:pPr lvl="1"/>
-            <a:r>
-              <a:rPr lang="de-CH" dirty="0" smtClean="0"/>
-              <a:t>Es fehlt der native Touch</a:t>
-            </a:r>
-          </a:p>
-          <a:p>
-            <a:pPr lvl="1"/>
-            <a:r>
-              <a:rPr lang="de-CH" dirty="0" smtClean="0"/>
-              <a:t>Zu hohe Reaktionszeiten</a:t>
-            </a:r>
-          </a:p>
-          <a:p>
-            <a:r>
-              <a:rPr lang="de-CH" dirty="0" smtClean="0"/>
-              <a:t>Übergangslösung: Hybrid-Apps (z.B. </a:t>
-            </a:r>
-            <a:r>
-              <a:rPr lang="de-CH" dirty="0" err="1" smtClean="0"/>
-              <a:t>PhoneGap</a:t>
-            </a:r>
-            <a:r>
-              <a:rPr lang="de-CH" dirty="0" smtClean="0"/>
-              <a:t>)</a:t>
-            </a:r>
-          </a:p>
-          <a:p>
-            <a:endParaRPr lang="de-CH" dirty="0" smtClean="0"/>
-          </a:p>
-        </p:txBody>
-      </p:sp>
-    </p:spTree>
-    <p:extLst>
-      <p:ext uri="{BB962C8B-B14F-4D97-AF65-F5344CB8AC3E}">
-        <p14:creationId xmlns:p14="http://schemas.microsoft.com/office/powerpoint/2010/main" val="2720684902"/>
-      </p:ext>
-    </p:extLst>
-  </p:cSld>
-  <p:clrMapOvr>
-    <a:masterClrMapping/>
-  </p:clrMapOvr>
-  <p:timing>
-    <p:tnLst>
-      <p:par>
-        <p:cTn id="1" dur="indefinite" restart="never" nodeType="tmRoot"/>
-      </p:par>
-    </p:tnLst>
-  </p:timing>
-</p:sld>
-</file>
-
 <file path=ppt/slides/slide2.xml><?xml version="1.0" encoding="utf-8"?>
 <p:sld xmlns:a="http://schemas.openxmlformats.org/drawingml/2006/main" xmlns:r="http://schemas.openxmlformats.org/officeDocument/2006/relationships" xmlns:p="http://schemas.openxmlformats.org/presentationml/2006/main">
   <p:cSld>
@@ -13163,23 +13758,21 @@
           <a:p>
             <a:r>
               <a:rPr lang="de-CH" dirty="0" smtClean="0"/>
-              <a:t>Webapplikationen</a:t>
-            </a:r>
-          </a:p>
-          <a:p>
-            <a:pPr lvl="1"/>
+              <a:t>UI Richtlinien</a:t>
+            </a:r>
+          </a:p>
+          <a:p>
             <a:r>
               <a:rPr lang="de-CH" dirty="0" smtClean="0"/>
-              <a:t>Grenzen</a:t>
-            </a:r>
-          </a:p>
-          <a:p>
-            <a:pPr lvl="1"/>
+              <a:t>Offlinefähigkeit</a:t>
+            </a:r>
+          </a:p>
+          <a:p>
             <a:r>
               <a:rPr lang="de-CH" dirty="0" smtClean="0"/>
-              <a:t>Zukunft </a:t>
-            </a:r>
-            <a:endParaRPr lang="de-CH" dirty="0"/>
+              <a:t>Zukunft</a:t>
+            </a:r>
+            <a:endParaRPr lang="de-CH" dirty="0" smtClean="0"/>
           </a:p>
         </p:txBody>
       </p:sp>
@@ -18331,6 +18924,70 @@
           </a:p>
         </p:txBody>
       </p:sp>
+      <p:pic>
+        <p:nvPicPr>
+          <p:cNvPr id="2051" name="Picture 3"/>
+          <p:cNvPicPr>
+            <a:picLocks noChangeAspect="1" noChangeArrowheads="1"/>
+          </p:cNvPicPr>
+          <p:nvPr/>
+        </p:nvPicPr>
+        <p:blipFill>
+          <a:blip r:embed="rId2">
+            <a:extLst>
+              <a:ext uri="{28A0092B-C50C-407E-A947-70E740481C1C}">
+                <a14:useLocalDpi xmlns:a14="http://schemas.microsoft.com/office/drawing/2010/main" val="0"/>
+              </a:ext>
+            </a:extLst>
+          </a:blip>
+          <a:srcRect/>
+          <a:stretch>
+            <a:fillRect/>
+          </a:stretch>
+        </p:blipFill>
+        <p:spPr bwMode="auto">
+          <a:xfrm>
+            <a:off x="7314519" y="581650"/>
+            <a:ext cx="1447800" cy="923925"/>
+          </a:xfrm>
+          <a:prstGeom prst="rect">
+            <a:avLst/>
+          </a:prstGeom>
+          <a:noFill/>
+          <a:ln>
+            <a:noFill/>
+          </a:ln>
+          <a:effectLst/>
+          <a:extLst>
+            <a:ext uri="{909E8E84-426E-40DD-AFC4-6F175D3DCCD1}">
+              <a14:hiddenFill xmlns:a14="http://schemas.microsoft.com/office/drawing/2010/main">
+                <a:solidFill>
+                  <a:schemeClr val="accent1"/>
+                </a:solidFill>
+              </a14:hiddenFill>
+            </a:ext>
+            <a:ext uri="{91240B29-F687-4F45-9708-019B960494DF}">
+              <a14:hiddenLine xmlns:a14="http://schemas.microsoft.com/office/drawing/2010/main" w="9525">
+                <a:solidFill>
+                  <a:schemeClr val="tx1"/>
+                </a:solidFill>
+                <a:miter lim="800000"/>
+                <a:headEnd/>
+                <a:tailEnd/>
+              </a14:hiddenLine>
+            </a:ext>
+            <a:ext uri="{AF507438-7753-43E0-B8FC-AC1667EBCBE1}">
+              <a14:hiddenEffects xmlns:a14="http://schemas.microsoft.com/office/drawing/2010/main">
+                <a:effectLst>
+                  <a:outerShdw dist="35921" dir="2700000" algn="ctr" rotWithShape="0">
+                    <a:schemeClr val="bg2"/>
+                  </a:outerShdw>
+                </a:effectLst>
+              </a14:hiddenEffects>
+            </a:ext>
+          </a:extLst>
+        </p:spPr>
+      </p:pic>
     </p:spTree>
     <p:extLst>
       <p:ext uri="{BB962C8B-B14F-4D97-AF65-F5344CB8AC3E}">

</xml_diff>

<commit_message>
changed search-placeholder: Suchen... -> Filtern...
</commit_message>
<xml_diff>
--- a/_DOCUMENTATION/Presentation/Praesentation-Traildevils-XPl2.pptx
+++ b/_DOCUMENTATION/Presentation/Praesentation-Traildevils-XPl2.pptx
@@ -11218,115 +11218,6 @@
       </p:sp>
       <p:grpSp>
         <p:nvGrpSpPr>
-          <p:cNvPr id="5" name="Gruppieren 4"/>
-          <p:cNvGrpSpPr/>
-          <p:nvPr/>
-        </p:nvGrpSpPr>
-        <p:grpSpPr>
-          <a:xfrm>
-            <a:off x="1229916" y="4004482"/>
-            <a:ext cx="3009900" cy="698302"/>
-            <a:chOff x="1001316" y="3811314"/>
-            <a:chExt cx="3009900" cy="698302"/>
-          </a:xfrm>
-        </p:grpSpPr>
-        <p:pic>
-          <p:nvPicPr>
-            <p:cNvPr id="1026" name="Picture 2"/>
-            <p:cNvPicPr>
-              <a:picLocks noChangeAspect="1" noChangeArrowheads="1"/>
-            </p:cNvPicPr>
-            <p:nvPr/>
-          </p:nvPicPr>
-          <p:blipFill>
-            <a:blip r:embed="rId2">
-              <a:extLst>
-                <a:ext uri="{28A0092B-C50C-407E-A947-70E740481C1C}">
-                  <a14:useLocalDpi xmlns:a14="http://schemas.microsoft.com/office/drawing/2010/main" val="0"/>
-                </a:ext>
-              </a:extLst>
-            </a:blip>
-            <a:srcRect/>
-            <a:stretch>
-              <a:fillRect/>
-            </a:stretch>
-          </p:blipFill>
-          <p:spPr bwMode="auto">
-            <a:xfrm>
-              <a:off x="1001316" y="3811314"/>
-              <a:ext cx="3009900" cy="390525"/>
-            </a:xfrm>
-            <a:prstGeom prst="rect">
-              <a:avLst/>
-            </a:prstGeom>
-            <a:noFill/>
-            <a:ln>
-              <a:noFill/>
-            </a:ln>
-            <a:effectLst/>
-            <a:extLst>
-              <a:ext uri="{909E8E84-426E-40DD-AFC4-6F175D3DCCD1}">
-                <a14:hiddenFill xmlns:a14="http://schemas.microsoft.com/office/drawing/2010/main">
-                  <a:solidFill>
-                    <a:schemeClr val="accent1"/>
-                  </a:solidFill>
-                </a14:hiddenFill>
-              </a:ext>
-              <a:ext uri="{91240B29-F687-4F45-9708-019B960494DF}">
-                <a14:hiddenLine xmlns:a14="http://schemas.microsoft.com/office/drawing/2010/main" w="9525">
-                  <a:solidFill>
-                    <a:schemeClr val="tx1"/>
-                  </a:solidFill>
-                  <a:miter lim="800000"/>
-                  <a:headEnd/>
-                  <a:tailEnd/>
-                </a14:hiddenLine>
-              </a:ext>
-              <a:ext uri="{AF507438-7753-43E0-B8FC-AC1667EBCBE1}">
-                <a14:hiddenEffects xmlns:a14="http://schemas.microsoft.com/office/drawing/2010/main">
-                  <a:effectLst>
-                    <a:outerShdw dist="35921" dir="2700000" algn="ctr" rotWithShape="0">
-                      <a:schemeClr val="bg2"/>
-                    </a:outerShdw>
-                  </a:effectLst>
-                </a14:hiddenEffects>
-              </a:ext>
-            </a:extLst>
-          </p:spPr>
-        </p:pic>
-        <p:sp>
-          <p:nvSpPr>
-            <p:cNvPr id="4" name="Textfeld 3"/>
-            <p:cNvSpPr txBox="1"/>
-            <p:nvPr/>
-          </p:nvSpPr>
-          <p:spPr>
-            <a:xfrm>
-              <a:off x="1001316" y="4201839"/>
-              <a:ext cx="3009900" cy="307777"/>
-            </a:xfrm>
-            <a:prstGeom prst="rect">
-              <a:avLst/>
-            </a:prstGeom>
-            <a:noFill/>
-          </p:spPr>
-          <p:txBody>
-            <a:bodyPr wrap="square" rtlCol="0">
-              <a:spAutoFit/>
-            </a:bodyPr>
-            <a:lstStyle/>
-            <a:p>
-              <a:r>
-                <a:rPr lang="de-CH" sz="1400" i="1" dirty="0" smtClean="0"/>
-                <a:t>Suche</a:t>
-              </a:r>
-              <a:endParaRPr lang="de-CH" sz="1400" i="1" dirty="0"/>
-            </a:p>
-          </p:txBody>
-        </p:sp>
-      </p:grpSp>
-      <p:grpSp>
-        <p:nvGrpSpPr>
           <p:cNvPr id="6" name="Gruppieren 5"/>
           <p:cNvGrpSpPr/>
           <p:nvPr/>
@@ -11348,7 +11239,7 @@
             <p:nvPr/>
           </p:nvPicPr>
           <p:blipFill>
-            <a:blip r:embed="rId3">
+            <a:blip r:embed="rId2">
               <a:extLst>
                 <a:ext uri="{28A0092B-C50C-407E-A947-70E740481C1C}">
                   <a14:useLocalDpi xmlns:a14="http://schemas.microsoft.com/office/drawing/2010/main" val="0"/>
@@ -11442,7 +11333,7 @@
         </p:nvGrpSpPr>
         <p:grpSpPr>
           <a:xfrm>
-            <a:off x="4991406" y="4004482"/>
+            <a:off x="4991406" y="3933056"/>
             <a:ext cx="3352800" cy="1555552"/>
             <a:chOff x="4860032" y="4006577"/>
             <a:chExt cx="3352800" cy="1555552"/>
@@ -11457,7 +11348,7 @@
             <p:nvPr/>
           </p:nvPicPr>
           <p:blipFill>
-            <a:blip r:embed="rId4">
+            <a:blip r:embed="rId3">
               <a:extLst>
                 <a:ext uri="{28A0092B-C50C-407E-A947-70E740481C1C}">
                   <a14:useLocalDpi xmlns:a14="http://schemas.microsoft.com/office/drawing/2010/main" val="0"/>
@@ -11593,6 +11484,115 @@
           </a:p>
         </p:txBody>
       </p:sp>
+      <p:grpSp>
+        <p:nvGrpSpPr>
+          <p:cNvPr id="13" name="Gruppieren 12"/>
+          <p:cNvGrpSpPr/>
+          <p:nvPr/>
+        </p:nvGrpSpPr>
+        <p:grpSpPr>
+          <a:xfrm>
+            <a:off x="1259632" y="3933056"/>
+            <a:ext cx="3171825" cy="822878"/>
+            <a:chOff x="1259632" y="3942991"/>
+            <a:chExt cx="3171825" cy="822878"/>
+          </a:xfrm>
+        </p:grpSpPr>
+        <p:sp>
+          <p:nvSpPr>
+            <p:cNvPr id="4" name="Textfeld 3"/>
+            <p:cNvSpPr txBox="1"/>
+            <p:nvPr/>
+          </p:nvSpPr>
+          <p:spPr>
+            <a:xfrm>
+              <a:off x="1344216" y="4458092"/>
+              <a:ext cx="3009900" cy="307777"/>
+            </a:xfrm>
+            <a:prstGeom prst="rect">
+              <a:avLst/>
+            </a:prstGeom>
+            <a:noFill/>
+          </p:spPr>
+          <p:txBody>
+            <a:bodyPr wrap="square" rtlCol="0">
+              <a:spAutoFit/>
+            </a:bodyPr>
+            <a:lstStyle/>
+            <a:p>
+              <a:r>
+                <a:rPr lang="de-CH" sz="1400" i="1" dirty="0" smtClean="0"/>
+                <a:t>Filter/Suche-Textfeld</a:t>
+              </a:r>
+              <a:endParaRPr lang="de-CH" sz="1400" i="1" dirty="0"/>
+            </a:p>
+          </p:txBody>
+        </p:sp>
+        <p:pic>
+          <p:nvPicPr>
+            <p:cNvPr id="12" name="Picture 2"/>
+            <p:cNvPicPr>
+              <a:picLocks noChangeAspect="1" noChangeArrowheads="1"/>
+            </p:cNvPicPr>
+            <p:nvPr/>
+          </p:nvPicPr>
+          <p:blipFill>
+            <a:blip r:embed="rId4">
+              <a:extLst>
+                <a:ext uri="{28A0092B-C50C-407E-A947-70E740481C1C}">
+                  <a14:useLocalDpi xmlns:a14="http://schemas.microsoft.com/office/drawing/2010/main" val="0"/>
+                </a:ext>
+              </a:extLst>
+            </a:blip>
+            <a:srcRect/>
+            <a:stretch>
+              <a:fillRect/>
+            </a:stretch>
+          </p:blipFill>
+          <p:spPr bwMode="auto">
+            <a:xfrm>
+              <a:off x="1259632" y="3942991"/>
+              <a:ext cx="3171825" cy="514350"/>
+            </a:xfrm>
+            <a:prstGeom prst="rect">
+              <a:avLst/>
+            </a:prstGeom>
+            <a:noFill/>
+            <a:ln>
+              <a:noFill/>
+            </a:ln>
+            <a:effectLst/>
+            <a:extLst>
+              <a:ext uri="{909E8E84-426E-40DD-AFC4-6F175D3DCCD1}">
+                <a14:hiddenFill xmlns:a14="http://schemas.microsoft.com/office/drawing/2010/main">
+                  <a:solidFill>
+                    <a:schemeClr val="accent1"/>
+                  </a:solidFill>
+                </a14:hiddenFill>
+              </a:ext>
+              <a:ext uri="{91240B29-F687-4F45-9708-019B960494DF}">
+                <a14:hiddenLine xmlns:a14="http://schemas.microsoft.com/office/drawing/2010/main" w="9525">
+                  <a:solidFill>
+                    <a:schemeClr val="tx1"/>
+                  </a:solidFill>
+                  <a:miter lim="800000"/>
+                  <a:headEnd/>
+                  <a:tailEnd/>
+                </a14:hiddenLine>
+              </a:ext>
+              <a:ext uri="{AF507438-7753-43E0-B8FC-AC1667EBCBE1}">
+                <a14:hiddenEffects xmlns:a14="http://schemas.microsoft.com/office/drawing/2010/main">
+                  <a:effectLst>
+                    <a:outerShdw dist="35921" dir="2700000" algn="ctr" rotWithShape="0">
+                      <a:schemeClr val="bg2"/>
+                    </a:outerShdw>
+                  </a:effectLst>
+                </a14:hiddenEffects>
+              </a:ext>
+            </a:extLst>
+          </p:spPr>
+        </p:pic>
+      </p:grpSp>
     </p:spTree>
     <p:extLst>
       <p:ext uri="{BB962C8B-B14F-4D97-AF65-F5344CB8AC3E}">
@@ -12069,7 +12069,7 @@
         </p:blipFill>
         <p:spPr bwMode="auto">
           <a:xfrm>
-            <a:off x="6509019" y="1988840"/>
+            <a:off x="6509018" y="2132856"/>
             <a:ext cx="1400175" cy="619125"/>
           </a:xfrm>
           <a:prstGeom prst="rect">
@@ -12265,6 +12265,70 @@
           <a:chExt cx="0" cy="0"/>
         </a:xfrm>
       </p:grpSpPr>
+      <p:pic>
+        <p:nvPicPr>
+          <p:cNvPr id="2050" name="Picture 2"/>
+          <p:cNvPicPr>
+            <a:picLocks noChangeAspect="1" noChangeArrowheads="1"/>
+          </p:cNvPicPr>
+          <p:nvPr/>
+        </p:nvPicPr>
+        <p:blipFill>
+          <a:blip r:embed="rId2" cstate="print">
+            <a:extLst>
+              <a:ext uri="{28A0092B-C50C-407E-A947-70E740481C1C}">
+                <a14:useLocalDpi xmlns:a14="http://schemas.microsoft.com/office/drawing/2010/main" val="0"/>
+              </a:ext>
+            </a:extLst>
+          </a:blip>
+          <a:srcRect/>
+          <a:stretch>
+            <a:fillRect/>
+          </a:stretch>
+        </p:blipFill>
+        <p:spPr bwMode="auto">
+          <a:xfrm>
+            <a:off x="6660232" y="1165300"/>
+            <a:ext cx="2370990" cy="1183580"/>
+          </a:xfrm>
+          <a:prstGeom prst="rect">
+            <a:avLst/>
+          </a:prstGeom>
+          <a:noFill/>
+          <a:ln>
+            <a:noFill/>
+          </a:ln>
+          <a:effectLst/>
+          <a:extLst>
+            <a:ext uri="{909E8E84-426E-40DD-AFC4-6F175D3DCCD1}">
+              <a14:hiddenFill xmlns:a14="http://schemas.microsoft.com/office/drawing/2010/main">
+                <a:solidFill>
+                  <a:schemeClr val="accent1"/>
+                </a:solidFill>
+              </a14:hiddenFill>
+            </a:ext>
+            <a:ext uri="{91240B29-F687-4F45-9708-019B960494DF}">
+              <a14:hiddenLine xmlns:a14="http://schemas.microsoft.com/office/drawing/2010/main" w="9525">
+                <a:solidFill>
+                  <a:schemeClr val="tx1"/>
+                </a:solidFill>
+                <a:miter lim="800000"/>
+                <a:headEnd/>
+                <a:tailEnd/>
+              </a14:hiddenLine>
+            </a:ext>
+            <a:ext uri="{AF507438-7753-43E0-B8FC-AC1667EBCBE1}">
+              <a14:hiddenEffects xmlns:a14="http://schemas.microsoft.com/office/drawing/2010/main">
+                <a:effectLst>
+                  <a:outerShdw dist="35921" dir="2700000" algn="ctr" rotWithShape="0">
+                    <a:schemeClr val="bg2"/>
+                  </a:outerShdw>
+                </a:effectLst>
+              </a14:hiddenEffects>
+            </a:ext>
+          </a:extLst>
+        </p:spPr>
+      </p:pic>
       <p:sp>
         <p:nvSpPr>
           <p:cNvPr id="2" name="Titel 1"/>
@@ -12282,40 +12346,88 @@
           <a:p>
             <a:r>
               <a:rPr lang="de-CH" dirty="0" smtClean="0"/>
-              <a:t>Das müssen Sie wissen!</a:t>
+              <a:t>Das müssen Sie </a:t>
+            </a:r>
+            <a:r>
+              <a:rPr lang="de-CH" dirty="0" smtClean="0"/>
+              <a:t>wissen</a:t>
+            </a:r>
+            <a:r>
+              <a:rPr lang="de-CH" dirty="0" smtClean="0"/>
+              <a:t/>
             </a:r>
             <a:br>
               <a:rPr lang="de-CH" dirty="0" smtClean="0"/>
             </a:br>
             <a:r>
-              <a:rPr lang="de-CH" sz="3500" dirty="0" err="1" smtClean="0">
+              <a:rPr lang="de-CH" sz="3500" dirty="0">
                 <a:solidFill>
                   <a:schemeClr val="bg1">
                     <a:lumMod val="50000"/>
                   </a:schemeClr>
                 </a:solidFill>
               </a:rPr>
-              <a:t>Lessons</a:t>
-            </a:r>
-            <a:r>
-              <a:rPr lang="de-CH" sz="3500" dirty="0" smtClean="0">
+              <a:t>(</a:t>
+            </a:r>
+            <a:r>
+              <a:rPr lang="de-CH" sz="3500" dirty="0" err="1" smtClean="0">
                 <a:solidFill>
                   <a:schemeClr val="bg1">
                     <a:lumMod val="50000"/>
                   </a:schemeClr>
                 </a:solidFill>
               </a:rPr>
-              <a:t> </a:t>
-            </a:r>
-            <a:r>
-              <a:rPr lang="de-CH" sz="3500" dirty="0" err="1" smtClean="0">
+              <a:t>aka</a:t>
+            </a:r>
+            <a:r>
+              <a:rPr lang="de-CH" sz="3500" dirty="0" smtClean="0">
                 <a:solidFill>
                   <a:schemeClr val="bg1">
                     <a:lumMod val="50000"/>
                   </a:schemeClr>
                 </a:solidFill>
               </a:rPr>
+              <a:t> </a:t>
+            </a:r>
+            <a:r>
+              <a:rPr lang="de-CH" sz="3500" dirty="0" err="1" smtClean="0">
+                <a:solidFill>
+                  <a:schemeClr val="bg1">
+                    <a:lumMod val="50000"/>
+                  </a:schemeClr>
+                </a:solidFill>
+              </a:rPr>
+              <a:t>Lessons</a:t>
+            </a:r>
+            <a:r>
+              <a:rPr lang="de-CH" sz="3500" dirty="0" smtClean="0">
+                <a:solidFill>
+                  <a:schemeClr val="bg1">
+                    <a:lumMod val="50000"/>
+                  </a:schemeClr>
+                </a:solidFill>
+              </a:rPr>
+              <a:t> </a:t>
+            </a:r>
+            <a:r>
+              <a:rPr lang="de-CH" sz="3500" dirty="0" err="1" smtClean="0">
+                <a:solidFill>
+                  <a:schemeClr val="bg1">
+                    <a:lumMod val="50000"/>
+                  </a:schemeClr>
+                </a:solidFill>
+              </a:rPr>
               <a:t>learned</a:t>
+            </a:r>
+            <a:r>
+              <a:rPr lang="de-CH" sz="3500" dirty="0" smtClean="0">
+                <a:solidFill>
+                  <a:schemeClr val="bg1">
+                    <a:lumMod val="50000"/>
+                  </a:schemeClr>
+                </a:solidFill>
+              </a:rPr>
+              <a:t>)</a:t>
             </a:r>
             <a:endParaRPr lang="de-CH" sz="3500" dirty="0">
               <a:solidFill>
@@ -12348,8 +12460,13 @@
             </a:r>
             <a:r>
               <a:rPr lang="de-CH" dirty="0" smtClean="0"/>
-              <a:t> Touch macht Freude</a:t>
-            </a:r>
+              <a:t> Touch macht </a:t>
+            </a:r>
+            <a:r>
+              <a:rPr lang="de-CH" dirty="0" smtClean="0"/>
+              <a:t>Spass</a:t>
+            </a:r>
+            <a:endParaRPr lang="de-CH" dirty="0" smtClean="0"/>
           </a:p>
           <a:p>
             <a:r>
@@ -12627,11 +12744,7 @@
             </a:r>
             <a:r>
               <a:rPr lang="de-CH" dirty="0" smtClean="0"/>
-              <a:t>, </a:t>
-            </a:r>
-            <a:r>
-              <a:rPr lang="de-CH" dirty="0" smtClean="0"/>
-              <a:t>Patrice!</a:t>
+              <a:t>, Patrice!</a:t>
             </a:r>
             <a:endParaRPr lang="de-CH" dirty="0"/>
           </a:p>
@@ -12679,7 +12792,7 @@
         </p:blipFill>
         <p:spPr bwMode="auto">
           <a:xfrm>
-            <a:off x="2483768" y="1988840"/>
+            <a:off x="2555776" y="2009799"/>
             <a:ext cx="3810000" cy="3810000"/>
           </a:xfrm>
           <a:prstGeom prst="rect">
@@ -14659,48 +14772,62 @@
           <a:lstStyle/>
           <a:p>
             <a:r>
-              <a:rPr lang="de-CH" smtClean="0"/>
+              <a:rPr lang="de-CH" dirty="0" smtClean="0"/>
               <a:t>Technologie</a:t>
             </a:r>
           </a:p>
           <a:p>
             <a:pPr lvl="1"/>
             <a:r>
-              <a:rPr lang="de-CH" smtClean="0"/>
+              <a:rPr lang="de-CH" dirty="0" smtClean="0"/>
               <a:t>Server: PHP</a:t>
             </a:r>
           </a:p>
           <a:p>
             <a:pPr lvl="1"/>
             <a:r>
-              <a:rPr lang="de-CH" smtClean="0"/>
-              <a:t>Client: Sencha Touch (JavaScript)</a:t>
-            </a:r>
-          </a:p>
-          <a:p>
-            <a:r>
-              <a:rPr lang="de-CH" smtClean="0"/>
+              <a:rPr lang="de-CH" dirty="0" smtClean="0"/>
+              <a:t>Client: </a:t>
+            </a:r>
+            <a:r>
+              <a:rPr lang="de-CH" dirty="0" err="1" smtClean="0"/>
+              <a:t>Sencha</a:t>
+            </a:r>
+            <a:r>
+              <a:rPr lang="de-CH" dirty="0" smtClean="0"/>
+              <a:t> Touch (JavaScript)</a:t>
+            </a:r>
+          </a:p>
+          <a:p>
+            <a:r>
+              <a:rPr lang="de-CH" dirty="0" smtClean="0"/>
+              <a:t>Ziele</a:t>
+            </a:r>
+          </a:p>
+          <a:p>
+            <a:r>
+              <a:rPr lang="de-CH" dirty="0" smtClean="0"/>
               <a:t>Demo</a:t>
             </a:r>
-          </a:p>
-          <a:p>
-            <a:r>
-              <a:rPr lang="de-CH" smtClean="0"/>
+            <a:endParaRPr lang="de-CH" dirty="0" smtClean="0"/>
+          </a:p>
+          <a:p>
+            <a:r>
+              <a:rPr lang="de-CH" dirty="0" smtClean="0"/>
               <a:t>UI Richtlinien</a:t>
             </a:r>
           </a:p>
           <a:p>
             <a:r>
-              <a:rPr lang="de-CH" smtClean="0"/>
+              <a:rPr lang="de-CH" dirty="0" smtClean="0"/>
               <a:t>Offlinefähigkeit</a:t>
             </a:r>
           </a:p>
           <a:p>
             <a:r>
-              <a:rPr lang="de-CH" smtClean="0"/>
+              <a:rPr lang="de-CH" dirty="0" smtClean="0"/>
               <a:t>Zukunft</a:t>
             </a:r>
-            <a:endParaRPr lang="de-CH" dirty="0" smtClean="0"/>
           </a:p>
         </p:txBody>
       </p:sp>
@@ -17661,7 +17788,7 @@
               <a:buNone/>
             </a:pPr>
             <a:r>
-              <a:rPr lang="de-CH" sz="1200" dirty="0" err="1">
+              <a:rPr lang="de-CH" sz="1200" dirty="0" err="1" smtClean="0">
                 <a:solidFill>
                   <a:srgbClr val="000000"/>
                 </a:solidFill>
@@ -17672,7 +17799,7 @@
               <a:t>Ext</a:t>
             </a:r>
             <a:r>
-              <a:rPr lang="de-CH" sz="1200" b="1" dirty="0" err="1">
+              <a:rPr lang="de-CH" sz="1200" b="1" dirty="0" err="1" smtClean="0">
                 <a:solidFill>
                   <a:srgbClr val="000000"/>
                 </a:solidFill>
@@ -17683,7 +17810,7 @@
               <a:t>.</a:t>
             </a:r>
             <a:r>
-              <a:rPr lang="de-CH" sz="1200" dirty="0" err="1">
+              <a:rPr lang="de-CH" sz="1200" dirty="0" err="1" smtClean="0">
                 <a:solidFill>
                   <a:srgbClr val="000000"/>
                 </a:solidFill>
@@ -17705,7 +17832,7 @@
               <a:t>(</a:t>
             </a:r>
             <a:r>
-              <a:rPr lang="de-CH" sz="1200" dirty="0" smtClean="0">
+              <a:rPr lang="de-CH" sz="1200" dirty="0">
                 <a:solidFill>
                   <a:srgbClr val="808080"/>
                 </a:solidFill>
@@ -17713,7 +17840,18 @@
                 <a:ea typeface="Calibri"/>
                 <a:cs typeface="Courier New" pitchFamily="49" charset="0"/>
               </a:rPr>
-              <a:t>‘Person'</a:t>
+              <a:t>'Person</a:t>
+            </a:r>
+            <a:r>
+              <a:rPr lang="de-CH" sz="1200" dirty="0" smtClean="0">
+                <a:solidFill>
+                  <a:srgbClr val="808080"/>
+                </a:solidFill>
+                <a:latin typeface="Courier New" pitchFamily="49" charset="0"/>
+                <a:ea typeface="Calibri"/>
+                <a:cs typeface="Courier New" pitchFamily="49" charset="0"/>
+              </a:rPr>
+              <a:t>'</a:t>
             </a:r>
             <a:r>
               <a:rPr lang="de-CH" sz="1200" b="1" dirty="0" smtClean="0">
@@ -17902,7 +18040,7 @@
               <a:t> </a:t>
             </a:r>
             <a:r>
-              <a:rPr lang="de-CH" sz="1200" dirty="0" smtClean="0">
+              <a:rPr lang="de-CH" sz="1200" dirty="0">
                 <a:solidFill>
                   <a:srgbClr val="808080"/>
                 </a:solidFill>
@@ -17910,10 +18048,10 @@
                 <a:ea typeface="Calibri"/>
                 <a:cs typeface="Courier New" pitchFamily="49" charset="0"/>
               </a:rPr>
-              <a:t>‘</a:t>
-            </a:r>
-            <a:r>
-              <a:rPr lang="de-CH" sz="1200" dirty="0" err="1" smtClean="0">
+              <a:t>'</a:t>
+            </a:r>
+            <a:r>
+              <a:rPr lang="de-CH" sz="1200" dirty="0" err="1">
                 <a:solidFill>
                   <a:srgbClr val="808080"/>
                 </a:solidFill>
@@ -18127,7 +18265,7 @@
               <a:t> </a:t>
             </a:r>
             <a:r>
-              <a:rPr lang="de-CH" sz="1200" dirty="0" smtClean="0">
+              <a:rPr lang="de-CH" sz="1200" dirty="0">
                 <a:solidFill>
                   <a:srgbClr val="808080"/>
                 </a:solidFill>
@@ -18135,10 +18273,10 @@
                 <a:ea typeface="Calibri"/>
                 <a:cs typeface="Courier New" pitchFamily="49" charset="0"/>
               </a:rPr>
-              <a:t>‘</a:t>
-            </a:r>
-            <a:r>
-              <a:rPr lang="de-CH" sz="1200" dirty="0" err="1" smtClean="0">
+              <a:t>'</a:t>
+            </a:r>
+            <a:r>
+              <a:rPr lang="de-CH" sz="1200" dirty="0" err="1">
                 <a:solidFill>
                   <a:srgbClr val="808080"/>
                 </a:solidFill>
@@ -19470,6 +19608,17 @@
               <a:t> </a:t>
             </a:r>
             <a:r>
+              <a:rPr lang="de-CH" sz="1200" dirty="0">
+                <a:solidFill>
+                  <a:srgbClr val="808080"/>
+                </a:solidFill>
+                <a:latin typeface="Courier New" pitchFamily="49" charset="0"/>
+                <a:ea typeface="Calibri"/>
+                <a:cs typeface="Courier New" pitchFamily="49" charset="0"/>
+              </a:rPr>
+              <a:t>'</a:t>
+            </a:r>
+            <a:r>
               <a:rPr lang="de-CH" sz="1200" dirty="0" smtClean="0">
                 <a:solidFill>
                   <a:srgbClr val="808080"/>
@@ -19478,7 +19627,18 @@
                 <a:ea typeface="Calibri"/>
                 <a:cs typeface="Times New Roman"/>
               </a:rPr>
-              <a:t>‘Person'</a:t>
+              <a:t>Person</a:t>
+            </a:r>
+            <a:r>
+              <a:rPr lang="de-CH" sz="1200" dirty="0" smtClean="0">
+                <a:solidFill>
+                  <a:srgbClr val="808080"/>
+                </a:solidFill>
+                <a:latin typeface="Courier New"/>
+                <a:ea typeface="Calibri"/>
+                <a:cs typeface="Times New Roman"/>
+              </a:rPr>
+              <a:t>'</a:t>
             </a:r>
             <a:endParaRPr lang="de-CH" sz="1600" dirty="0">
               <a:latin typeface="Calibri"/>
@@ -20580,8 +20740,25 @@
             <a:pPr lvl="1"/>
             <a:r>
               <a:rPr lang="de-CH" dirty="0" smtClean="0"/>
+              <a:t>Suche/Filterung </a:t>
+            </a:r>
+            <a:r>
+              <a:rPr lang="de-CH" dirty="0"/>
+              <a:t>von </a:t>
+            </a:r>
+            <a:r>
+              <a:rPr lang="de-CH" dirty="0" err="1"/>
+              <a:t>Trails</a:t>
+            </a:r>
+            <a:endParaRPr lang="de-CH" dirty="0"/>
+          </a:p>
+          <a:p>
+            <a:pPr lvl="1"/>
+            <a:r>
+              <a:rPr lang="de-CH" dirty="0" smtClean="0"/>
               <a:t>Detailansicht</a:t>
             </a:r>
+            <a:endParaRPr lang="de-CH" dirty="0" smtClean="0"/>
           </a:p>
           <a:p>
             <a:pPr lvl="1"/>
@@ -20591,20 +20768,12 @@
             </a:r>
             <a:r>
               <a:rPr lang="de-CH" dirty="0" smtClean="0"/>
-              <a:t> auf Karte anzeigen</a:t>
-            </a:r>
-          </a:p>
-          <a:p>
-            <a:pPr lvl="1"/>
+              <a:t> auf Karte </a:t>
+            </a:r>
             <a:r>
               <a:rPr lang="de-CH" dirty="0" smtClean="0"/>
-              <a:t>Suche/Filterung von </a:t>
-            </a:r>
-            <a:r>
-              <a:rPr lang="de-CH" dirty="0" err="1" smtClean="0"/>
-              <a:t>Trails</a:t>
-            </a:r>
-            <a:endParaRPr lang="de-CH" dirty="0"/>
+              <a:t>anzeigen</a:t>
+            </a:r>
           </a:p>
           <a:p>
             <a:r>
@@ -20618,6 +20787,7 @@
               <a:rPr lang="de-CH" dirty="0" smtClean="0"/>
               <a:t>Favoritenliste</a:t>
             </a:r>
+            <a:endParaRPr lang="de-CH" dirty="0" smtClean="0"/>
           </a:p>
           <a:p>
             <a:pPr lvl="1"/>

</xml_diff>

<commit_message>
worked on presentation: added sencha touch release year
</commit_message>
<xml_diff>
--- a/_DOCUMENTATION/Presentation/Praesentation-Traildevils-XPl2.pptx
+++ b/_DOCUMENTATION/Presentation/Praesentation-Traildevils-XPl2.pptx
@@ -15878,17 +15878,30 @@
             <a:pPr lvl="1"/>
             <a:r>
               <a:rPr lang="de-CH" dirty="0" smtClean="0"/>
-              <a:t>seit 2007</a:t>
-            </a:r>
-          </a:p>
-          <a:p>
+              <a:t>seit </a:t>
+            </a:r>
             <a:r>
               <a:rPr lang="de-CH" dirty="0" smtClean="0"/>
-              <a:t>Verwendet Web </a:t>
-            </a:r>
+              <a:t>2007 </a:t>
+            </a:r>
+            <a:r>
+              <a:rPr lang="de-CH" sz="1800" dirty="0" smtClean="0"/>
+              <a:t>(</a:t>
+            </a:r>
+            <a:r>
+              <a:rPr lang="de-CH" sz="1800" dirty="0" err="1" smtClean="0"/>
+              <a:t>Sencha</a:t>
+            </a:r>
+            <a:r>
+              <a:rPr lang="de-CH" sz="1800" dirty="0" smtClean="0"/>
+              <a:t> Touch: 2010)</a:t>
+            </a:r>
+            <a:endParaRPr lang="de-CH" sz="1800" dirty="0" smtClean="0"/>
+          </a:p>
+          <a:p>
             <a:r>
               <a:rPr lang="de-CH" dirty="0" smtClean="0"/>
-              <a:t>Standards (HTML5, CSS3)</a:t>
+              <a:t>Verwendet Web Standards (HTML5, CSS3)</a:t>
             </a:r>
           </a:p>
           <a:p>
@@ -15920,11 +15933,7 @@
           <a:p>
             <a:r>
               <a:rPr lang="de-CH" dirty="0" smtClean="0"/>
-              <a:t>Viele </a:t>
-            </a:r>
-            <a:r>
-              <a:rPr lang="de-CH" dirty="0" smtClean="0"/>
-              <a:t>GUI-Komponenten</a:t>
+              <a:t>Viele GUI-Komponenten</a:t>
             </a:r>
             <a:endParaRPr lang="de-CH" dirty="0"/>
           </a:p>
@@ -20751,13 +20760,8 @@
           <a:p>
             <a:r>
               <a:rPr lang="de-CH" dirty="0" smtClean="0"/>
-              <a:t>Priorität 1</a:t>
-            </a:r>
-            <a:r>
-              <a:rPr lang="de-CH" dirty="0" smtClean="0"/>
-              <a:t>:</a:t>
-            </a:r>
-            <a:endParaRPr lang="de-CH" dirty="0" smtClean="0"/>
+              <a:t>Priorität 1:</a:t>
+            </a:r>
           </a:p>
           <a:p>
             <a:pPr lvl="1"/>

</xml_diff>